<commit_message>
finished reviist of shitf4it
</commit_message>
<xml_diff>
--- a/SHIFT4IT/mobile-development-introduction/mobile-development.pptx
+++ b/SHIFT4IT/mobile-development-introduction/mobile-development.pptx
@@ -5,16 +5,20 @@
     <p:sldMasterId id="2147483648" r:id="rId1"/>
   </p:sldMasterIdLst>
   <p:notesMasterIdLst>
-    <p:notesMasterId r:id="rId9"/>
+    <p:notesMasterId r:id="rId13"/>
   </p:notesMasterIdLst>
   <p:sldIdLst>
     <p:sldId id="256" r:id="rId2"/>
     <p:sldId id="261" r:id="rId3"/>
     <p:sldId id="281" r:id="rId4"/>
     <p:sldId id="282" r:id="rId5"/>
-    <p:sldId id="283" r:id="rId6"/>
-    <p:sldId id="285" r:id="rId7"/>
-    <p:sldId id="284" r:id="rId8"/>
+    <p:sldId id="286" r:id="rId6"/>
+    <p:sldId id="287" r:id="rId7"/>
+    <p:sldId id="283" r:id="rId8"/>
+    <p:sldId id="285" r:id="rId9"/>
+    <p:sldId id="288" r:id="rId10"/>
+    <p:sldId id="289" r:id="rId11"/>
+    <p:sldId id="284" r:id="rId12"/>
   </p:sldIdLst>
   <p:sldSz cx="12192000" cy="6858000"/>
   <p:notesSz cx="6858000" cy="9144000"/>
@@ -206,7 +210,7 @@
           <a:p>
             <a:fld id="{2C027FDF-D9AC-4497-8AF1-9347ACD4697E}" type="datetimeFigureOut">
               <a:rPr lang="hr-HR" smtClean="0"/>
-              <a:t>21.4.2025.</a:t>
+              <a:t>19.5.2025.</a:t>
             </a:fld>
             <a:endParaRPr lang="hr-HR"/>
           </a:p>
@@ -1728,6 +1732,551 @@
         <p:cNvPr id="1" name="">
           <a:extLst>
             <a:ext uri="{FF2B5EF4-FFF2-40B4-BE49-F238E27FC236}">
+              <a16:creationId xmlns:a16="http://schemas.microsoft.com/office/drawing/2014/main" id="{D49FC326-8A90-312C-7242-00BD358F2F8C}"/>
+            </a:ext>
+          </a:extLst>
+        </p:cNvPr>
+        <p:cNvGrpSpPr/>
+        <p:nvPr/>
+      </p:nvGrpSpPr>
+      <p:grpSpPr>
+        <a:xfrm>
+          <a:off x="0" y="0"/>
+          <a:ext cx="0" cy="0"/>
+          <a:chOff x="0" y="0"/>
+          <a:chExt cx="0" cy="0"/>
+        </a:xfrm>
+      </p:grpSpPr>
+      <p:sp>
+        <p:nvSpPr>
+          <p:cNvPr id="2" name="Slide Image Placeholder 1">
+            <a:extLst>
+              <a:ext uri="{FF2B5EF4-FFF2-40B4-BE49-F238E27FC236}">
+                <a16:creationId xmlns:a16="http://schemas.microsoft.com/office/drawing/2014/main" id="{BEF976A7-7764-152B-793E-C3D0897BA9FA}"/>
+              </a:ext>
+            </a:extLst>
+          </p:cNvPr>
+          <p:cNvSpPr>
+            <a:spLocks noGrp="1" noRot="1" noChangeAspect="1"/>
+          </p:cNvSpPr>
+          <p:nvPr>
+            <p:ph type="sldImg"/>
+          </p:nvPr>
+        </p:nvSpPr>
+        <p:spPr/>
+      </p:sp>
+      <p:sp>
+        <p:nvSpPr>
+          <p:cNvPr id="3" name="Notes Placeholder 2">
+            <a:extLst>
+              <a:ext uri="{FF2B5EF4-FFF2-40B4-BE49-F238E27FC236}">
+                <a16:creationId xmlns:a16="http://schemas.microsoft.com/office/drawing/2014/main" id="{84297E29-163A-FDE7-EE57-51DE5A0A11DA}"/>
+              </a:ext>
+            </a:extLst>
+          </p:cNvPr>
+          <p:cNvSpPr>
+            <a:spLocks noGrp="1"/>
+          </p:cNvSpPr>
+          <p:nvPr>
+            <p:ph type="body" idx="1"/>
+          </p:nvPr>
+        </p:nvSpPr>
+        <p:spPr/>
+        <p:txBody>
+          <a:bodyPr/>
+          <a:lstStyle/>
+          <a:p>
+            <a:pPr>
+              <a:buNone/>
+            </a:pPr>
+            <a:r>
+              <a:rPr lang="hr-HR" b="1" dirty="0" err="1"/>
+              <a:t>Teacher</a:t>
+            </a:r>
+            <a:r>
+              <a:rPr lang="hr-HR" b="1" dirty="0"/>
+              <a:t> Notes:</a:t>
+            </a:r>
+            <a:endParaRPr lang="hr-HR" dirty="0"/>
+          </a:p>
+          <a:p>
+            <a:pPr>
+              <a:buFont typeface="Arial" panose="020B0604020202020204" pitchFamily="34" charset="0"/>
+              <a:buChar char="•"/>
+            </a:pPr>
+            <a:r>
+              <a:rPr lang="hr-HR" dirty="0"/>
+              <a:t>Demo </a:t>
+            </a:r>
+            <a:r>
+              <a:rPr lang="hr-HR" dirty="0" err="1"/>
+              <a:t>installing</a:t>
+            </a:r>
+            <a:r>
+              <a:rPr lang="hr-HR" dirty="0"/>
+              <a:t> </a:t>
+            </a:r>
+            <a:r>
+              <a:rPr lang="hr-HR" dirty="0" err="1"/>
+              <a:t>Cordova</a:t>
+            </a:r>
+            <a:r>
+              <a:rPr lang="hr-HR" dirty="0"/>
+              <a:t> CLI (</a:t>
+            </a:r>
+            <a:r>
+              <a:rPr lang="hr-HR" dirty="0" err="1"/>
+              <a:t>npm</a:t>
+            </a:r>
+            <a:r>
+              <a:rPr lang="hr-HR" dirty="0"/>
+              <a:t> </a:t>
+            </a:r>
+            <a:r>
+              <a:rPr lang="hr-HR" dirty="0" err="1"/>
+              <a:t>install</a:t>
+            </a:r>
+            <a:r>
+              <a:rPr lang="hr-HR" dirty="0"/>
+              <a:t> -g </a:t>
+            </a:r>
+            <a:r>
+              <a:rPr lang="hr-HR" dirty="0" err="1"/>
+              <a:t>cordova</a:t>
+            </a:r>
+            <a:r>
+              <a:rPr lang="hr-HR" dirty="0"/>
+              <a:t>), </a:t>
+            </a:r>
+            <a:r>
+              <a:rPr lang="hr-HR" dirty="0" err="1"/>
+              <a:t>creating</a:t>
+            </a:r>
+            <a:r>
+              <a:rPr lang="hr-HR" dirty="0"/>
+              <a:t> a </a:t>
+            </a:r>
+            <a:r>
+              <a:rPr lang="hr-HR" dirty="0" err="1"/>
+              <a:t>project</a:t>
+            </a:r>
+            <a:r>
+              <a:rPr lang="hr-HR" dirty="0"/>
+              <a:t> (</a:t>
+            </a:r>
+            <a:r>
+              <a:rPr lang="hr-HR" dirty="0" err="1"/>
+              <a:t>cordova</a:t>
+            </a:r>
+            <a:r>
+              <a:rPr lang="hr-HR" dirty="0"/>
+              <a:t> </a:t>
+            </a:r>
+            <a:r>
+              <a:rPr lang="hr-HR" dirty="0" err="1"/>
+              <a:t>create</a:t>
+            </a:r>
+            <a:r>
+              <a:rPr lang="hr-HR" dirty="0"/>
+              <a:t>), </a:t>
+            </a:r>
+            <a:r>
+              <a:rPr lang="hr-HR" dirty="0" err="1"/>
+              <a:t>and</a:t>
+            </a:r>
+            <a:r>
+              <a:rPr lang="hr-HR" dirty="0"/>
+              <a:t> </a:t>
+            </a:r>
+            <a:r>
+              <a:rPr lang="hr-HR" dirty="0" err="1"/>
+              <a:t>adding</a:t>
+            </a:r>
+            <a:r>
+              <a:rPr lang="hr-HR" dirty="0"/>
+              <a:t> </a:t>
+            </a:r>
+            <a:r>
+              <a:rPr lang="hr-HR" dirty="0" err="1"/>
+              <a:t>platforms</a:t>
+            </a:r>
+            <a:r>
+              <a:rPr lang="hr-HR" dirty="0"/>
+              <a:t> (</a:t>
+            </a:r>
+            <a:r>
+              <a:rPr lang="hr-HR" dirty="0" err="1"/>
+              <a:t>cordova</a:t>
+            </a:r>
+            <a:r>
+              <a:rPr lang="hr-HR" dirty="0"/>
+              <a:t> </a:t>
+            </a:r>
+            <a:r>
+              <a:rPr lang="hr-HR" dirty="0" err="1"/>
+              <a:t>platform</a:t>
+            </a:r>
+            <a:r>
+              <a:rPr lang="hr-HR" dirty="0"/>
+              <a:t> </a:t>
+            </a:r>
+            <a:r>
+              <a:rPr lang="hr-HR" dirty="0" err="1"/>
+              <a:t>add</a:t>
+            </a:r>
+            <a:r>
+              <a:rPr lang="hr-HR" dirty="0"/>
+              <a:t> android).</a:t>
+            </a:r>
+          </a:p>
+          <a:p>
+            <a:pPr>
+              <a:buFont typeface="Arial" panose="020B0604020202020204" pitchFamily="34" charset="0"/>
+              <a:buChar char="•"/>
+            </a:pPr>
+            <a:r>
+              <a:rPr lang="hr-HR" dirty="0"/>
+              <a:t>Show how to </a:t>
+            </a:r>
+            <a:r>
+              <a:rPr lang="hr-HR" dirty="0" err="1"/>
+              <a:t>access</a:t>
+            </a:r>
+            <a:r>
+              <a:rPr lang="hr-HR" dirty="0"/>
+              <a:t> </a:t>
+            </a:r>
+            <a:r>
+              <a:rPr lang="hr-HR" dirty="0" err="1"/>
+              <a:t>device</a:t>
+            </a:r>
+            <a:r>
+              <a:rPr lang="hr-HR" dirty="0"/>
+              <a:t> </a:t>
+            </a:r>
+            <a:r>
+              <a:rPr lang="hr-HR" dirty="0" err="1"/>
+              <a:t>features</a:t>
+            </a:r>
+            <a:r>
+              <a:rPr lang="hr-HR" dirty="0"/>
+              <a:t> (</a:t>
+            </a:r>
+            <a:r>
+              <a:rPr lang="hr-HR" dirty="0" err="1"/>
+              <a:t>camera</a:t>
+            </a:r>
+            <a:r>
+              <a:rPr lang="hr-HR" dirty="0"/>
+              <a:t>, </a:t>
+            </a:r>
+            <a:r>
+              <a:rPr lang="hr-HR" dirty="0" err="1"/>
+              <a:t>geolocation</a:t>
+            </a:r>
+            <a:r>
+              <a:rPr lang="hr-HR" dirty="0"/>
+              <a:t>) via </a:t>
+            </a:r>
+            <a:r>
+              <a:rPr lang="hr-HR" dirty="0" err="1"/>
+              <a:t>plugins</a:t>
+            </a:r>
+            <a:r>
+              <a:rPr lang="hr-HR" dirty="0"/>
+              <a:t> (</a:t>
+            </a:r>
+            <a:r>
+              <a:rPr lang="hr-HR" dirty="0" err="1"/>
+              <a:t>cordova</a:t>
+            </a:r>
+            <a:r>
+              <a:rPr lang="hr-HR" dirty="0"/>
+              <a:t> </a:t>
+            </a:r>
+            <a:r>
+              <a:rPr lang="hr-HR" dirty="0" err="1"/>
+              <a:t>plugin</a:t>
+            </a:r>
+            <a:r>
+              <a:rPr lang="hr-HR" dirty="0"/>
+              <a:t> </a:t>
+            </a:r>
+            <a:r>
+              <a:rPr lang="hr-HR" dirty="0" err="1"/>
+              <a:t>add</a:t>
+            </a:r>
+            <a:r>
+              <a:rPr lang="hr-HR" dirty="0"/>
+              <a:t> </a:t>
+            </a:r>
+            <a:r>
+              <a:rPr lang="hr-HR" dirty="0" err="1"/>
+              <a:t>cordova-plugin-camera</a:t>
+            </a:r>
+            <a:r>
+              <a:rPr lang="hr-HR" dirty="0"/>
+              <a:t>).</a:t>
+            </a:r>
+          </a:p>
+          <a:p>
+            <a:pPr>
+              <a:buNone/>
+            </a:pPr>
+            <a:r>
+              <a:rPr lang="hr-HR" b="1" dirty="0"/>
+              <a:t>Resources:</a:t>
+            </a:r>
+            <a:endParaRPr lang="hr-HR" dirty="0"/>
+          </a:p>
+          <a:p>
+            <a:pPr>
+              <a:buFont typeface="Arial" panose="020B0604020202020204" pitchFamily="34" charset="0"/>
+              <a:buChar char="•"/>
+            </a:pPr>
+            <a:r>
+              <a:rPr lang="hr-HR" dirty="0"/>
+              <a:t>Apache </a:t>
+            </a:r>
+            <a:r>
+              <a:rPr lang="hr-HR" dirty="0" err="1"/>
+              <a:t>Cordova</a:t>
+            </a:r>
+            <a:r>
+              <a:rPr lang="hr-HR" dirty="0"/>
+              <a:t> – </a:t>
+            </a:r>
+            <a:r>
+              <a:rPr lang="hr-HR" dirty="0" err="1">
+                <a:hlinkClick r:id="rId3"/>
+              </a:rPr>
+              <a:t>Getting</a:t>
+            </a:r>
+            <a:r>
+              <a:rPr lang="hr-HR" dirty="0">
+                <a:hlinkClick r:id="rId3"/>
+              </a:rPr>
+              <a:t> </a:t>
+            </a:r>
+            <a:r>
+              <a:rPr lang="hr-HR" dirty="0" err="1">
+                <a:hlinkClick r:id="rId3"/>
+              </a:rPr>
+              <a:t>Started</a:t>
+            </a:r>
+            <a:r>
+              <a:rPr lang="hr-HR" dirty="0">
+                <a:hlinkClick r:id="rId3"/>
+              </a:rPr>
+              <a:t> </a:t>
+            </a:r>
+            <a:r>
+              <a:rPr lang="hr-HR" dirty="0" err="1">
+                <a:hlinkClick r:id="rId3"/>
+              </a:rPr>
+              <a:t>Guide</a:t>
+            </a:r>
+            <a:endParaRPr lang="hr-HR" dirty="0"/>
+          </a:p>
+          <a:p>
+            <a:pPr>
+              <a:buFont typeface="Arial" panose="020B0604020202020204" pitchFamily="34" charset="0"/>
+              <a:buChar char="•"/>
+            </a:pPr>
+            <a:r>
+              <a:rPr lang="hr-HR" dirty="0" err="1"/>
+              <a:t>GitHub</a:t>
+            </a:r>
+            <a:r>
+              <a:rPr lang="hr-HR" dirty="0"/>
+              <a:t> – </a:t>
+            </a:r>
+            <a:r>
+              <a:rPr lang="hr-HR" dirty="0">
+                <a:hlinkClick r:id="rId4"/>
+              </a:rPr>
+              <a:t>Apache </a:t>
+            </a:r>
+            <a:r>
+              <a:rPr lang="hr-HR" dirty="0" err="1">
+                <a:hlinkClick r:id="rId4"/>
+              </a:rPr>
+              <a:t>Cordova</a:t>
+            </a:r>
+            <a:r>
+              <a:rPr lang="hr-HR" dirty="0">
+                <a:hlinkClick r:id="rId4"/>
+              </a:rPr>
+              <a:t> </a:t>
+            </a:r>
+            <a:r>
+              <a:rPr lang="hr-HR" dirty="0" err="1">
+                <a:hlinkClick r:id="rId4"/>
+              </a:rPr>
+              <a:t>Plugins</a:t>
+            </a:r>
+            <a:endParaRPr lang="hr-HR" dirty="0"/>
+          </a:p>
+          <a:p>
+            <a:pPr>
+              <a:buNone/>
+            </a:pPr>
+            <a:r>
+              <a:rPr lang="hr-HR" b="1" dirty="0" err="1"/>
+              <a:t>Additional</a:t>
+            </a:r>
+            <a:r>
+              <a:rPr lang="hr-HR" b="1" dirty="0"/>
+              <a:t> </a:t>
+            </a:r>
+            <a:r>
+              <a:rPr lang="hr-HR" b="1" dirty="0" err="1"/>
+              <a:t>Reading</a:t>
+            </a:r>
+            <a:r>
+              <a:rPr lang="hr-HR" b="1" dirty="0"/>
+              <a:t>:</a:t>
+            </a:r>
+            <a:endParaRPr lang="hr-HR" dirty="0"/>
+          </a:p>
+          <a:p>
+            <a:pPr>
+              <a:buFont typeface="Arial" panose="020B0604020202020204" pitchFamily="34" charset="0"/>
+              <a:buChar char="•"/>
+            </a:pPr>
+            <a:r>
+              <a:rPr lang="hr-HR" i="1" dirty="0"/>
+              <a:t>Apache </a:t>
+            </a:r>
+            <a:r>
+              <a:rPr lang="hr-HR" i="1" dirty="0" err="1"/>
+              <a:t>Cordova</a:t>
+            </a:r>
+            <a:r>
+              <a:rPr lang="hr-HR" i="1" dirty="0"/>
+              <a:t> </a:t>
+            </a:r>
+            <a:r>
+              <a:rPr lang="hr-HR" i="1" dirty="0" err="1"/>
+              <a:t>in</a:t>
+            </a:r>
+            <a:r>
+              <a:rPr lang="hr-HR" i="1" dirty="0"/>
+              <a:t> </a:t>
+            </a:r>
+            <a:r>
+              <a:rPr lang="hr-HR" i="1" dirty="0" err="1"/>
+              <a:t>Action</a:t>
+            </a:r>
+            <a:r>
+              <a:rPr lang="hr-HR" dirty="0"/>
+              <a:t> </a:t>
+            </a:r>
+            <a:r>
+              <a:rPr lang="hr-HR" dirty="0" err="1"/>
+              <a:t>by</a:t>
+            </a:r>
+            <a:r>
+              <a:rPr lang="hr-HR" dirty="0"/>
+              <a:t> Raymond </a:t>
+            </a:r>
+            <a:r>
+              <a:rPr lang="hr-HR" dirty="0" err="1"/>
+              <a:t>Camden</a:t>
+            </a:r>
+            <a:r>
+              <a:rPr lang="hr-HR" dirty="0"/>
+              <a:t> &amp; John </a:t>
+            </a:r>
+            <a:r>
+              <a:rPr lang="hr-HR" dirty="0" err="1"/>
+              <a:t>Wargo</a:t>
+            </a:r>
+            <a:endParaRPr lang="hr-HR" dirty="0"/>
+          </a:p>
+          <a:p>
+            <a:pPr>
+              <a:buFont typeface="Arial" panose="020B0604020202020204" pitchFamily="34" charset="0"/>
+              <a:buChar char="•"/>
+            </a:pPr>
+            <a:r>
+              <a:rPr lang="hr-HR" i="1" dirty="0" err="1"/>
+              <a:t>PhoneGap</a:t>
+            </a:r>
+            <a:r>
+              <a:rPr lang="hr-HR" i="1" dirty="0"/>
+              <a:t> Essentials</a:t>
+            </a:r>
+            <a:r>
+              <a:rPr lang="hr-HR" dirty="0"/>
+              <a:t> </a:t>
+            </a:r>
+            <a:r>
+              <a:rPr lang="hr-HR" dirty="0" err="1"/>
+              <a:t>by</a:t>
+            </a:r>
+            <a:r>
+              <a:rPr lang="hr-HR" dirty="0"/>
+              <a:t> John M. </a:t>
+            </a:r>
+            <a:r>
+              <a:rPr lang="hr-HR" dirty="0" err="1"/>
+              <a:t>Wargo</a:t>
+            </a:r>
+            <a:endParaRPr lang="hr-HR" dirty="0"/>
+          </a:p>
+        </p:txBody>
+      </p:sp>
+      <p:sp>
+        <p:nvSpPr>
+          <p:cNvPr id="4" name="Slide Number Placeholder 3">
+            <a:extLst>
+              <a:ext uri="{FF2B5EF4-FFF2-40B4-BE49-F238E27FC236}">
+                <a16:creationId xmlns:a16="http://schemas.microsoft.com/office/drawing/2014/main" id="{9F4F0EC1-832F-B107-8956-B2B0C6C88267}"/>
+              </a:ext>
+            </a:extLst>
+          </p:cNvPr>
+          <p:cNvSpPr>
+            <a:spLocks noGrp="1"/>
+          </p:cNvSpPr>
+          <p:nvPr>
+            <p:ph type="sldNum" sz="quarter" idx="5"/>
+          </p:nvPr>
+        </p:nvSpPr>
+        <p:spPr/>
+        <p:txBody>
+          <a:bodyPr/>
+          <a:lstStyle/>
+          <a:p>
+            <a:fld id="{90A064B2-EFF6-4760-BE09-0DEDA56827BE}" type="slidenum">
+              <a:rPr lang="hr-HR" smtClean="0"/>
+              <a:t>6</a:t>
+            </a:fld>
+            <a:endParaRPr lang="hr-HR"/>
+          </a:p>
+        </p:txBody>
+      </p:sp>
+    </p:spTree>
+    <p:extLst>
+      <p:ext uri="{BB962C8B-B14F-4D97-AF65-F5344CB8AC3E}">
+        <p14:creationId xmlns:p14="http://schemas.microsoft.com/office/powerpoint/2010/main" val="436502386"/>
+      </p:ext>
+    </p:extLst>
+  </p:cSld>
+  <p:clrMapOvr>
+    <a:masterClrMapping/>
+  </p:clrMapOvr>
+</p:notes>
+</file>
+
+<file path=ppt/notesSlides/notesSlide5.xml><?xml version="1.0" encoding="utf-8"?>
+<p:notes xmlns:a="http://schemas.openxmlformats.org/drawingml/2006/main" xmlns:r="http://schemas.openxmlformats.org/officeDocument/2006/relationships" xmlns:p="http://schemas.openxmlformats.org/presentationml/2006/main">
+  <p:cSld>
+    <p:spTree>
+      <p:nvGrpSpPr>
+        <p:cNvPr id="1" name="">
+          <a:extLst>
+            <a:ext uri="{FF2B5EF4-FFF2-40B4-BE49-F238E27FC236}">
               <a16:creationId xmlns:a16="http://schemas.microsoft.com/office/drawing/2014/main" id="{FEA6A69E-B936-4006-14FB-9F35CB06ADA2}"/>
             </a:ext>
           </a:extLst>
@@ -2246,7 +2795,7 @@
           <a:p>
             <a:fld id="{90A064B2-EFF6-4760-BE09-0DEDA56827BE}" type="slidenum">
               <a:rPr lang="hr-HR" smtClean="0"/>
-              <a:t>5</a:t>
+              <a:t>7</a:t>
             </a:fld>
             <a:endParaRPr lang="hr-HR"/>
           </a:p>
@@ -2265,7 +2814,7 @@
 </p:notes>
 </file>
 
-<file path=ppt/notesSlides/notesSlide5.xml><?xml version="1.0" encoding="utf-8"?>
+<file path=ppt/notesSlides/notesSlide6.xml><?xml version="1.0" encoding="utf-8"?>
 <p:notes xmlns:a="http://schemas.openxmlformats.org/drawingml/2006/main" xmlns:r="http://schemas.openxmlformats.org/officeDocument/2006/relationships" xmlns:p="http://schemas.openxmlformats.org/presentationml/2006/main">
   <p:cSld>
     <p:spTree>
@@ -2449,7 +2998,7 @@
           <a:p>
             <a:fld id="{90A064B2-EFF6-4760-BE09-0DEDA56827BE}" type="slidenum">
               <a:rPr lang="hr-HR" smtClean="0"/>
-              <a:t>6</a:t>
+              <a:t>8</a:t>
             </a:fld>
             <a:endParaRPr lang="hr-HR"/>
           </a:p>
@@ -2468,7 +3017,418 @@
 </p:notes>
 </file>
 
-<file path=ppt/notesSlides/notesSlide6.xml><?xml version="1.0" encoding="utf-8"?>
+<file path=ppt/notesSlides/notesSlide7.xml><?xml version="1.0" encoding="utf-8"?>
+<p:notes xmlns:a="http://schemas.openxmlformats.org/drawingml/2006/main" xmlns:r="http://schemas.openxmlformats.org/officeDocument/2006/relationships" xmlns:p="http://schemas.openxmlformats.org/presentationml/2006/main">
+  <p:cSld>
+    <p:spTree>
+      <p:nvGrpSpPr>
+        <p:cNvPr id="1" name="">
+          <a:extLst>
+            <a:ext uri="{FF2B5EF4-FFF2-40B4-BE49-F238E27FC236}">
+              <a16:creationId xmlns:a16="http://schemas.microsoft.com/office/drawing/2014/main" id="{E90785FF-E8EC-C5BE-51F5-58D2CEA81840}"/>
+            </a:ext>
+          </a:extLst>
+        </p:cNvPr>
+        <p:cNvGrpSpPr/>
+        <p:nvPr/>
+      </p:nvGrpSpPr>
+      <p:grpSpPr>
+        <a:xfrm>
+          <a:off x="0" y="0"/>
+          <a:ext cx="0" cy="0"/>
+          <a:chOff x="0" y="0"/>
+          <a:chExt cx="0" cy="0"/>
+        </a:xfrm>
+      </p:grpSpPr>
+      <p:sp>
+        <p:nvSpPr>
+          <p:cNvPr id="2" name="Slide Image Placeholder 1">
+            <a:extLst>
+              <a:ext uri="{FF2B5EF4-FFF2-40B4-BE49-F238E27FC236}">
+                <a16:creationId xmlns:a16="http://schemas.microsoft.com/office/drawing/2014/main" id="{447463CA-E9C2-D24B-3CE0-955093571252}"/>
+              </a:ext>
+            </a:extLst>
+          </p:cNvPr>
+          <p:cNvSpPr>
+            <a:spLocks noGrp="1" noRot="1" noChangeAspect="1"/>
+          </p:cNvSpPr>
+          <p:nvPr>
+            <p:ph type="sldImg"/>
+          </p:nvPr>
+        </p:nvSpPr>
+        <p:spPr/>
+      </p:sp>
+      <p:sp>
+        <p:nvSpPr>
+          <p:cNvPr id="3" name="Notes Placeholder 2">
+            <a:extLst>
+              <a:ext uri="{FF2B5EF4-FFF2-40B4-BE49-F238E27FC236}">
+                <a16:creationId xmlns:a16="http://schemas.microsoft.com/office/drawing/2014/main" id="{4F78987C-F0FF-C326-E735-5F8502325FD0}"/>
+              </a:ext>
+            </a:extLst>
+          </p:cNvPr>
+          <p:cNvSpPr>
+            <a:spLocks noGrp="1"/>
+          </p:cNvSpPr>
+          <p:nvPr>
+            <p:ph type="body" idx="1"/>
+          </p:nvPr>
+        </p:nvSpPr>
+        <p:spPr/>
+        <p:txBody>
+          <a:bodyPr/>
+          <a:lstStyle/>
+          <a:p>
+            <a:pPr>
+              <a:buNone/>
+            </a:pPr>
+            <a:r>
+              <a:rPr lang="hr-HR" b="1" dirty="0" err="1"/>
+              <a:t>Teacher</a:t>
+            </a:r>
+            <a:r>
+              <a:rPr lang="hr-HR" b="1" dirty="0"/>
+              <a:t> Notes:</a:t>
+            </a:r>
+            <a:endParaRPr lang="hr-HR" dirty="0"/>
+          </a:p>
+          <a:p>
+            <a:pPr>
+              <a:buFont typeface="Arial" panose="020B0604020202020204" pitchFamily="34" charset="0"/>
+              <a:buChar char="•"/>
+            </a:pPr>
+            <a:r>
+              <a:rPr lang="hr-HR" dirty="0"/>
+              <a:t>Provide a live </a:t>
+            </a:r>
+            <a:r>
+              <a:rPr lang="hr-HR" dirty="0" err="1"/>
+              <a:t>walkthrough</a:t>
+            </a:r>
+            <a:r>
+              <a:rPr lang="hr-HR" dirty="0"/>
+              <a:t> </a:t>
+            </a:r>
+            <a:r>
+              <a:rPr lang="hr-HR" dirty="0" err="1"/>
+              <a:t>packaging</a:t>
+            </a:r>
+            <a:r>
+              <a:rPr lang="hr-HR" dirty="0"/>
+              <a:t> </a:t>
+            </a:r>
+            <a:r>
+              <a:rPr lang="hr-HR" dirty="0" err="1"/>
+              <a:t>the</a:t>
+            </a:r>
+            <a:r>
+              <a:rPr lang="hr-HR" dirty="0"/>
+              <a:t> </a:t>
+            </a:r>
+            <a:r>
+              <a:rPr lang="hr-HR" dirty="0" err="1"/>
+              <a:t>Classroom</a:t>
+            </a:r>
+            <a:r>
+              <a:rPr lang="hr-HR" dirty="0"/>
+              <a:t> Management web </a:t>
+            </a:r>
+            <a:r>
+              <a:rPr lang="hr-HR" dirty="0" err="1"/>
+              <a:t>app</a:t>
+            </a:r>
+            <a:r>
+              <a:rPr lang="hr-HR" dirty="0"/>
+              <a:t> via </a:t>
+            </a:r>
+            <a:r>
+              <a:rPr lang="hr-HR" dirty="0" err="1"/>
+              <a:t>Cordova</a:t>
+            </a:r>
+            <a:r>
+              <a:rPr lang="hr-HR" dirty="0"/>
+              <a:t>: </a:t>
+            </a:r>
+            <a:r>
+              <a:rPr lang="hr-HR" dirty="0" err="1"/>
+              <a:t>cordova</a:t>
+            </a:r>
+            <a:r>
+              <a:rPr lang="hr-HR" dirty="0"/>
+              <a:t> </a:t>
+            </a:r>
+            <a:r>
+              <a:rPr lang="hr-HR" dirty="0" err="1"/>
+              <a:t>build</a:t>
+            </a:r>
+            <a:r>
+              <a:rPr lang="hr-HR" dirty="0"/>
+              <a:t> android </a:t>
+            </a:r>
+            <a:r>
+              <a:rPr lang="hr-HR" dirty="0" err="1"/>
+              <a:t>and</a:t>
+            </a:r>
+            <a:r>
+              <a:rPr lang="hr-HR" dirty="0"/>
+              <a:t> </a:t>
+            </a:r>
+            <a:r>
+              <a:rPr lang="hr-HR" dirty="0" err="1"/>
+              <a:t>deploying</a:t>
+            </a:r>
+            <a:r>
+              <a:rPr lang="hr-HR" dirty="0"/>
+              <a:t> to a </a:t>
+            </a:r>
+            <a:r>
+              <a:rPr lang="hr-HR" dirty="0" err="1"/>
+              <a:t>device</a:t>
+            </a:r>
+            <a:r>
+              <a:rPr lang="hr-HR" dirty="0"/>
+              <a:t>.</a:t>
+            </a:r>
+          </a:p>
+          <a:p>
+            <a:pPr>
+              <a:buFont typeface="Arial" panose="020B0604020202020204" pitchFamily="34" charset="0"/>
+              <a:buChar char="•"/>
+            </a:pPr>
+            <a:r>
+              <a:rPr lang="hr-HR" dirty="0" err="1"/>
+              <a:t>Emphasize</a:t>
+            </a:r>
+            <a:r>
+              <a:rPr lang="hr-HR" dirty="0"/>
+              <a:t> </a:t>
+            </a:r>
+            <a:r>
+              <a:rPr lang="hr-HR" dirty="0" err="1"/>
+              <a:t>testing</a:t>
+            </a:r>
+            <a:r>
+              <a:rPr lang="hr-HR" dirty="0"/>
+              <a:t> on </a:t>
+            </a:r>
+            <a:r>
+              <a:rPr lang="hr-HR" dirty="0" err="1"/>
+              <a:t>both</a:t>
+            </a:r>
+            <a:r>
+              <a:rPr lang="hr-HR" dirty="0"/>
+              <a:t> Android </a:t>
+            </a:r>
+            <a:r>
+              <a:rPr lang="hr-HR" dirty="0" err="1"/>
+              <a:t>and</a:t>
+            </a:r>
+            <a:r>
+              <a:rPr lang="hr-HR" dirty="0"/>
+              <a:t> </a:t>
+            </a:r>
+            <a:r>
+              <a:rPr lang="hr-HR" dirty="0" err="1"/>
+              <a:t>iOS</a:t>
+            </a:r>
+            <a:r>
+              <a:rPr lang="hr-HR" dirty="0"/>
+              <a:t> </a:t>
+            </a:r>
+            <a:r>
+              <a:rPr lang="hr-HR" dirty="0" err="1"/>
+              <a:t>emulators</a:t>
+            </a:r>
+            <a:r>
+              <a:rPr lang="hr-HR" dirty="0"/>
+              <a:t> </a:t>
+            </a:r>
+            <a:r>
+              <a:rPr lang="hr-HR" dirty="0" err="1"/>
+              <a:t>or</a:t>
+            </a:r>
+            <a:r>
+              <a:rPr lang="hr-HR" dirty="0"/>
+              <a:t> </a:t>
+            </a:r>
+            <a:r>
+              <a:rPr lang="hr-HR" dirty="0" err="1"/>
+              <a:t>real</a:t>
+            </a:r>
+            <a:r>
+              <a:rPr lang="hr-HR" dirty="0"/>
+              <a:t> </a:t>
+            </a:r>
+            <a:r>
+              <a:rPr lang="hr-HR" dirty="0" err="1"/>
+              <a:t>devices</a:t>
+            </a:r>
+            <a:r>
+              <a:rPr lang="hr-HR" dirty="0"/>
+              <a:t> </a:t>
+            </a:r>
+            <a:r>
+              <a:rPr lang="hr-HR" dirty="0" err="1"/>
+              <a:t>and</a:t>
+            </a:r>
+            <a:r>
+              <a:rPr lang="hr-HR" dirty="0"/>
+              <a:t> </a:t>
+            </a:r>
+            <a:r>
+              <a:rPr lang="hr-HR" dirty="0" err="1"/>
+              <a:t>debugging</a:t>
+            </a:r>
+            <a:r>
+              <a:rPr lang="hr-HR" dirty="0"/>
+              <a:t> via </a:t>
+            </a:r>
+            <a:r>
+              <a:rPr lang="hr-HR" dirty="0" err="1"/>
+              <a:t>remote</a:t>
+            </a:r>
+            <a:r>
+              <a:rPr lang="hr-HR" dirty="0"/>
+              <a:t> </a:t>
+            </a:r>
+            <a:r>
+              <a:rPr lang="hr-HR" dirty="0" err="1"/>
+              <a:t>WebView</a:t>
+            </a:r>
+            <a:r>
+              <a:rPr lang="hr-HR" dirty="0"/>
+              <a:t> </a:t>
+            </a:r>
+            <a:r>
+              <a:rPr lang="hr-HR" dirty="0" err="1"/>
+              <a:t>inspector</a:t>
+            </a:r>
+            <a:r>
+              <a:rPr lang="hr-HR" dirty="0"/>
+              <a:t>.</a:t>
+            </a:r>
+          </a:p>
+          <a:p>
+            <a:pPr>
+              <a:buNone/>
+            </a:pPr>
+            <a:r>
+              <a:rPr lang="hr-HR" b="1" dirty="0"/>
+              <a:t>Resources:</a:t>
+            </a:r>
+            <a:endParaRPr lang="hr-HR" dirty="0"/>
+          </a:p>
+          <a:p>
+            <a:pPr>
+              <a:buFont typeface="Arial" panose="020B0604020202020204" pitchFamily="34" charset="0"/>
+              <a:buChar char="•"/>
+            </a:pPr>
+            <a:r>
+              <a:rPr lang="hr-HR" dirty="0"/>
+              <a:t>Apache </a:t>
+            </a:r>
+            <a:r>
+              <a:rPr lang="hr-HR" dirty="0" err="1"/>
+              <a:t>Cordova</a:t>
+            </a:r>
+            <a:r>
+              <a:rPr lang="hr-HR" dirty="0"/>
+              <a:t> – </a:t>
+            </a:r>
+            <a:r>
+              <a:rPr lang="hr-HR" dirty="0" err="1">
+                <a:hlinkClick r:id="rId3"/>
+              </a:rPr>
+              <a:t>Debugging</a:t>
+            </a:r>
+            <a:r>
+              <a:rPr lang="hr-HR" dirty="0">
+                <a:hlinkClick r:id="rId3"/>
+              </a:rPr>
+              <a:t> </a:t>
+            </a:r>
+            <a:r>
+              <a:rPr lang="hr-HR" dirty="0" err="1">
+                <a:hlinkClick r:id="rId3"/>
+              </a:rPr>
+              <a:t>Guide</a:t>
+            </a:r>
+            <a:endParaRPr lang="hr-HR" dirty="0"/>
+          </a:p>
+          <a:p>
+            <a:pPr>
+              <a:buFont typeface="Arial" panose="020B0604020202020204" pitchFamily="34" charset="0"/>
+              <a:buChar char="•"/>
+            </a:pPr>
+            <a:r>
+              <a:rPr lang="hr-HR" dirty="0"/>
+              <a:t>Android – </a:t>
+            </a:r>
+            <a:r>
+              <a:rPr lang="hr-HR" dirty="0" err="1"/>
+              <a:t>Debug</a:t>
+            </a:r>
+            <a:r>
+              <a:rPr lang="hr-HR" dirty="0"/>
+              <a:t> </a:t>
+            </a:r>
+            <a:r>
+              <a:rPr lang="hr-HR" dirty="0" err="1"/>
+              <a:t>WebView</a:t>
+            </a:r>
+            <a:r>
+              <a:rPr lang="hr-HR" dirty="0"/>
+              <a:t> on Android Devices</a:t>
+            </a:r>
+          </a:p>
+          <a:p>
+            <a:endParaRPr lang="hr-HR" dirty="0"/>
+          </a:p>
+        </p:txBody>
+      </p:sp>
+      <p:sp>
+        <p:nvSpPr>
+          <p:cNvPr id="4" name="Slide Number Placeholder 3">
+            <a:extLst>
+              <a:ext uri="{FF2B5EF4-FFF2-40B4-BE49-F238E27FC236}">
+                <a16:creationId xmlns:a16="http://schemas.microsoft.com/office/drawing/2014/main" id="{1CB23B8B-6D11-7C0F-7786-C009305802A5}"/>
+              </a:ext>
+            </a:extLst>
+          </p:cNvPr>
+          <p:cNvSpPr>
+            <a:spLocks noGrp="1"/>
+          </p:cNvSpPr>
+          <p:nvPr>
+            <p:ph type="sldNum" sz="quarter" idx="5"/>
+          </p:nvPr>
+        </p:nvSpPr>
+        <p:spPr/>
+        <p:txBody>
+          <a:bodyPr/>
+          <a:lstStyle/>
+          <a:p>
+            <a:fld id="{90A064B2-EFF6-4760-BE09-0DEDA56827BE}" type="slidenum">
+              <a:rPr lang="hr-HR" smtClean="0"/>
+              <a:t>10</a:t>
+            </a:fld>
+            <a:endParaRPr lang="hr-HR"/>
+          </a:p>
+        </p:txBody>
+      </p:sp>
+    </p:spTree>
+    <p:extLst>
+      <p:ext uri="{BB962C8B-B14F-4D97-AF65-F5344CB8AC3E}">
+        <p14:creationId xmlns:p14="http://schemas.microsoft.com/office/powerpoint/2010/main" val="1771267602"/>
+      </p:ext>
+    </p:extLst>
+  </p:cSld>
+  <p:clrMapOvr>
+    <a:masterClrMapping/>
+  </p:clrMapOvr>
+</p:notes>
+</file>
+
+<file path=ppt/notesSlides/notesSlide8.xml><?xml version="1.0" encoding="utf-8"?>
 <p:notes xmlns:a="http://schemas.openxmlformats.org/drawingml/2006/main" xmlns:r="http://schemas.openxmlformats.org/officeDocument/2006/relationships" xmlns:p="http://schemas.openxmlformats.org/presentationml/2006/main">
   <p:cSld>
     <p:spTree>
@@ -2860,7 +3820,7 @@
           <a:p>
             <a:fld id="{90A064B2-EFF6-4760-BE09-0DEDA56827BE}" type="slidenum">
               <a:rPr lang="hr-HR" smtClean="0"/>
-              <a:t>7</a:t>
+              <a:t>11</a:t>
             </a:fld>
             <a:endParaRPr lang="hr-HR"/>
           </a:p>
@@ -5102,7 +6062,7 @@
           <a:p>
             <a:fld id="{6963B997-549E-41F4-A1E4-B0CF42B49EF1}" type="datetimeFigureOut">
               <a:rPr lang="hr-HR" smtClean="0"/>
-              <a:t>21.4.2025.</a:t>
+              <a:t>19.5.2025.</a:t>
             </a:fld>
             <a:endParaRPr lang="hr-HR"/>
           </a:p>
@@ -5546,10 +6506,14 @@
           <a:lstStyle/>
           <a:p>
             <a:r>
-              <a:rPr lang="en-US" dirty="0"/>
+              <a:rPr lang="en-US" dirty="0">
+                <a:latin typeface="Bahnschrift SemiLight" panose="020B0502040204020203" pitchFamily="34" charset="0"/>
+              </a:rPr>
               <a:t>MOBILE DEVELOPMENT</a:t>
             </a:r>
-            <a:endParaRPr lang="hr-HR" dirty="0"/>
+            <a:endParaRPr lang="hr-HR" dirty="0">
+              <a:latin typeface="Bahnschrift SemiLight" panose="020B0502040204020203" pitchFamily="34" charset="0"/>
+            </a:endParaRPr>
           </a:p>
         </p:txBody>
       </p:sp>
@@ -5575,7 +6539,9 @@
           <a:lstStyle/>
           <a:p>
             <a:r>
-              <a:rPr lang="en-US" dirty="0"/>
+              <a:rPr lang="en-US" dirty="0">
+                <a:latin typeface="Bahnschrift SemiLight" panose="020B0502040204020203" pitchFamily="34" charset="0"/>
+              </a:rPr>
               <a:t>ANDROID AND IOS</a:t>
             </a:r>
           </a:p>
@@ -5585,6 +6551,347 @@
     <p:extLst>
       <p:ext uri="{BB962C8B-B14F-4D97-AF65-F5344CB8AC3E}">
         <p14:creationId xmlns:p14="http://schemas.microsoft.com/office/powerpoint/2010/main" val="495518943"/>
+      </p:ext>
+    </p:extLst>
+  </p:cSld>
+  <p:clrMapOvr>
+    <a:masterClrMapping/>
+  </p:clrMapOvr>
+</p:sld>
+</file>
+
+<file path=ppt/slides/slide10.xml><?xml version="1.0" encoding="utf-8"?>
+<p:sld xmlns:a="http://schemas.openxmlformats.org/drawingml/2006/main" xmlns:r="http://schemas.openxmlformats.org/officeDocument/2006/relationships" xmlns:p="http://schemas.openxmlformats.org/presentationml/2006/main">
+  <p:cSld>
+    <p:spTree>
+      <p:nvGrpSpPr>
+        <p:cNvPr id="1" name="">
+          <a:extLst>
+            <a:ext uri="{FF2B5EF4-FFF2-40B4-BE49-F238E27FC236}">
+              <a16:creationId xmlns:a16="http://schemas.microsoft.com/office/drawing/2014/main" id="{410856ED-6F47-B020-BE04-6DAFFCAEDE15}"/>
+            </a:ext>
+          </a:extLst>
+        </p:cNvPr>
+        <p:cNvGrpSpPr/>
+        <p:nvPr/>
+      </p:nvGrpSpPr>
+      <p:grpSpPr>
+        <a:xfrm>
+          <a:off x="0" y="0"/>
+          <a:ext cx="0" cy="0"/>
+          <a:chOff x="0" y="0"/>
+          <a:chExt cx="0" cy="0"/>
+        </a:xfrm>
+      </p:grpSpPr>
+      <p:sp>
+        <p:nvSpPr>
+          <p:cNvPr id="3" name="Title 2">
+            <a:extLst>
+              <a:ext uri="{FF2B5EF4-FFF2-40B4-BE49-F238E27FC236}">
+                <a16:creationId xmlns:a16="http://schemas.microsoft.com/office/drawing/2014/main" id="{2AEC3F5F-75DF-EB54-7FD5-E14ADEA330B9}"/>
+              </a:ext>
+            </a:extLst>
+          </p:cNvPr>
+          <p:cNvSpPr>
+            <a:spLocks noGrp="1"/>
+          </p:cNvSpPr>
+          <p:nvPr>
+            <p:ph type="title"/>
+          </p:nvPr>
+        </p:nvSpPr>
+        <p:spPr/>
+        <p:txBody>
+          <a:bodyPr/>
+          <a:lstStyle/>
+          <a:p>
+            <a:r>
+              <a:rPr lang="en-US" dirty="0"/>
+              <a:t>MOBILE DEVELOPMENT – FINAL EXERCISE</a:t>
+            </a:r>
+            <a:endParaRPr lang="hr-HR" dirty="0"/>
+          </a:p>
+        </p:txBody>
+      </p:sp>
+      <p:sp>
+        <p:nvSpPr>
+          <p:cNvPr id="8" name="TextBox 7">
+            <a:extLst>
+              <a:ext uri="{FF2B5EF4-FFF2-40B4-BE49-F238E27FC236}">
+                <a16:creationId xmlns:a16="http://schemas.microsoft.com/office/drawing/2014/main" id="{B916502C-85BE-0EF9-D29A-115078883D2C}"/>
+              </a:ext>
+            </a:extLst>
+          </p:cNvPr>
+          <p:cNvSpPr txBox="1"/>
+          <p:nvPr/>
+        </p:nvSpPr>
+        <p:spPr>
+          <a:xfrm>
+            <a:off x="181913" y="1690688"/>
+            <a:ext cx="11828173" cy="5016758"/>
+          </a:xfrm>
+          <a:prstGeom prst="rect">
+            <a:avLst/>
+          </a:prstGeom>
+          <a:noFill/>
+        </p:spPr>
+        <p:txBody>
+          <a:bodyPr wrap="square" rtlCol="0">
+            <a:spAutoFit/>
+          </a:bodyPr>
+          <a:lstStyle/>
+          <a:p>
+            <a:pPr>
+              <a:buNone/>
+            </a:pPr>
+            <a:r>
+              <a:rPr lang="en-US" sz="2000" dirty="0">
+                <a:latin typeface="Bahnschrift SemiLight" panose="020B0502040204020203" pitchFamily="34" charset="0"/>
+              </a:rPr>
+              <a:t>Pack and Deploy Your Classroom Management App with Apache Cordova</a:t>
+            </a:r>
+            <a:br>
+              <a:rPr lang="en-US" sz="2000" dirty="0">
+                <a:latin typeface="Bahnschrift SemiLight" panose="020B0502040204020203" pitchFamily="34" charset="0"/>
+              </a:rPr>
+            </a:br>
+            <a:r>
+              <a:rPr lang="en-US" sz="2000" dirty="0">
+                <a:latin typeface="Bahnschrift SemiLight" panose="020B0502040204020203" pitchFamily="34" charset="0"/>
+              </a:rPr>
+              <a:t>✅ </a:t>
+            </a:r>
+            <a:r>
+              <a:rPr lang="en-US" sz="2000" b="1" dirty="0">
+                <a:latin typeface="Bahnschrift SemiLight" panose="020B0502040204020203" pitchFamily="34" charset="0"/>
+              </a:rPr>
+              <a:t>Install Apache Cordova</a:t>
+            </a:r>
+            <a:br>
+              <a:rPr lang="en-US" sz="2000" dirty="0">
+                <a:latin typeface="Bahnschrift SemiLight" panose="020B0502040204020203" pitchFamily="34" charset="0"/>
+              </a:rPr>
+            </a:br>
+            <a:r>
+              <a:rPr lang="en-US" sz="2000" dirty="0">
+                <a:latin typeface="Bahnschrift SemiLight" panose="020B0502040204020203" pitchFamily="34" charset="0"/>
+              </a:rPr>
+              <a:t>Set up Cordova on your machine to package your HTML, CSS, and JavaScript files into a mobile-ready application.</a:t>
+            </a:r>
+            <a:br>
+              <a:rPr lang="en-US" sz="2000" dirty="0">
+                <a:latin typeface="Bahnschrift SemiLight" panose="020B0502040204020203" pitchFamily="34" charset="0"/>
+              </a:rPr>
+            </a:br>
+            <a:r>
+              <a:rPr lang="en-US" sz="2000" dirty="0">
+                <a:latin typeface="Bahnschrift SemiLight" panose="020B0502040204020203" pitchFamily="34" charset="0"/>
+              </a:rPr>
+              <a:t>✅ </a:t>
+            </a:r>
+            <a:r>
+              <a:rPr lang="en-US" sz="2000" b="1" dirty="0">
+                <a:latin typeface="Bahnschrift SemiLight" panose="020B0502040204020203" pitchFamily="34" charset="0"/>
+              </a:rPr>
+              <a:t>Prepare Your Web Project</a:t>
+            </a:r>
+            <a:br>
+              <a:rPr lang="en-US" sz="2000" dirty="0">
+                <a:latin typeface="Bahnschrift SemiLight" panose="020B0502040204020203" pitchFamily="34" charset="0"/>
+              </a:rPr>
+            </a:br>
+            <a:r>
+              <a:rPr lang="en-US" sz="2000" dirty="0">
+                <a:latin typeface="Bahnschrift SemiLight" panose="020B0502040204020203" pitchFamily="34" charset="0"/>
+              </a:rPr>
+              <a:t>Make sure your project folder is well-structured and includes all necessary files (HTML, CSS, JS).</a:t>
+            </a:r>
+            <a:br>
+              <a:rPr lang="en-US" sz="2000" dirty="0">
+                <a:latin typeface="Bahnschrift SemiLight" panose="020B0502040204020203" pitchFamily="34" charset="0"/>
+              </a:rPr>
+            </a:br>
+            <a:r>
+              <a:rPr lang="en-US" sz="2000" dirty="0">
+                <a:latin typeface="Bahnschrift SemiLight" panose="020B0502040204020203" pitchFamily="34" charset="0"/>
+              </a:rPr>
+              <a:t>✅ </a:t>
+            </a:r>
+            <a:r>
+              <a:rPr lang="en-US" sz="2000" b="1" dirty="0">
+                <a:latin typeface="Bahnschrift SemiLight" panose="020B0502040204020203" pitchFamily="34" charset="0"/>
+              </a:rPr>
+              <a:t>Build the Mobile App</a:t>
+            </a:r>
+            <a:br>
+              <a:rPr lang="en-US" sz="2000" dirty="0">
+                <a:latin typeface="Bahnschrift SemiLight" panose="020B0502040204020203" pitchFamily="34" charset="0"/>
+              </a:rPr>
+            </a:br>
+            <a:r>
+              <a:rPr lang="en-US" sz="2000" dirty="0">
+                <a:latin typeface="Bahnschrift SemiLight" panose="020B0502040204020203" pitchFamily="34" charset="0"/>
+              </a:rPr>
+              <a:t>Use Cordova commands to build your project for Android or iOS, creating native app packages.</a:t>
+            </a:r>
+            <a:br>
+              <a:rPr lang="en-US" sz="2000" dirty="0">
+                <a:latin typeface="Bahnschrift SemiLight" panose="020B0502040204020203" pitchFamily="34" charset="0"/>
+              </a:rPr>
+            </a:br>
+            <a:r>
+              <a:rPr lang="en-US" sz="2000" dirty="0">
+                <a:latin typeface="Bahnschrift SemiLight" panose="020B0502040204020203" pitchFamily="34" charset="0"/>
+              </a:rPr>
+              <a:t>✅ </a:t>
+            </a:r>
+            <a:r>
+              <a:rPr lang="en-US" sz="2000" b="1" dirty="0">
+                <a:latin typeface="Bahnschrift SemiLight" panose="020B0502040204020203" pitchFamily="34" charset="0"/>
+              </a:rPr>
+              <a:t>Test on Real Devices</a:t>
+            </a:r>
+            <a:br>
+              <a:rPr lang="en-US" sz="2000" dirty="0">
+                <a:latin typeface="Bahnschrift SemiLight" panose="020B0502040204020203" pitchFamily="34" charset="0"/>
+              </a:rPr>
+            </a:br>
+            <a:r>
+              <a:rPr lang="en-US" sz="2000" dirty="0">
+                <a:latin typeface="Bahnschrift SemiLight" panose="020B0502040204020203" pitchFamily="34" charset="0"/>
+              </a:rPr>
+              <a:t>Install the generated app files on your phone or emulator to see your classroom management tool in action.</a:t>
+            </a:r>
+          </a:p>
+          <a:p>
+            <a:pPr>
+              <a:buNone/>
+            </a:pPr>
+            <a:endParaRPr lang="en-US" sz="2000" dirty="0">
+              <a:latin typeface="Bahnschrift SemiLight" panose="020B0502040204020203" pitchFamily="34" charset="0"/>
+            </a:endParaRPr>
+          </a:p>
+          <a:p>
+            <a:r>
+              <a:rPr lang="en-US" sz="2000" dirty="0">
+                <a:latin typeface="Bahnschrift SemiLight" panose="020B0502040204020203" pitchFamily="34" charset="0"/>
+              </a:rPr>
+              <a:t>👉 This will let you experience your project on real devices and share it with others—taking your classroom management app to the next level! 😎</a:t>
+            </a:r>
+          </a:p>
+          <a:p>
+            <a:endParaRPr lang="en-US" sz="2000" dirty="0">
+              <a:latin typeface="Bahnschrift SemiLight" panose="020B0502040204020203" pitchFamily="34" charset="0"/>
+            </a:endParaRPr>
+          </a:p>
+          <a:p>
+            <a:r>
+              <a:rPr lang="en-US" sz="2000" dirty="0">
+                <a:latin typeface="Bahnschrift SemiLight" panose="020B0502040204020203" pitchFamily="34" charset="0"/>
+              </a:rPr>
+              <a:t>https://cordova.apache.org/</a:t>
+            </a:r>
+          </a:p>
+        </p:txBody>
+      </p:sp>
+    </p:spTree>
+    <p:extLst>
+      <p:ext uri="{BB962C8B-B14F-4D97-AF65-F5344CB8AC3E}">
+        <p14:creationId xmlns:p14="http://schemas.microsoft.com/office/powerpoint/2010/main" val="1610357434"/>
+      </p:ext>
+    </p:extLst>
+  </p:cSld>
+  <p:clrMapOvr>
+    <a:masterClrMapping/>
+  </p:clrMapOvr>
+</p:sld>
+</file>
+
+<file path=ppt/slides/slide11.xml><?xml version="1.0" encoding="utf-8"?>
+<p:sld xmlns:a="http://schemas.openxmlformats.org/drawingml/2006/main" xmlns:r="http://schemas.openxmlformats.org/officeDocument/2006/relationships" xmlns:p="http://schemas.openxmlformats.org/presentationml/2006/main">
+  <p:cSld>
+    <p:spTree>
+      <p:nvGrpSpPr>
+        <p:cNvPr id="1" name="">
+          <a:extLst>
+            <a:ext uri="{FF2B5EF4-FFF2-40B4-BE49-F238E27FC236}">
+              <a16:creationId xmlns:a16="http://schemas.microsoft.com/office/drawing/2014/main" id="{143D190C-BEB5-37F1-A6FD-13688D556FF2}"/>
+            </a:ext>
+          </a:extLst>
+        </p:cNvPr>
+        <p:cNvGrpSpPr/>
+        <p:nvPr/>
+      </p:nvGrpSpPr>
+      <p:grpSpPr>
+        <a:xfrm>
+          <a:off x="0" y="0"/>
+          <a:ext cx="0" cy="0"/>
+          <a:chOff x="0" y="0"/>
+          <a:chExt cx="0" cy="0"/>
+        </a:xfrm>
+      </p:grpSpPr>
+      <p:sp>
+        <p:nvSpPr>
+          <p:cNvPr id="3" name="Title 2">
+            <a:extLst>
+              <a:ext uri="{FF2B5EF4-FFF2-40B4-BE49-F238E27FC236}">
+                <a16:creationId xmlns:a16="http://schemas.microsoft.com/office/drawing/2014/main" id="{BE6B4FA9-42B4-49F1-4330-C43CA58CE333}"/>
+              </a:ext>
+            </a:extLst>
+          </p:cNvPr>
+          <p:cNvSpPr>
+            <a:spLocks noGrp="1"/>
+          </p:cNvSpPr>
+          <p:nvPr>
+            <p:ph type="title"/>
+          </p:nvPr>
+        </p:nvSpPr>
+        <p:spPr/>
+        <p:txBody>
+          <a:bodyPr/>
+          <a:lstStyle/>
+          <a:p>
+            <a:r>
+              <a:rPr lang="en-US" dirty="0"/>
+              <a:t>MOBILE DEVELOPMENT – FINAL EXERCISE</a:t>
+            </a:r>
+            <a:endParaRPr lang="hr-HR" dirty="0"/>
+          </a:p>
+        </p:txBody>
+      </p:sp>
+      <p:pic>
+        <p:nvPicPr>
+          <p:cNvPr id="6" name="Picture 5">
+            <a:extLst>
+              <a:ext uri="{FF2B5EF4-FFF2-40B4-BE49-F238E27FC236}">
+                <a16:creationId xmlns:a16="http://schemas.microsoft.com/office/drawing/2014/main" id="{F3FA6376-34D9-3DE3-59D2-B24F37BBA60F}"/>
+              </a:ext>
+            </a:extLst>
+          </p:cNvPr>
+          <p:cNvPicPr>
+            <a:picLocks noChangeAspect="1"/>
+          </p:cNvPicPr>
+          <p:nvPr/>
+        </p:nvPicPr>
+        <p:blipFill>
+          <a:blip r:embed="rId3"/>
+          <a:stretch>
+            <a:fillRect/>
+          </a:stretch>
+        </p:blipFill>
+        <p:spPr>
+          <a:xfrm>
+            <a:off x="3861027" y="1876683"/>
+            <a:ext cx="3945239" cy="4795050"/>
+          </a:xfrm>
+          <a:prstGeom prst="rect">
+            <a:avLst/>
+          </a:prstGeom>
+        </p:spPr>
+      </p:pic>
+    </p:spTree>
+    <p:extLst>
+      <p:ext uri="{BB962C8B-B14F-4D97-AF65-F5344CB8AC3E}">
+        <p14:creationId xmlns:p14="http://schemas.microsoft.com/office/powerpoint/2010/main" val="1814369650"/>
       </p:ext>
     </p:extLst>
   </p:cSld>
@@ -5662,7 +6969,7 @@
         </p:nvSpPr>
         <p:spPr>
           <a:xfrm>
-            <a:off x="1048546" y="2131458"/>
+            <a:off x="759435" y="1943200"/>
             <a:ext cx="10353802" cy="3996291"/>
           </a:xfrm>
           <a:prstGeom prst="rect">
@@ -5671,7 +6978,7 @@
         </p:spPr>
         <p:txBody>
           <a:bodyPr vert="horz" lIns="91440" tIns="45720" rIns="91440" bIns="45720" rtlCol="0">
-            <a:normAutofit/>
+            <a:noAutofit/>
           </a:bodyPr>
           <a:lstStyle>
             <a:lvl1pPr marL="368300" indent="-352425" algn="l" defTabSz="914400" rtl="0" eaLnBrk="1" latinLnBrk="0" hangingPunct="1">
@@ -5876,11 +7183,15 @@
               <a:buChar char="•"/>
             </a:pPr>
             <a:r>
-              <a:rPr lang="en-US" b="1" dirty="0"/>
+              <a:rPr lang="en-US" sz="2400" b="1" dirty="0">
+                <a:latin typeface="Bahnschrift SemiLight" panose="020B0502040204020203" pitchFamily="34" charset="0"/>
+              </a:rPr>
               <a:t>Android:</a:t>
             </a:r>
             <a:r>
-              <a:rPr lang="en-US" dirty="0"/>
+              <a:rPr lang="en-US" sz="2400" dirty="0">
+                <a:latin typeface="Bahnschrift SemiLight" panose="020B0502040204020203" pitchFamily="34" charset="0"/>
+              </a:rPr>
               <a:t> </a:t>
             </a:r>
           </a:p>
@@ -5890,11 +7201,15 @@
               <a:buChar char="•"/>
             </a:pPr>
             <a:r>
-              <a:rPr lang="en-US" b="1" dirty="0"/>
+              <a:rPr lang="en-US" sz="2400" b="1" dirty="0">
+                <a:latin typeface="Bahnschrift SemiLight" panose="020B0502040204020203" pitchFamily="34" charset="0"/>
+              </a:rPr>
               <a:t>Development Tools:</a:t>
             </a:r>
             <a:r>
-              <a:rPr lang="en-US" dirty="0"/>
+              <a:rPr lang="en-US" sz="2400" dirty="0">
+                <a:latin typeface="Bahnschrift SemiLight" panose="020B0502040204020203" pitchFamily="34" charset="0"/>
+              </a:rPr>
               <a:t> Familiarity with Android Studio and the use of Java or Kotlin.</a:t>
             </a:r>
           </a:p>
@@ -5904,11 +7219,15 @@
               <a:buChar char="•"/>
             </a:pPr>
             <a:r>
-              <a:rPr lang="en-US" b="1" dirty="0"/>
+              <a:rPr lang="en-US" sz="2400" b="1" dirty="0">
+                <a:latin typeface="Bahnschrift SemiLight" panose="020B0502040204020203" pitchFamily="34" charset="0"/>
+              </a:rPr>
               <a:t>App Lifecycle and UI Design:</a:t>
             </a:r>
             <a:r>
-              <a:rPr lang="en-US" dirty="0"/>
+              <a:rPr lang="en-US" sz="2400" dirty="0">
+                <a:latin typeface="Bahnschrift SemiLight" panose="020B0502040204020203" pitchFamily="34" charset="0"/>
+              </a:rPr>
               <a:t> Understanding Android-specific design guidelines and the lifecycle of an Android app.</a:t>
             </a:r>
           </a:p>
@@ -5917,7 +7236,9 @@
               <a:buFont typeface="Arial" panose="020B0604020202020204" pitchFamily="34" charset="0"/>
               <a:buChar char="•"/>
             </a:pPr>
-            <a:endParaRPr lang="en-US" dirty="0"/>
+            <a:endParaRPr lang="en-US" sz="2400" dirty="0">
+              <a:latin typeface="Bahnschrift SemiLight" panose="020B0502040204020203" pitchFamily="34" charset="0"/>
+            </a:endParaRPr>
           </a:p>
           <a:p>
             <a:pPr marL="742950" lvl="1" indent="-285750">
@@ -5925,11 +7246,15 @@
               <a:buChar char="•"/>
             </a:pPr>
             <a:r>
-              <a:rPr lang="en-US" b="1" dirty="0"/>
+              <a:rPr lang="en-US" sz="2400" b="1" dirty="0">
+                <a:latin typeface="Bahnschrift SemiLight" panose="020B0502040204020203" pitchFamily="34" charset="0"/>
+              </a:rPr>
               <a:t>iOS:</a:t>
             </a:r>
             <a:r>
-              <a:rPr lang="en-US" dirty="0"/>
+              <a:rPr lang="en-US" sz="2400" dirty="0">
+                <a:latin typeface="Bahnschrift SemiLight" panose="020B0502040204020203" pitchFamily="34" charset="0"/>
+              </a:rPr>
               <a:t> </a:t>
             </a:r>
           </a:p>
@@ -5939,11 +7264,15 @@
               <a:buChar char="•"/>
             </a:pPr>
             <a:r>
-              <a:rPr lang="en-US" b="1" dirty="0"/>
+              <a:rPr lang="en-US" sz="2400" b="1" dirty="0">
+                <a:latin typeface="Bahnschrift SemiLight" panose="020B0502040204020203" pitchFamily="34" charset="0"/>
+              </a:rPr>
               <a:t>Development Tools:</a:t>
             </a:r>
             <a:r>
-              <a:rPr lang="en-US" dirty="0"/>
+              <a:rPr lang="en-US" sz="2400" dirty="0">
+                <a:latin typeface="Bahnschrift SemiLight" panose="020B0502040204020203" pitchFamily="34" charset="0"/>
+              </a:rPr>
               <a:t> Using Xcode with Swift (or Objective-C) for app development.</a:t>
             </a:r>
           </a:p>
@@ -5953,11 +7282,15 @@
               <a:buChar char="•"/>
             </a:pPr>
             <a:r>
-              <a:rPr lang="en-US" b="1" dirty="0"/>
+              <a:rPr lang="en-US" sz="2400" b="1" dirty="0">
+                <a:latin typeface="Bahnschrift SemiLight" panose="020B0502040204020203" pitchFamily="34" charset="0"/>
+              </a:rPr>
               <a:t>Design Principles:</a:t>
             </a:r>
             <a:r>
-              <a:rPr lang="en-US" dirty="0"/>
+              <a:rPr lang="en-US" sz="2400" dirty="0">
+                <a:latin typeface="Bahnschrift SemiLight" panose="020B0502040204020203" pitchFamily="34" charset="0"/>
+              </a:rPr>
               <a:t> Adhering to iOS design standards and managing app lifecycle events.</a:t>
             </a:r>
           </a:p>
@@ -6257,15 +7590,21 @@
               <a:buNone/>
             </a:pPr>
             <a:r>
-              <a:rPr lang="en-US" dirty="0"/>
+              <a:rPr lang="en-US" dirty="0">
+                <a:latin typeface="Bahnschrift SemiLight" panose="020B0502040204020203" pitchFamily="34" charset="0"/>
+              </a:rPr>
               <a:t>Developing natively for both Android and iOS can be time-consuming and resource-intensive. Cross-platform development allows you to use a </a:t>
             </a:r>
             <a:r>
-              <a:rPr lang="en-US" b="1" dirty="0"/>
+              <a:rPr lang="en-US" b="1" dirty="0">
+                <a:latin typeface="Bahnschrift SemiLight" panose="020B0502040204020203" pitchFamily="34" charset="0"/>
+              </a:rPr>
               <a:t>unified codebase</a:t>
             </a:r>
             <a:r>
-              <a:rPr lang="en-US" dirty="0"/>
+              <a:rPr lang="en-US" dirty="0">
+                <a:latin typeface="Bahnschrift SemiLight" panose="020B0502040204020203" pitchFamily="34" charset="0"/>
+              </a:rPr>
               <a:t> to reduce costs, accelerate development, and improve maintainability — without sacrificing performance or user experience.</a:t>
             </a:r>
           </a:p>
@@ -6273,49 +7612,73 @@
             <a:pPr>
               <a:buNone/>
             </a:pPr>
-            <a:endParaRPr lang="en-US" dirty="0"/>
+            <a:endParaRPr lang="en-US" dirty="0">
+              <a:latin typeface="Bahnschrift SemiLight" panose="020B0502040204020203" pitchFamily="34" charset="0"/>
+            </a:endParaRPr>
           </a:p>
           <a:p>
             <a:pPr marL="15875" indent="0">
               <a:buNone/>
             </a:pPr>
             <a:r>
-              <a:rPr lang="en-US" dirty="0"/>
+              <a:rPr lang="en-US" dirty="0">
+                <a:latin typeface="Bahnschrift SemiLight" panose="020B0502040204020203" pitchFamily="34" charset="0"/>
+              </a:rPr>
               <a:t>Building apps for multiple platforms from a single codebase offers several key benefits:</a:t>
             </a:r>
             <a:br>
-              <a:rPr lang="en-US" dirty="0"/>
+              <a:rPr lang="en-US" dirty="0">
+                <a:latin typeface="Bahnschrift SemiLight" panose="020B0502040204020203" pitchFamily="34" charset="0"/>
+              </a:rPr>
             </a:br>
             <a:r>
-              <a:rPr lang="en-US" dirty="0"/>
+              <a:rPr lang="en-US" dirty="0">
+                <a:latin typeface="Bahnschrift SemiLight" panose="020B0502040204020203" pitchFamily="34" charset="0"/>
+              </a:rPr>
               <a:t>✅ Faster time-to-market with reduced development effort.</a:t>
             </a:r>
             <a:br>
-              <a:rPr lang="en-US" dirty="0"/>
+              <a:rPr lang="en-US" dirty="0">
+                <a:latin typeface="Bahnschrift SemiLight" panose="020B0502040204020203" pitchFamily="34" charset="0"/>
+              </a:rPr>
             </a:br>
             <a:r>
-              <a:rPr lang="en-US" dirty="0"/>
+              <a:rPr lang="en-US" dirty="0">
+                <a:latin typeface="Bahnschrift SemiLight" panose="020B0502040204020203" pitchFamily="34" charset="0"/>
+              </a:rPr>
               <a:t>✅ Lower development and maintenance costs.</a:t>
             </a:r>
             <a:br>
-              <a:rPr lang="en-US" dirty="0"/>
+              <a:rPr lang="en-US" dirty="0">
+                <a:latin typeface="Bahnschrift SemiLight" panose="020B0502040204020203" pitchFamily="34" charset="0"/>
+              </a:rPr>
             </a:br>
             <a:r>
-              <a:rPr lang="en-US" dirty="0"/>
+              <a:rPr lang="en-US" dirty="0">
+                <a:latin typeface="Bahnschrift SemiLight" panose="020B0502040204020203" pitchFamily="34" charset="0"/>
+              </a:rPr>
               <a:t>✅ Consistent user experience across platforms.</a:t>
             </a:r>
             <a:br>
-              <a:rPr lang="en-US" dirty="0"/>
+              <a:rPr lang="en-US" dirty="0">
+                <a:latin typeface="Bahnschrift SemiLight" panose="020B0502040204020203" pitchFamily="34" charset="0"/>
+              </a:rPr>
             </a:br>
             <a:r>
-              <a:rPr lang="en-US" dirty="0"/>
+              <a:rPr lang="en-US" dirty="0">
+                <a:latin typeface="Bahnschrift SemiLight" panose="020B0502040204020203" pitchFamily="34" charset="0"/>
+              </a:rPr>
               <a:t>✅ Ability to leverage native features using plugins and APIs.</a:t>
             </a:r>
             <a:br>
-              <a:rPr lang="en-US" dirty="0"/>
+              <a:rPr lang="en-US" dirty="0">
+                <a:latin typeface="Bahnschrift SemiLight" panose="020B0502040204020203" pitchFamily="34" charset="0"/>
+              </a:rPr>
             </a:br>
             <a:r>
-              <a:rPr lang="en-US" dirty="0"/>
+              <a:rPr lang="en-US" dirty="0">
+                <a:latin typeface="Bahnschrift SemiLight" panose="020B0502040204020203" pitchFamily="34" charset="0"/>
+              </a:rPr>
               <a:t>✅ Easier updates and feature rollouts.</a:t>
             </a:r>
           </a:p>
@@ -6402,8 +7765,8 @@
         </p:nvSpPr>
         <p:spPr>
           <a:xfrm>
-            <a:off x="419100" y="2131458"/>
-            <a:ext cx="5054600" cy="4361417"/>
+            <a:off x="129988" y="1690688"/>
+            <a:ext cx="5867400" cy="4361417"/>
           </a:xfrm>
           <a:prstGeom prst="rect">
             <a:avLst/>
@@ -6411,7 +7774,7 @@
         </p:spPr>
         <p:txBody>
           <a:bodyPr vert="horz" lIns="91440" tIns="45720" rIns="91440" bIns="45720" rtlCol="0">
-            <a:normAutofit fontScale="92500" lnSpcReduction="10000"/>
+            <a:noAutofit/>
           </a:bodyPr>
           <a:lstStyle>
             <a:lvl1pPr marL="368300" indent="-352425" algn="l" defTabSz="914400" rtl="0" eaLnBrk="1" latinLnBrk="0" hangingPunct="1">
@@ -6615,7 +7978,9 @@
               <a:buNone/>
             </a:pPr>
             <a:r>
-              <a:rPr lang="en-US" b="1" dirty="0"/>
+              <a:rPr lang="en-US" b="1" dirty="0">
+                <a:latin typeface="Bahnschrift SemiLight" panose="020B0502040204020203" pitchFamily="34" charset="0"/>
+              </a:rPr>
               <a:t>Unified Codebase</a:t>
             </a:r>
           </a:p>
@@ -6624,7 +7989,9 @@
               <a:buNone/>
             </a:pPr>
             <a:r>
-              <a:rPr lang="en-US" dirty="0"/>
+              <a:rPr lang="en-US" dirty="0">
+                <a:latin typeface="Bahnschrift SemiLight" panose="020B0502040204020203" pitchFamily="34" charset="0"/>
+              </a:rPr>
               <a:t>Instead of maintaining two separate codebases for Android (Java/Kotlin) and iOS (Objective-C/Swift), cross-platform frameworks enable developers to write code once and run it on both platforms.</a:t>
             </a:r>
           </a:p>
@@ -6633,22 +8000,30 @@
               <a:buNone/>
             </a:pPr>
             <a:r>
-              <a:rPr lang="en-US" dirty="0"/>
+              <a:rPr lang="en-US" dirty="0">
+                <a:latin typeface="Bahnschrift SemiLight" panose="020B0502040204020203" pitchFamily="34" charset="0"/>
+              </a:rPr>
               <a:t>✅ </a:t>
             </a:r>
             <a:r>
-              <a:rPr lang="en-US" b="1" dirty="0"/>
+              <a:rPr lang="en-US" b="1" dirty="0">
+                <a:latin typeface="Bahnschrift SemiLight" panose="020B0502040204020203" pitchFamily="34" charset="0"/>
+              </a:rPr>
               <a:t>Example:</a:t>
             </a:r>
-            <a:endParaRPr lang="en-US" dirty="0"/>
-          </a:p>
-          <a:p>
-            <a:pPr>
-              <a:buFont typeface="Arial" panose="020B0604020202020204" pitchFamily="34" charset="0"/>
-              <a:buChar char="•"/>
-            </a:pPr>
-            <a:r>
-              <a:rPr lang="en-US" dirty="0"/>
+            <a:endParaRPr lang="en-US" dirty="0">
+              <a:latin typeface="Bahnschrift SemiLight" panose="020B0502040204020203" pitchFamily="34" charset="0"/>
+            </a:endParaRPr>
+          </a:p>
+          <a:p>
+            <a:pPr>
+              <a:buFont typeface="Arial" panose="020B0604020202020204" pitchFamily="34" charset="0"/>
+              <a:buChar char="•"/>
+            </a:pPr>
+            <a:r>
+              <a:rPr lang="en-US" dirty="0">
+                <a:latin typeface="Bahnschrift SemiLight" panose="020B0502040204020203" pitchFamily="34" charset="0"/>
+              </a:rPr>
               <a:t>Write a login feature in React Native → Works on both iOS and Android</a:t>
             </a:r>
           </a:p>
@@ -6658,7 +8033,9 @@
               <a:buChar char="•"/>
             </a:pPr>
             <a:r>
-              <a:rPr lang="en-US" dirty="0"/>
+              <a:rPr lang="en-US" dirty="0">
+                <a:latin typeface="Bahnschrift SemiLight" panose="020B0502040204020203" pitchFamily="34" charset="0"/>
+              </a:rPr>
               <a:t>Shared business logic, network requests, and data handling</a:t>
             </a:r>
           </a:p>
@@ -6668,7 +8045,9 @@
               <a:buChar char="•"/>
             </a:pPr>
             <a:r>
-              <a:rPr lang="en-US" dirty="0"/>
+              <a:rPr lang="en-US" dirty="0">
+                <a:latin typeface="Bahnschrift SemiLight" panose="020B0502040204020203" pitchFamily="34" charset="0"/>
+              </a:rPr>
               <a:t>Consistent behavior across platforms</a:t>
             </a:r>
           </a:p>
@@ -6690,8 +8069,8 @@
         </p:nvSpPr>
         <p:spPr>
           <a:xfrm>
-            <a:off x="6223000" y="2252108"/>
-            <a:ext cx="5054600" cy="4361417"/>
+            <a:off x="5853206" y="1768014"/>
+            <a:ext cx="6338794" cy="4361417"/>
           </a:xfrm>
           <a:prstGeom prst="rect">
             <a:avLst/>
@@ -6699,7 +8078,7 @@
         </p:spPr>
         <p:txBody>
           <a:bodyPr vert="horz" lIns="91440" tIns="45720" rIns="91440" bIns="45720" rtlCol="0">
-            <a:normAutofit fontScale="92500" lnSpcReduction="20000"/>
+            <a:noAutofit/>
           </a:bodyPr>
           <a:lstStyle>
             <a:lvl1pPr marL="368300" indent="-352425" algn="l" defTabSz="914400" rtl="0" eaLnBrk="1" latinLnBrk="0" hangingPunct="1">
@@ -6903,117 +8282,173 @@
               <a:buNone/>
             </a:pPr>
             <a:r>
-              <a:rPr lang="hr-HR" b="1" dirty="0" err="1"/>
+              <a:rPr lang="hr-HR" b="1" dirty="0" err="1">
+                <a:latin typeface="Bahnschrift SemiLight" panose="020B0502040204020203" pitchFamily="34" charset="0"/>
+              </a:rPr>
               <a:t>Consistency</a:t>
             </a:r>
-            <a:endParaRPr lang="hr-HR" b="1" dirty="0"/>
+            <a:endParaRPr lang="hr-HR" b="1" dirty="0">
+              <a:latin typeface="Bahnschrift SemiLight" panose="020B0502040204020203" pitchFamily="34" charset="0"/>
+            </a:endParaRPr>
           </a:p>
           <a:p>
             <a:pPr>
               <a:buNone/>
             </a:pPr>
             <a:r>
-              <a:rPr lang="hr-HR" dirty="0" err="1"/>
+              <a:rPr lang="hr-HR" dirty="0" err="1">
+                <a:latin typeface="Bahnschrift SemiLight" panose="020B0502040204020203" pitchFamily="34" charset="0"/>
+              </a:rPr>
               <a:t>Maintaining</a:t>
             </a:r>
             <a:r>
-              <a:rPr lang="hr-HR" dirty="0"/>
+              <a:rPr lang="hr-HR" dirty="0">
+                <a:latin typeface="Bahnschrift SemiLight" panose="020B0502040204020203" pitchFamily="34" charset="0"/>
+              </a:rPr>
               <a:t> a </a:t>
             </a:r>
             <a:r>
-              <a:rPr lang="hr-HR" dirty="0" err="1"/>
+              <a:rPr lang="hr-HR" dirty="0" err="1">
+                <a:latin typeface="Bahnschrift SemiLight" panose="020B0502040204020203" pitchFamily="34" charset="0"/>
+              </a:rPr>
               <a:t>consistent</a:t>
             </a:r>
             <a:r>
-              <a:rPr lang="hr-HR" dirty="0"/>
+              <a:rPr lang="hr-HR" dirty="0">
+                <a:latin typeface="Bahnschrift SemiLight" panose="020B0502040204020203" pitchFamily="34" charset="0"/>
+              </a:rPr>
               <a:t> UI </a:t>
             </a:r>
             <a:r>
-              <a:rPr lang="hr-HR" dirty="0" err="1"/>
+              <a:rPr lang="hr-HR" dirty="0" err="1">
+                <a:latin typeface="Bahnschrift SemiLight" panose="020B0502040204020203" pitchFamily="34" charset="0"/>
+              </a:rPr>
               <a:t>and</a:t>
             </a:r>
             <a:r>
-              <a:rPr lang="hr-HR" dirty="0"/>
-              <a:t> </a:t>
-            </a:r>
-            <a:r>
-              <a:rPr lang="hr-HR" dirty="0" err="1"/>
+              <a:rPr lang="hr-HR" dirty="0">
+                <a:latin typeface="Bahnschrift SemiLight" panose="020B0502040204020203" pitchFamily="34" charset="0"/>
+              </a:rPr>
+              <a:t> </a:t>
+            </a:r>
+            <a:r>
+              <a:rPr lang="hr-HR" dirty="0" err="1">
+                <a:latin typeface="Bahnschrift SemiLight" panose="020B0502040204020203" pitchFamily="34" charset="0"/>
+              </a:rPr>
               <a:t>user</a:t>
             </a:r>
             <a:r>
-              <a:rPr lang="hr-HR" dirty="0"/>
-              <a:t> </a:t>
-            </a:r>
-            <a:r>
-              <a:rPr lang="hr-HR" dirty="0" err="1"/>
+              <a:rPr lang="hr-HR" dirty="0">
+                <a:latin typeface="Bahnschrift SemiLight" panose="020B0502040204020203" pitchFamily="34" charset="0"/>
+              </a:rPr>
+              <a:t> </a:t>
+            </a:r>
+            <a:r>
+              <a:rPr lang="hr-HR" dirty="0" err="1">
+                <a:latin typeface="Bahnschrift SemiLight" panose="020B0502040204020203" pitchFamily="34" charset="0"/>
+              </a:rPr>
               <a:t>experience</a:t>
             </a:r>
             <a:r>
-              <a:rPr lang="hr-HR" dirty="0"/>
-              <a:t> </a:t>
-            </a:r>
-            <a:r>
-              <a:rPr lang="hr-HR" dirty="0" err="1"/>
+              <a:rPr lang="hr-HR" dirty="0">
+                <a:latin typeface="Bahnschrift SemiLight" panose="020B0502040204020203" pitchFamily="34" charset="0"/>
+              </a:rPr>
+              <a:t> </a:t>
+            </a:r>
+            <a:r>
+              <a:rPr lang="hr-HR" dirty="0" err="1">
+                <a:latin typeface="Bahnschrift SemiLight" panose="020B0502040204020203" pitchFamily="34" charset="0"/>
+              </a:rPr>
               <a:t>across</a:t>
             </a:r>
             <a:r>
-              <a:rPr lang="hr-HR" dirty="0"/>
-              <a:t> </a:t>
-            </a:r>
-            <a:r>
-              <a:rPr lang="hr-HR" dirty="0" err="1"/>
+              <a:rPr lang="hr-HR" dirty="0">
+                <a:latin typeface="Bahnschrift SemiLight" panose="020B0502040204020203" pitchFamily="34" charset="0"/>
+              </a:rPr>
+              <a:t> </a:t>
+            </a:r>
+            <a:r>
+              <a:rPr lang="hr-HR" dirty="0" err="1">
+                <a:latin typeface="Bahnschrift SemiLight" panose="020B0502040204020203" pitchFamily="34" charset="0"/>
+              </a:rPr>
               <a:t>platforms</a:t>
             </a:r>
             <a:r>
-              <a:rPr lang="hr-HR" dirty="0"/>
-              <a:t> </a:t>
-            </a:r>
-            <a:r>
-              <a:rPr lang="hr-HR" dirty="0" err="1"/>
+              <a:rPr lang="hr-HR" dirty="0">
+                <a:latin typeface="Bahnschrift SemiLight" panose="020B0502040204020203" pitchFamily="34" charset="0"/>
+              </a:rPr>
+              <a:t> </a:t>
+            </a:r>
+            <a:r>
+              <a:rPr lang="hr-HR" dirty="0" err="1">
+                <a:latin typeface="Bahnschrift SemiLight" panose="020B0502040204020203" pitchFamily="34" charset="0"/>
+              </a:rPr>
               <a:t>is</a:t>
             </a:r>
             <a:r>
-              <a:rPr lang="hr-HR" dirty="0"/>
-              <a:t> </a:t>
-            </a:r>
-            <a:r>
-              <a:rPr lang="hr-HR" dirty="0" err="1"/>
+              <a:rPr lang="hr-HR" dirty="0">
+                <a:latin typeface="Bahnschrift SemiLight" panose="020B0502040204020203" pitchFamily="34" charset="0"/>
+              </a:rPr>
+              <a:t> </a:t>
+            </a:r>
+            <a:r>
+              <a:rPr lang="hr-HR" dirty="0" err="1">
+                <a:latin typeface="Bahnschrift SemiLight" panose="020B0502040204020203" pitchFamily="34" charset="0"/>
+              </a:rPr>
               <a:t>critical</a:t>
             </a:r>
             <a:r>
-              <a:rPr lang="hr-HR" dirty="0"/>
+              <a:rPr lang="hr-HR" dirty="0">
+                <a:latin typeface="Bahnschrift SemiLight" panose="020B0502040204020203" pitchFamily="34" charset="0"/>
+              </a:rPr>
               <a:t> for </a:t>
             </a:r>
             <a:r>
-              <a:rPr lang="hr-HR" dirty="0" err="1"/>
+              <a:rPr lang="hr-HR" dirty="0" err="1">
+                <a:latin typeface="Bahnschrift SemiLight" panose="020B0502040204020203" pitchFamily="34" charset="0"/>
+              </a:rPr>
               <a:t>user</a:t>
             </a:r>
             <a:r>
-              <a:rPr lang="hr-HR" dirty="0"/>
-              <a:t> </a:t>
-            </a:r>
-            <a:r>
-              <a:rPr lang="hr-HR" dirty="0" err="1"/>
+              <a:rPr lang="hr-HR" dirty="0">
+                <a:latin typeface="Bahnschrift SemiLight" panose="020B0502040204020203" pitchFamily="34" charset="0"/>
+              </a:rPr>
+              <a:t> </a:t>
+            </a:r>
+            <a:r>
+              <a:rPr lang="hr-HR" dirty="0" err="1">
+                <a:latin typeface="Bahnschrift SemiLight" panose="020B0502040204020203" pitchFamily="34" charset="0"/>
+              </a:rPr>
               <a:t>retention</a:t>
             </a:r>
             <a:r>
-              <a:rPr lang="hr-HR" dirty="0"/>
-              <a:t> </a:t>
-            </a:r>
-            <a:r>
-              <a:rPr lang="hr-HR" dirty="0" err="1"/>
+              <a:rPr lang="hr-HR" dirty="0">
+                <a:latin typeface="Bahnschrift SemiLight" panose="020B0502040204020203" pitchFamily="34" charset="0"/>
+              </a:rPr>
+              <a:t> </a:t>
+            </a:r>
+            <a:r>
+              <a:rPr lang="hr-HR" dirty="0" err="1">
+                <a:latin typeface="Bahnschrift SemiLight" panose="020B0502040204020203" pitchFamily="34" charset="0"/>
+              </a:rPr>
               <a:t>and</a:t>
             </a:r>
             <a:r>
-              <a:rPr lang="hr-HR" dirty="0"/>
-              <a:t> </a:t>
-            </a:r>
-            <a:r>
-              <a:rPr lang="hr-HR" dirty="0" err="1"/>
+              <a:rPr lang="hr-HR" dirty="0">
+                <a:latin typeface="Bahnschrift SemiLight" panose="020B0502040204020203" pitchFamily="34" charset="0"/>
+              </a:rPr>
+              <a:t> </a:t>
+            </a:r>
+            <a:r>
+              <a:rPr lang="hr-HR" dirty="0" err="1">
+                <a:latin typeface="Bahnschrift SemiLight" panose="020B0502040204020203" pitchFamily="34" charset="0"/>
+              </a:rPr>
               <a:t>satisfaction</a:t>
             </a:r>
             <a:r>
-              <a:rPr lang="hr-HR" dirty="0"/>
+              <a:rPr lang="hr-HR" dirty="0">
+                <a:latin typeface="Bahnschrift SemiLight" panose="020B0502040204020203" pitchFamily="34" charset="0"/>
+              </a:rPr>
               <a:t>.</a:t>
             </a:r>
           </a:p>
@@ -7022,207 +8457,305 @@
               <a:buNone/>
             </a:pPr>
             <a:r>
-              <a:rPr lang="hr-HR" dirty="0"/>
+              <a:rPr lang="hr-HR" dirty="0">
+                <a:latin typeface="Bahnschrift SemiLight" panose="020B0502040204020203" pitchFamily="34" charset="0"/>
+              </a:rPr>
               <a:t>✅ </a:t>
             </a:r>
             <a:r>
-              <a:rPr lang="hr-HR" b="1" dirty="0" err="1"/>
+              <a:rPr lang="hr-HR" b="1" dirty="0" err="1">
+                <a:latin typeface="Bahnschrift SemiLight" panose="020B0502040204020203" pitchFamily="34" charset="0"/>
+              </a:rPr>
               <a:t>Example</a:t>
             </a:r>
             <a:r>
-              <a:rPr lang="hr-HR" b="1" dirty="0"/>
+              <a:rPr lang="hr-HR" b="1" dirty="0">
+                <a:latin typeface="Bahnschrift SemiLight" panose="020B0502040204020203" pitchFamily="34" charset="0"/>
+              </a:rPr>
               <a:t>:</a:t>
             </a:r>
-            <a:endParaRPr lang="hr-HR" dirty="0"/>
-          </a:p>
-          <a:p>
-            <a:pPr>
-              <a:buFont typeface="Arial" panose="020B0604020202020204" pitchFamily="34" charset="0"/>
-              <a:buChar char="•"/>
-            </a:pPr>
-            <a:r>
-              <a:rPr lang="hr-HR" dirty="0" err="1"/>
+            <a:endParaRPr lang="hr-HR" dirty="0">
+              <a:latin typeface="Bahnschrift SemiLight" panose="020B0502040204020203" pitchFamily="34" charset="0"/>
+            </a:endParaRPr>
+          </a:p>
+          <a:p>
+            <a:pPr>
+              <a:buFont typeface="Arial" panose="020B0604020202020204" pitchFamily="34" charset="0"/>
+              <a:buChar char="•"/>
+            </a:pPr>
+            <a:r>
+              <a:rPr lang="hr-HR" dirty="0" err="1">
+                <a:latin typeface="Bahnschrift SemiLight" panose="020B0502040204020203" pitchFamily="34" charset="0"/>
+              </a:rPr>
               <a:t>Material</a:t>
             </a:r>
             <a:r>
-              <a:rPr lang="hr-HR" dirty="0"/>
+              <a:rPr lang="hr-HR" dirty="0">
+                <a:latin typeface="Bahnschrift SemiLight" panose="020B0502040204020203" pitchFamily="34" charset="0"/>
+              </a:rPr>
               <a:t> Design </a:t>
             </a:r>
             <a:r>
-              <a:rPr lang="hr-HR" dirty="0" err="1"/>
+              <a:rPr lang="hr-HR" dirty="0" err="1">
+                <a:latin typeface="Bahnschrift SemiLight" panose="020B0502040204020203" pitchFamily="34" charset="0"/>
+              </a:rPr>
               <a:t>components</a:t>
             </a:r>
             <a:r>
-              <a:rPr lang="hr-HR" dirty="0"/>
+              <a:rPr lang="hr-HR" dirty="0">
+                <a:latin typeface="Bahnschrift SemiLight" panose="020B0502040204020203" pitchFamily="34" charset="0"/>
+              </a:rPr>
               <a:t> on Android → </a:t>
             </a:r>
             <a:r>
-              <a:rPr lang="hr-HR" dirty="0" err="1"/>
+              <a:rPr lang="hr-HR" dirty="0" err="1">
+                <a:latin typeface="Bahnschrift SemiLight" panose="020B0502040204020203" pitchFamily="34" charset="0"/>
+              </a:rPr>
               <a:t>Cupertino</a:t>
             </a:r>
             <a:r>
-              <a:rPr lang="hr-HR" dirty="0"/>
-              <a:t> </a:t>
-            </a:r>
-            <a:r>
-              <a:rPr lang="hr-HR" dirty="0" err="1"/>
+              <a:rPr lang="hr-HR" dirty="0">
+                <a:latin typeface="Bahnschrift SemiLight" panose="020B0502040204020203" pitchFamily="34" charset="0"/>
+              </a:rPr>
+              <a:t> </a:t>
+            </a:r>
+            <a:r>
+              <a:rPr lang="hr-HR" dirty="0" err="1">
+                <a:latin typeface="Bahnschrift SemiLight" panose="020B0502040204020203" pitchFamily="34" charset="0"/>
+              </a:rPr>
               <a:t>components</a:t>
             </a:r>
             <a:r>
-              <a:rPr lang="hr-HR" dirty="0"/>
+              <a:rPr lang="hr-HR" dirty="0">
+                <a:latin typeface="Bahnschrift SemiLight" panose="020B0502040204020203" pitchFamily="34" charset="0"/>
+              </a:rPr>
               <a:t> on </a:t>
             </a:r>
             <a:r>
-              <a:rPr lang="hr-HR" dirty="0" err="1"/>
+              <a:rPr lang="hr-HR" dirty="0" err="1">
+                <a:latin typeface="Bahnschrift SemiLight" panose="020B0502040204020203" pitchFamily="34" charset="0"/>
+              </a:rPr>
               <a:t>iOS</a:t>
             </a:r>
-            <a:endParaRPr lang="hr-HR" dirty="0"/>
-          </a:p>
-          <a:p>
-            <a:pPr>
-              <a:buFont typeface="Arial" panose="020B0604020202020204" pitchFamily="34" charset="0"/>
-              <a:buChar char="•"/>
-            </a:pPr>
-            <a:r>
-              <a:rPr lang="hr-HR" dirty="0"/>
+            <a:endParaRPr lang="hr-HR" dirty="0">
+              <a:latin typeface="Bahnschrift SemiLight" panose="020B0502040204020203" pitchFamily="34" charset="0"/>
+            </a:endParaRPr>
+          </a:p>
+          <a:p>
+            <a:pPr>
+              <a:buFont typeface="Arial" panose="020B0604020202020204" pitchFamily="34" charset="0"/>
+              <a:buChar char="•"/>
+            </a:pPr>
+            <a:r>
+              <a:rPr lang="hr-HR" dirty="0">
+                <a:latin typeface="Bahnschrift SemiLight" panose="020B0502040204020203" pitchFamily="34" charset="0"/>
+              </a:rPr>
               <a:t>Cross-</a:t>
             </a:r>
             <a:r>
-              <a:rPr lang="hr-HR" dirty="0" err="1"/>
+              <a:rPr lang="hr-HR" dirty="0" err="1">
+                <a:latin typeface="Bahnschrift SemiLight" panose="020B0502040204020203" pitchFamily="34" charset="0"/>
+              </a:rPr>
               <a:t>platform</a:t>
             </a:r>
             <a:r>
-              <a:rPr lang="hr-HR" dirty="0"/>
-              <a:t> </a:t>
-            </a:r>
-            <a:r>
-              <a:rPr lang="hr-HR" dirty="0" err="1"/>
+              <a:rPr lang="hr-HR" dirty="0">
+                <a:latin typeface="Bahnschrift SemiLight" panose="020B0502040204020203" pitchFamily="34" charset="0"/>
+              </a:rPr>
+              <a:t> </a:t>
+            </a:r>
+            <a:r>
+              <a:rPr lang="hr-HR" dirty="0" err="1">
+                <a:latin typeface="Bahnschrift SemiLight" panose="020B0502040204020203" pitchFamily="34" charset="0"/>
+              </a:rPr>
               <a:t>frameworks</a:t>
             </a:r>
             <a:r>
-              <a:rPr lang="hr-HR" dirty="0"/>
-              <a:t> </a:t>
-            </a:r>
-            <a:r>
-              <a:rPr lang="hr-HR" dirty="0" err="1"/>
+              <a:rPr lang="hr-HR" dirty="0">
+                <a:latin typeface="Bahnschrift SemiLight" panose="020B0502040204020203" pitchFamily="34" charset="0"/>
+              </a:rPr>
+              <a:t> </a:t>
+            </a:r>
+            <a:r>
+              <a:rPr lang="hr-HR" dirty="0" err="1">
+                <a:latin typeface="Bahnschrift SemiLight" panose="020B0502040204020203" pitchFamily="34" charset="0"/>
+              </a:rPr>
               <a:t>automatically</a:t>
             </a:r>
             <a:r>
-              <a:rPr lang="hr-HR" dirty="0"/>
-              <a:t> </a:t>
-            </a:r>
-            <a:r>
-              <a:rPr lang="hr-HR" dirty="0" err="1"/>
+              <a:rPr lang="hr-HR" dirty="0">
+                <a:latin typeface="Bahnschrift SemiLight" panose="020B0502040204020203" pitchFamily="34" charset="0"/>
+              </a:rPr>
+              <a:t> </a:t>
+            </a:r>
+            <a:r>
+              <a:rPr lang="hr-HR" dirty="0" err="1">
+                <a:latin typeface="Bahnschrift SemiLight" panose="020B0502040204020203" pitchFamily="34" charset="0"/>
+              </a:rPr>
               <a:t>adapt</a:t>
             </a:r>
             <a:r>
-              <a:rPr lang="hr-HR" dirty="0"/>
+              <a:rPr lang="hr-HR" dirty="0">
+                <a:latin typeface="Bahnschrift SemiLight" panose="020B0502040204020203" pitchFamily="34" charset="0"/>
+              </a:rPr>
               <a:t> UI to </a:t>
             </a:r>
             <a:r>
-              <a:rPr lang="hr-HR" dirty="0" err="1"/>
+              <a:rPr lang="hr-HR" dirty="0" err="1">
+                <a:latin typeface="Bahnschrift SemiLight" panose="020B0502040204020203" pitchFamily="34" charset="0"/>
+              </a:rPr>
               <a:t>platform</a:t>
             </a:r>
             <a:r>
-              <a:rPr lang="hr-HR" dirty="0"/>
-              <a:t> </a:t>
-            </a:r>
-            <a:r>
-              <a:rPr lang="hr-HR" dirty="0" err="1"/>
+              <a:rPr lang="hr-HR" dirty="0">
+                <a:latin typeface="Bahnschrift SemiLight" panose="020B0502040204020203" pitchFamily="34" charset="0"/>
+              </a:rPr>
+              <a:t> </a:t>
+            </a:r>
+            <a:r>
+              <a:rPr lang="hr-HR" dirty="0" err="1">
+                <a:latin typeface="Bahnschrift SemiLight" panose="020B0502040204020203" pitchFamily="34" charset="0"/>
+              </a:rPr>
               <a:t>guidelines</a:t>
             </a:r>
-            <a:endParaRPr lang="hr-HR" dirty="0"/>
-          </a:p>
-          <a:p>
-            <a:pPr>
-              <a:buFont typeface="Arial" panose="020B0604020202020204" pitchFamily="34" charset="0"/>
-              <a:buChar char="•"/>
-            </a:pPr>
-            <a:r>
-              <a:rPr lang="hr-HR" dirty="0" err="1"/>
+            <a:endParaRPr lang="hr-HR" dirty="0">
+              <a:latin typeface="Bahnschrift SemiLight" panose="020B0502040204020203" pitchFamily="34" charset="0"/>
+            </a:endParaRPr>
+          </a:p>
+          <a:p>
+            <a:pPr>
+              <a:buFont typeface="Arial" panose="020B0604020202020204" pitchFamily="34" charset="0"/>
+              <a:buChar char="•"/>
+            </a:pPr>
+            <a:r>
+              <a:rPr lang="hr-HR" dirty="0" err="1">
+                <a:latin typeface="Bahnschrift SemiLight" panose="020B0502040204020203" pitchFamily="34" charset="0"/>
+              </a:rPr>
               <a:t>Platform-specific</a:t>
             </a:r>
             <a:r>
-              <a:rPr lang="hr-HR" dirty="0"/>
-              <a:t> </a:t>
-            </a:r>
-            <a:r>
-              <a:rPr lang="hr-HR" dirty="0" err="1"/>
+              <a:rPr lang="hr-HR" dirty="0">
+                <a:latin typeface="Bahnschrift SemiLight" panose="020B0502040204020203" pitchFamily="34" charset="0"/>
+              </a:rPr>
+              <a:t> </a:t>
+            </a:r>
+            <a:r>
+              <a:rPr lang="hr-HR" dirty="0" err="1">
+                <a:latin typeface="Bahnschrift SemiLight" panose="020B0502040204020203" pitchFamily="34" charset="0"/>
+              </a:rPr>
               <a:t>gestures</a:t>
             </a:r>
             <a:r>
-              <a:rPr lang="hr-HR" dirty="0"/>
+              <a:rPr lang="hr-HR" dirty="0">
+                <a:latin typeface="Bahnschrift SemiLight" panose="020B0502040204020203" pitchFamily="34" charset="0"/>
+              </a:rPr>
               <a:t> (</a:t>
             </a:r>
             <a:r>
-              <a:rPr lang="hr-HR" dirty="0" err="1"/>
+              <a:rPr lang="hr-HR" dirty="0" err="1">
+                <a:latin typeface="Bahnschrift SemiLight" panose="020B0502040204020203" pitchFamily="34" charset="0"/>
+              </a:rPr>
               <a:t>like</a:t>
             </a:r>
             <a:r>
-              <a:rPr lang="hr-HR" dirty="0"/>
-              <a:t> </a:t>
-            </a:r>
-            <a:r>
-              <a:rPr lang="hr-HR" dirty="0" err="1"/>
+              <a:rPr lang="hr-HR" dirty="0">
+                <a:latin typeface="Bahnschrift SemiLight" panose="020B0502040204020203" pitchFamily="34" charset="0"/>
+              </a:rPr>
+              <a:t> </a:t>
+            </a:r>
+            <a:r>
+              <a:rPr lang="hr-HR" dirty="0" err="1">
+                <a:latin typeface="Bahnschrift SemiLight" panose="020B0502040204020203" pitchFamily="34" charset="0"/>
+              </a:rPr>
               <a:t>swiping</a:t>
             </a:r>
             <a:r>
-              <a:rPr lang="hr-HR" dirty="0"/>
-              <a:t> </a:t>
-            </a:r>
-            <a:r>
-              <a:rPr lang="hr-HR" dirty="0" err="1"/>
+              <a:rPr lang="hr-HR" dirty="0">
+                <a:latin typeface="Bahnschrift SemiLight" panose="020B0502040204020203" pitchFamily="34" charset="0"/>
+              </a:rPr>
+              <a:t> </a:t>
+            </a:r>
+            <a:r>
+              <a:rPr lang="hr-HR" dirty="0" err="1">
+                <a:latin typeface="Bahnschrift SemiLight" panose="020B0502040204020203" pitchFamily="34" charset="0"/>
+              </a:rPr>
               <a:t>or</a:t>
             </a:r>
             <a:r>
-              <a:rPr lang="hr-HR" dirty="0"/>
-              <a:t> </a:t>
-            </a:r>
-            <a:r>
-              <a:rPr lang="hr-HR" dirty="0" err="1"/>
+              <a:rPr lang="hr-HR" dirty="0">
+                <a:latin typeface="Bahnschrift SemiLight" panose="020B0502040204020203" pitchFamily="34" charset="0"/>
+              </a:rPr>
+              <a:t> </a:t>
+            </a:r>
+            <a:r>
+              <a:rPr lang="hr-HR" dirty="0" err="1">
+                <a:latin typeface="Bahnschrift SemiLight" panose="020B0502040204020203" pitchFamily="34" charset="0"/>
+              </a:rPr>
               <a:t>haptic</a:t>
             </a:r>
             <a:r>
-              <a:rPr lang="hr-HR" dirty="0"/>
-              <a:t> </a:t>
-            </a:r>
-            <a:r>
-              <a:rPr lang="hr-HR" dirty="0" err="1"/>
+              <a:rPr lang="hr-HR" dirty="0">
+                <a:latin typeface="Bahnschrift SemiLight" panose="020B0502040204020203" pitchFamily="34" charset="0"/>
+              </a:rPr>
+              <a:t> </a:t>
+            </a:r>
+            <a:r>
+              <a:rPr lang="hr-HR" dirty="0" err="1">
+                <a:latin typeface="Bahnschrift SemiLight" panose="020B0502040204020203" pitchFamily="34" charset="0"/>
+              </a:rPr>
               <a:t>feedback</a:t>
             </a:r>
             <a:r>
-              <a:rPr lang="hr-HR" dirty="0"/>
+              <a:rPr lang="hr-HR" dirty="0">
+                <a:latin typeface="Bahnschrift SemiLight" panose="020B0502040204020203" pitchFamily="34" charset="0"/>
+              </a:rPr>
               <a:t>) </a:t>
             </a:r>
             <a:r>
-              <a:rPr lang="hr-HR" dirty="0" err="1"/>
+              <a:rPr lang="hr-HR" dirty="0" err="1">
+                <a:latin typeface="Bahnschrift SemiLight" panose="020B0502040204020203" pitchFamily="34" charset="0"/>
+              </a:rPr>
               <a:t>handled</a:t>
             </a:r>
             <a:r>
-              <a:rPr lang="hr-HR" dirty="0"/>
-              <a:t> </a:t>
-            </a:r>
-            <a:r>
-              <a:rPr lang="hr-HR" dirty="0" err="1"/>
+              <a:rPr lang="hr-HR" dirty="0">
+                <a:latin typeface="Bahnschrift SemiLight" panose="020B0502040204020203" pitchFamily="34" charset="0"/>
+              </a:rPr>
+              <a:t> </a:t>
+            </a:r>
+            <a:r>
+              <a:rPr lang="hr-HR" dirty="0" err="1">
+                <a:latin typeface="Bahnschrift SemiLight" panose="020B0502040204020203" pitchFamily="34" charset="0"/>
+              </a:rPr>
               <a:t>by</a:t>
             </a:r>
             <a:r>
-              <a:rPr lang="hr-HR" dirty="0"/>
-              <a:t> </a:t>
-            </a:r>
-            <a:r>
-              <a:rPr lang="hr-HR" dirty="0" err="1"/>
+              <a:rPr lang="hr-HR" dirty="0">
+                <a:latin typeface="Bahnschrift SemiLight" panose="020B0502040204020203" pitchFamily="34" charset="0"/>
+              </a:rPr>
+              <a:t> </a:t>
+            </a:r>
+            <a:r>
+              <a:rPr lang="hr-HR" dirty="0" err="1">
+                <a:latin typeface="Bahnschrift SemiLight" panose="020B0502040204020203" pitchFamily="34" charset="0"/>
+              </a:rPr>
               <a:t>the</a:t>
             </a:r>
             <a:r>
-              <a:rPr lang="hr-HR" dirty="0"/>
-              <a:t> </a:t>
-            </a:r>
-            <a:r>
-              <a:rPr lang="hr-HR" dirty="0" err="1"/>
+              <a:rPr lang="hr-HR" dirty="0">
+                <a:latin typeface="Bahnschrift SemiLight" panose="020B0502040204020203" pitchFamily="34" charset="0"/>
+              </a:rPr>
+              <a:t> </a:t>
+            </a:r>
+            <a:r>
+              <a:rPr lang="hr-HR" dirty="0" err="1">
+                <a:latin typeface="Bahnschrift SemiLight" panose="020B0502040204020203" pitchFamily="34" charset="0"/>
+              </a:rPr>
               <a:t>framework</a:t>
             </a:r>
-            <a:endParaRPr lang="hr-HR" dirty="0"/>
+            <a:endParaRPr lang="hr-HR" dirty="0">
+              <a:latin typeface="Bahnschrift SemiLight" panose="020B0502040204020203" pitchFamily="34" charset="0"/>
+            </a:endParaRPr>
           </a:p>
         </p:txBody>
       </p:sp>
@@ -7240,6 +8773,942 @@
 </file>
 
 <file path=ppt/slides/slide5.xml><?xml version="1.0" encoding="utf-8"?>
+<p:sld xmlns:a="http://schemas.openxmlformats.org/drawingml/2006/main" xmlns:r="http://schemas.openxmlformats.org/officeDocument/2006/relationships" xmlns:p="http://schemas.openxmlformats.org/presentationml/2006/main">
+  <p:cSld>
+    <p:spTree>
+      <p:nvGrpSpPr>
+        <p:cNvPr id="1" name=""/>
+        <p:cNvGrpSpPr/>
+        <p:nvPr/>
+      </p:nvGrpSpPr>
+      <p:grpSpPr>
+        <a:xfrm>
+          <a:off x="0" y="0"/>
+          <a:ext cx="0" cy="0"/>
+          <a:chOff x="0" y="0"/>
+          <a:chExt cx="0" cy="0"/>
+        </a:xfrm>
+      </p:grpSpPr>
+      <p:sp>
+        <p:nvSpPr>
+          <p:cNvPr id="4" name="Title 3">
+            <a:extLst>
+              <a:ext uri="{FF2B5EF4-FFF2-40B4-BE49-F238E27FC236}">
+                <a16:creationId xmlns:a16="http://schemas.microsoft.com/office/drawing/2014/main" id="{BA7455F3-11AB-8806-63F0-553704DDF386}"/>
+              </a:ext>
+            </a:extLst>
+          </p:cNvPr>
+          <p:cNvSpPr>
+            <a:spLocks noGrp="1"/>
+          </p:cNvSpPr>
+          <p:nvPr>
+            <p:ph type="title"/>
+          </p:nvPr>
+        </p:nvSpPr>
+        <p:spPr/>
+        <p:txBody>
+          <a:bodyPr/>
+          <a:lstStyle/>
+          <a:p>
+            <a:endParaRPr lang="hr-HR"/>
+          </a:p>
+        </p:txBody>
+      </p:sp>
+      <p:sp>
+        <p:nvSpPr>
+          <p:cNvPr id="5" name="Content Placeholder 4">
+            <a:extLst>
+              <a:ext uri="{FF2B5EF4-FFF2-40B4-BE49-F238E27FC236}">
+                <a16:creationId xmlns:a16="http://schemas.microsoft.com/office/drawing/2014/main" id="{C8821DC5-5CE2-84A9-2299-C3B20B72FD62}"/>
+              </a:ext>
+            </a:extLst>
+          </p:cNvPr>
+          <p:cNvSpPr>
+            <a:spLocks noGrp="1"/>
+          </p:cNvSpPr>
+          <p:nvPr>
+            <p:ph idx="1"/>
+          </p:nvPr>
+        </p:nvSpPr>
+        <p:spPr/>
+        <p:txBody>
+          <a:bodyPr/>
+          <a:lstStyle/>
+          <a:p>
+            <a:pPr>
+              <a:buFont typeface="Arial" panose="020B0604020202020204" pitchFamily="34" charset="0"/>
+              <a:buChar char="•"/>
+            </a:pPr>
+            <a:r>
+              <a:rPr lang="en-US" dirty="0"/>
+              <a:t>React Native – Getting Started</a:t>
+            </a:r>
+          </a:p>
+          <a:p>
+            <a:pPr>
+              <a:buFont typeface="Arial" panose="020B0604020202020204" pitchFamily="34" charset="0"/>
+              <a:buChar char="•"/>
+            </a:pPr>
+            <a:r>
+              <a:rPr lang="en-US" dirty="0"/>
+              <a:t>Expo – React Native Tools</a:t>
+            </a:r>
+          </a:p>
+          <a:p>
+            <a:pPr>
+              <a:buFont typeface="Arial" panose="020B0604020202020204" pitchFamily="34" charset="0"/>
+              <a:buChar char="•"/>
+            </a:pPr>
+            <a:r>
+              <a:rPr lang="en-US" i="1" dirty="0"/>
+              <a:t>Learning React Native</a:t>
+            </a:r>
+            <a:r>
+              <a:rPr lang="en-US" dirty="0"/>
+              <a:t> by Bonnie Eisenman</a:t>
+            </a:r>
+          </a:p>
+          <a:p>
+            <a:pPr>
+              <a:buFont typeface="Arial" panose="020B0604020202020204" pitchFamily="34" charset="0"/>
+              <a:buChar char="•"/>
+            </a:pPr>
+            <a:r>
+              <a:rPr lang="en-US" i="1" dirty="0"/>
+              <a:t>React Native in Action</a:t>
+            </a:r>
+            <a:r>
+              <a:rPr lang="en-US" dirty="0"/>
+              <a:t> by Nader Dabit</a:t>
+            </a:r>
+          </a:p>
+          <a:p>
+            <a:pPr>
+              <a:buFont typeface="Arial" panose="020B0604020202020204" pitchFamily="34" charset="0"/>
+              <a:buChar char="•"/>
+            </a:pPr>
+            <a:r>
+              <a:rPr lang="hr-HR" dirty="0"/>
+              <a:t>Microsoft – </a:t>
+            </a:r>
+            <a:r>
+              <a:rPr lang="hr-HR" dirty="0">
+                <a:hlinkClick r:id="rId2"/>
+              </a:rPr>
+              <a:t>Cross-platform Mobile Development Overview</a:t>
+            </a:r>
+            <a:endParaRPr lang="hr-HR" dirty="0"/>
+          </a:p>
+          <a:p>
+            <a:pPr>
+              <a:buFont typeface="Arial" panose="020B0604020202020204" pitchFamily="34" charset="0"/>
+              <a:buChar char="•"/>
+            </a:pPr>
+            <a:r>
+              <a:rPr lang="hr-HR" dirty="0"/>
+              <a:t>Smashing Magazine – “Cross‑Platform Mobile App Development: Pros and Cons”</a:t>
+            </a:r>
+          </a:p>
+          <a:p>
+            <a:pPr>
+              <a:buFont typeface="Arial" panose="020B0604020202020204" pitchFamily="34" charset="0"/>
+              <a:buChar char="•"/>
+            </a:pPr>
+            <a:endParaRPr lang="hr-HR" dirty="0"/>
+          </a:p>
+        </p:txBody>
+      </p:sp>
+    </p:spTree>
+    <p:extLst>
+      <p:ext uri="{BB962C8B-B14F-4D97-AF65-F5344CB8AC3E}">
+        <p14:creationId xmlns:p14="http://schemas.microsoft.com/office/powerpoint/2010/main" val="2558254494"/>
+      </p:ext>
+    </p:extLst>
+  </p:cSld>
+  <p:clrMapOvr>
+    <a:masterClrMapping/>
+  </p:clrMapOvr>
+</p:sld>
+</file>
+
+<file path=ppt/slides/slide6.xml><?xml version="1.0" encoding="utf-8"?>
+<p:sld xmlns:a="http://schemas.openxmlformats.org/drawingml/2006/main" xmlns:r="http://schemas.openxmlformats.org/officeDocument/2006/relationships" xmlns:p="http://schemas.openxmlformats.org/presentationml/2006/main">
+  <p:cSld>
+    <p:spTree>
+      <p:nvGrpSpPr>
+        <p:cNvPr id="1" name="">
+          <a:extLst>
+            <a:ext uri="{FF2B5EF4-FFF2-40B4-BE49-F238E27FC236}">
+              <a16:creationId xmlns:a16="http://schemas.microsoft.com/office/drawing/2014/main" id="{45809995-6542-B4B4-40EE-06CECB9F9070}"/>
+            </a:ext>
+          </a:extLst>
+        </p:cNvPr>
+        <p:cNvGrpSpPr/>
+        <p:nvPr/>
+      </p:nvGrpSpPr>
+      <p:grpSpPr>
+        <a:xfrm>
+          <a:off x="0" y="0"/>
+          <a:ext cx="0" cy="0"/>
+          <a:chOff x="0" y="0"/>
+          <a:chExt cx="0" cy="0"/>
+        </a:xfrm>
+      </p:grpSpPr>
+      <p:sp>
+        <p:nvSpPr>
+          <p:cNvPr id="3" name="Title 2">
+            <a:extLst>
+              <a:ext uri="{FF2B5EF4-FFF2-40B4-BE49-F238E27FC236}">
+                <a16:creationId xmlns:a16="http://schemas.microsoft.com/office/drawing/2014/main" id="{8875DCD5-47EB-3707-D5E6-24970AE83626}"/>
+              </a:ext>
+            </a:extLst>
+          </p:cNvPr>
+          <p:cNvSpPr>
+            <a:spLocks noGrp="1"/>
+          </p:cNvSpPr>
+          <p:nvPr>
+            <p:ph type="title"/>
+          </p:nvPr>
+        </p:nvSpPr>
+        <p:spPr/>
+        <p:txBody>
+          <a:bodyPr/>
+          <a:lstStyle/>
+          <a:p>
+            <a:r>
+              <a:rPr lang="en-US" dirty="0"/>
+              <a:t>MOBILE DEVELOPMENT – TOOLS</a:t>
+            </a:r>
+            <a:endParaRPr lang="hr-HR" dirty="0"/>
+          </a:p>
+        </p:txBody>
+      </p:sp>
+      <p:sp>
+        <p:nvSpPr>
+          <p:cNvPr id="7" name="Content Placeholder 2">
+            <a:extLst>
+              <a:ext uri="{FF2B5EF4-FFF2-40B4-BE49-F238E27FC236}">
+                <a16:creationId xmlns:a16="http://schemas.microsoft.com/office/drawing/2014/main" id="{DAC978AB-379C-DC2E-6ABB-A154B73B2568}"/>
+              </a:ext>
+            </a:extLst>
+          </p:cNvPr>
+          <p:cNvSpPr txBox="1">
+            <a:spLocks/>
+          </p:cNvSpPr>
+          <p:nvPr/>
+        </p:nvSpPr>
+        <p:spPr>
+          <a:xfrm>
+            <a:off x="479798" y="1827779"/>
+            <a:ext cx="10099302" cy="3036322"/>
+          </a:xfrm>
+          <a:prstGeom prst="rect">
+            <a:avLst/>
+          </a:prstGeom>
+        </p:spPr>
+        <p:txBody>
+          <a:bodyPr vert="horz" lIns="91440" tIns="45720" rIns="91440" bIns="45720" rtlCol="0">
+            <a:noAutofit/>
+          </a:bodyPr>
+          <a:lstStyle>
+            <a:lvl1pPr marL="368300" indent="-352425" algn="l" defTabSz="914400" rtl="0" eaLnBrk="1" latinLnBrk="0" hangingPunct="1">
+              <a:lnSpc>
+                <a:spcPct val="90000"/>
+              </a:lnSpc>
+              <a:spcBef>
+                <a:spcPts val="600"/>
+              </a:spcBef>
+              <a:spcAft>
+                <a:spcPts val="600"/>
+              </a:spcAft>
+              <a:buClr>
+                <a:schemeClr val="accent2"/>
+              </a:buClr>
+              <a:buFont typeface="Wingdings" pitchFamily="2" charset="2"/>
+              <a:buChar char="§"/>
+              <a:tabLst/>
+              <a:defRPr sz="2400" kern="1200">
+                <a:solidFill>
+                  <a:schemeClr val="tx1"/>
+                </a:solidFill>
+                <a:latin typeface="+mn-lt"/>
+                <a:ea typeface="Open Sans" panose="020B0606030504020204" pitchFamily="34" charset="0"/>
+                <a:cs typeface="Open Sans" panose="020B0606030504020204" pitchFamily="34" charset="0"/>
+              </a:defRPr>
+            </a:lvl1pPr>
+            <a:lvl2pPr marL="771525" indent="-274638" algn="l" defTabSz="914400" rtl="0" eaLnBrk="1" latinLnBrk="0" hangingPunct="1">
+              <a:lnSpc>
+                <a:spcPct val="90000"/>
+              </a:lnSpc>
+              <a:spcBef>
+                <a:spcPts val="600"/>
+              </a:spcBef>
+              <a:spcAft>
+                <a:spcPts val="600"/>
+              </a:spcAft>
+              <a:buClr>
+                <a:schemeClr val="accent2"/>
+              </a:buClr>
+              <a:buFont typeface="Wingdings" pitchFamily="2" charset="2"/>
+              <a:buChar char="§"/>
+              <a:tabLst/>
+              <a:defRPr sz="2200" kern="1200">
+                <a:solidFill>
+                  <a:schemeClr val="tx1"/>
+                </a:solidFill>
+                <a:latin typeface="+mn-lt"/>
+                <a:ea typeface="Open Sans" panose="020B0606030504020204" pitchFamily="34" charset="0"/>
+                <a:cs typeface="Open Sans" panose="020B0606030504020204" pitchFamily="34" charset="0"/>
+              </a:defRPr>
+            </a:lvl2pPr>
+            <a:lvl3pPr marL="1143000" indent="-228600" algn="l" defTabSz="914400" rtl="0" eaLnBrk="1" latinLnBrk="0" hangingPunct="1">
+              <a:lnSpc>
+                <a:spcPct val="90000"/>
+              </a:lnSpc>
+              <a:spcBef>
+                <a:spcPts val="600"/>
+              </a:spcBef>
+              <a:spcAft>
+                <a:spcPts val="600"/>
+              </a:spcAft>
+              <a:buClr>
+                <a:schemeClr val="accent2"/>
+              </a:buClr>
+              <a:buFont typeface="Wingdings" pitchFamily="2" charset="2"/>
+              <a:buChar char="§"/>
+              <a:defRPr sz="2000" kern="1200">
+                <a:solidFill>
+                  <a:schemeClr val="tx1"/>
+                </a:solidFill>
+                <a:latin typeface="+mn-lt"/>
+                <a:ea typeface="Open Sans" panose="020B0606030504020204" pitchFamily="34" charset="0"/>
+                <a:cs typeface="Open Sans" panose="020B0606030504020204" pitchFamily="34" charset="0"/>
+              </a:defRPr>
+            </a:lvl3pPr>
+            <a:lvl4pPr marL="1600200" indent="-228600" algn="l" defTabSz="914400" rtl="0" eaLnBrk="1" latinLnBrk="0" hangingPunct="1">
+              <a:lnSpc>
+                <a:spcPct val="90000"/>
+              </a:lnSpc>
+              <a:spcBef>
+                <a:spcPts val="600"/>
+              </a:spcBef>
+              <a:spcAft>
+                <a:spcPts val="600"/>
+              </a:spcAft>
+              <a:buClr>
+                <a:schemeClr val="accent2"/>
+              </a:buClr>
+              <a:buFont typeface="Wingdings" pitchFamily="2" charset="2"/>
+              <a:buChar char="§"/>
+              <a:defRPr sz="1800" kern="1200">
+                <a:solidFill>
+                  <a:schemeClr val="tx1"/>
+                </a:solidFill>
+                <a:latin typeface="+mn-lt"/>
+                <a:ea typeface="Open Sans" panose="020B0606030504020204" pitchFamily="34" charset="0"/>
+                <a:cs typeface="Open Sans" panose="020B0606030504020204" pitchFamily="34" charset="0"/>
+              </a:defRPr>
+            </a:lvl4pPr>
+            <a:lvl5pPr marL="1960563" indent="-225425" algn="l" defTabSz="914400" rtl="0" eaLnBrk="1" latinLnBrk="0" hangingPunct="1">
+              <a:lnSpc>
+                <a:spcPct val="90000"/>
+              </a:lnSpc>
+              <a:spcBef>
+                <a:spcPts val="600"/>
+              </a:spcBef>
+              <a:spcAft>
+                <a:spcPts val="600"/>
+              </a:spcAft>
+              <a:buClr>
+                <a:schemeClr val="accent2"/>
+              </a:buClr>
+              <a:buFont typeface="Wingdings" pitchFamily="2" charset="2"/>
+              <a:buChar char="§"/>
+              <a:tabLst/>
+              <a:defRPr sz="1600" kern="1200">
+                <a:solidFill>
+                  <a:schemeClr val="tx1"/>
+                </a:solidFill>
+                <a:latin typeface="+mn-lt"/>
+                <a:ea typeface="Open Sans" panose="020B0606030504020204" pitchFamily="34" charset="0"/>
+                <a:cs typeface="Open Sans" panose="020B0606030504020204" pitchFamily="34" charset="0"/>
+              </a:defRPr>
+            </a:lvl5pPr>
+            <a:lvl6pPr marL="2514600" indent="-228600" algn="l" defTabSz="914400" rtl="0" eaLnBrk="1" latinLnBrk="0" hangingPunct="1">
+              <a:lnSpc>
+                <a:spcPct val="90000"/>
+              </a:lnSpc>
+              <a:spcBef>
+                <a:spcPts val="500"/>
+              </a:spcBef>
+              <a:buFont typeface="Arial" panose="020B0604020202020204" pitchFamily="34" charset="0"/>
+              <a:buChar char="•"/>
+              <a:defRPr sz="1800" kern="1200">
+                <a:solidFill>
+                  <a:schemeClr val="tx1"/>
+                </a:solidFill>
+                <a:latin typeface="+mn-lt"/>
+                <a:ea typeface="+mn-ea"/>
+                <a:cs typeface="+mn-cs"/>
+              </a:defRPr>
+            </a:lvl6pPr>
+            <a:lvl7pPr marL="2971800" indent="-228600" algn="l" defTabSz="914400" rtl="0" eaLnBrk="1" latinLnBrk="0" hangingPunct="1">
+              <a:lnSpc>
+                <a:spcPct val="90000"/>
+              </a:lnSpc>
+              <a:spcBef>
+                <a:spcPts val="500"/>
+              </a:spcBef>
+              <a:buFont typeface="Arial" panose="020B0604020202020204" pitchFamily="34" charset="0"/>
+              <a:buChar char="•"/>
+              <a:defRPr sz="1800" kern="1200">
+                <a:solidFill>
+                  <a:schemeClr val="tx1"/>
+                </a:solidFill>
+                <a:latin typeface="+mn-lt"/>
+                <a:ea typeface="+mn-ea"/>
+                <a:cs typeface="+mn-cs"/>
+              </a:defRPr>
+            </a:lvl7pPr>
+            <a:lvl8pPr marL="3429000" indent="-228600" algn="l" defTabSz="914400" rtl="0" eaLnBrk="1" latinLnBrk="0" hangingPunct="1">
+              <a:lnSpc>
+                <a:spcPct val="90000"/>
+              </a:lnSpc>
+              <a:spcBef>
+                <a:spcPts val="500"/>
+              </a:spcBef>
+              <a:buFont typeface="Arial" panose="020B0604020202020204" pitchFamily="34" charset="0"/>
+              <a:buChar char="•"/>
+              <a:defRPr sz="1800" kern="1200">
+                <a:solidFill>
+                  <a:schemeClr val="tx1"/>
+                </a:solidFill>
+                <a:latin typeface="+mn-lt"/>
+                <a:ea typeface="+mn-ea"/>
+                <a:cs typeface="+mn-cs"/>
+              </a:defRPr>
+            </a:lvl8pPr>
+            <a:lvl9pPr marL="3886200" indent="-228600" algn="l" defTabSz="914400" rtl="0" eaLnBrk="1" latinLnBrk="0" hangingPunct="1">
+              <a:lnSpc>
+                <a:spcPct val="90000"/>
+              </a:lnSpc>
+              <a:spcBef>
+                <a:spcPts val="500"/>
+              </a:spcBef>
+              <a:buFont typeface="Arial" panose="020B0604020202020204" pitchFamily="34" charset="0"/>
+              <a:buChar char="•"/>
+              <a:defRPr sz="1800" kern="1200">
+                <a:solidFill>
+                  <a:schemeClr val="tx1"/>
+                </a:solidFill>
+                <a:latin typeface="+mn-lt"/>
+                <a:ea typeface="+mn-ea"/>
+                <a:cs typeface="+mn-cs"/>
+              </a:defRPr>
+            </a:lvl9pPr>
+          </a:lstStyle>
+          <a:p>
+            <a:pPr>
+              <a:buNone/>
+            </a:pPr>
+            <a:r>
+              <a:rPr lang="hr-HR" sz="2000" b="1" dirty="0">
+                <a:latin typeface="Bahnschrift SemiLight" panose="020B0502040204020203" pitchFamily="34" charset="0"/>
+              </a:rPr>
+              <a:t>Apache Cordova</a:t>
+            </a:r>
+          </a:p>
+          <a:p>
+            <a:pPr>
+              <a:buFont typeface="Arial" panose="020B0604020202020204" pitchFamily="34" charset="0"/>
+              <a:buChar char="•"/>
+            </a:pPr>
+            <a:r>
+              <a:rPr lang="hr-HR" sz="2000" b="1" dirty="0" err="1">
+                <a:latin typeface="Bahnschrift SemiLight" panose="020B0502040204020203" pitchFamily="34" charset="0"/>
+              </a:rPr>
+              <a:t>Language</a:t>
+            </a:r>
+            <a:r>
+              <a:rPr lang="hr-HR" sz="2000" b="1" dirty="0">
+                <a:latin typeface="Bahnschrift SemiLight" panose="020B0502040204020203" pitchFamily="34" charset="0"/>
+              </a:rPr>
+              <a:t>:</a:t>
+            </a:r>
+            <a:r>
+              <a:rPr lang="hr-HR" sz="2000" dirty="0">
+                <a:latin typeface="Bahnschrift SemiLight" panose="020B0502040204020203" pitchFamily="34" charset="0"/>
+              </a:rPr>
+              <a:t> HTML, CSS, JavaScript</a:t>
+            </a:r>
+          </a:p>
+          <a:p>
+            <a:pPr>
+              <a:buFont typeface="Arial" panose="020B0604020202020204" pitchFamily="34" charset="0"/>
+              <a:buChar char="•"/>
+            </a:pPr>
+            <a:r>
+              <a:rPr lang="hr-HR" sz="2000" b="1" dirty="0" err="1">
+                <a:latin typeface="Bahnschrift SemiLight" panose="020B0502040204020203" pitchFamily="34" charset="0"/>
+              </a:rPr>
+              <a:t>Approach</a:t>
+            </a:r>
+            <a:r>
+              <a:rPr lang="hr-HR" sz="2000" b="1" dirty="0">
+                <a:latin typeface="Bahnschrift SemiLight" panose="020B0502040204020203" pitchFamily="34" charset="0"/>
+              </a:rPr>
+              <a:t>:</a:t>
+            </a:r>
+            <a:r>
+              <a:rPr lang="hr-HR" sz="2000" dirty="0">
+                <a:latin typeface="Bahnschrift SemiLight" panose="020B0502040204020203" pitchFamily="34" charset="0"/>
+              </a:rPr>
+              <a:t> </a:t>
+            </a:r>
+            <a:r>
+              <a:rPr lang="hr-HR" sz="2000" dirty="0" err="1">
+                <a:latin typeface="Bahnschrift SemiLight" panose="020B0502040204020203" pitchFamily="34" charset="0"/>
+              </a:rPr>
+              <a:t>Wraps</a:t>
+            </a:r>
+            <a:r>
+              <a:rPr lang="hr-HR" sz="2000" dirty="0">
+                <a:latin typeface="Bahnschrift SemiLight" panose="020B0502040204020203" pitchFamily="34" charset="0"/>
+              </a:rPr>
+              <a:t> a web </a:t>
+            </a:r>
+            <a:r>
+              <a:rPr lang="hr-HR" sz="2000" dirty="0" err="1">
+                <a:latin typeface="Bahnschrift SemiLight" panose="020B0502040204020203" pitchFamily="34" charset="0"/>
+              </a:rPr>
+              <a:t>app</a:t>
+            </a:r>
+            <a:r>
+              <a:rPr lang="hr-HR" sz="2000" dirty="0">
+                <a:latin typeface="Bahnschrift SemiLight" panose="020B0502040204020203" pitchFamily="34" charset="0"/>
+              </a:rPr>
+              <a:t> </a:t>
+            </a:r>
+            <a:r>
+              <a:rPr lang="hr-HR" sz="2000" dirty="0" err="1">
+                <a:latin typeface="Bahnschrift SemiLight" panose="020B0502040204020203" pitchFamily="34" charset="0"/>
+              </a:rPr>
+              <a:t>in</a:t>
+            </a:r>
+            <a:r>
+              <a:rPr lang="hr-HR" sz="2000" dirty="0">
+                <a:latin typeface="Bahnschrift SemiLight" panose="020B0502040204020203" pitchFamily="34" charset="0"/>
+              </a:rPr>
+              <a:t> a </a:t>
+            </a:r>
+            <a:r>
+              <a:rPr lang="hr-HR" sz="2000" dirty="0" err="1">
+                <a:latin typeface="Bahnschrift SemiLight" panose="020B0502040204020203" pitchFamily="34" charset="0"/>
+              </a:rPr>
+              <a:t>native</a:t>
+            </a:r>
+            <a:r>
+              <a:rPr lang="hr-HR" sz="2000" dirty="0">
+                <a:latin typeface="Bahnschrift SemiLight" panose="020B0502040204020203" pitchFamily="34" charset="0"/>
+              </a:rPr>
+              <a:t> </a:t>
+            </a:r>
+            <a:r>
+              <a:rPr lang="hr-HR" sz="2000" dirty="0" err="1">
+                <a:latin typeface="Bahnschrift SemiLight" panose="020B0502040204020203" pitchFamily="34" charset="0"/>
+              </a:rPr>
+              <a:t>container</a:t>
+            </a:r>
+            <a:r>
+              <a:rPr lang="hr-HR" sz="2000" dirty="0">
+                <a:latin typeface="Bahnschrift SemiLight" panose="020B0502040204020203" pitchFamily="34" charset="0"/>
+              </a:rPr>
+              <a:t> </a:t>
+            </a:r>
+            <a:r>
+              <a:rPr lang="hr-HR" sz="2000" dirty="0" err="1">
+                <a:latin typeface="Bahnschrift SemiLight" panose="020B0502040204020203" pitchFamily="34" charset="0"/>
+              </a:rPr>
+              <a:t>using</a:t>
+            </a:r>
+            <a:r>
+              <a:rPr lang="hr-HR" sz="2000" dirty="0">
+                <a:latin typeface="Bahnschrift SemiLight" panose="020B0502040204020203" pitchFamily="34" charset="0"/>
+              </a:rPr>
+              <a:t> </a:t>
+            </a:r>
+            <a:r>
+              <a:rPr lang="hr-HR" sz="2000" dirty="0" err="1">
+                <a:latin typeface="Bahnschrift SemiLight" panose="020B0502040204020203" pitchFamily="34" charset="0"/>
+              </a:rPr>
+              <a:t>WebView</a:t>
+            </a:r>
+            <a:endParaRPr lang="hr-HR" sz="2000" dirty="0">
+              <a:latin typeface="Bahnschrift SemiLight" panose="020B0502040204020203" pitchFamily="34" charset="0"/>
+            </a:endParaRPr>
+          </a:p>
+          <a:p>
+            <a:pPr>
+              <a:buFont typeface="Arial" panose="020B0604020202020204" pitchFamily="34" charset="0"/>
+              <a:buChar char="•"/>
+            </a:pPr>
+            <a:r>
+              <a:rPr lang="hr-HR" sz="2000" b="1" dirty="0" err="1">
+                <a:latin typeface="Bahnschrift SemiLight" panose="020B0502040204020203" pitchFamily="34" charset="0"/>
+              </a:rPr>
+              <a:t>Plugins</a:t>
+            </a:r>
+            <a:r>
+              <a:rPr lang="hr-HR" sz="2000" b="1" dirty="0">
+                <a:latin typeface="Bahnschrift SemiLight" panose="020B0502040204020203" pitchFamily="34" charset="0"/>
+              </a:rPr>
+              <a:t>:</a:t>
+            </a:r>
+            <a:r>
+              <a:rPr lang="hr-HR" sz="2000" dirty="0">
+                <a:latin typeface="Bahnschrift SemiLight" panose="020B0502040204020203" pitchFamily="34" charset="0"/>
+              </a:rPr>
+              <a:t> </a:t>
+            </a:r>
+            <a:r>
+              <a:rPr lang="hr-HR" sz="2000" dirty="0" err="1">
+                <a:latin typeface="Bahnschrift SemiLight" panose="020B0502040204020203" pitchFamily="34" charset="0"/>
+              </a:rPr>
+              <a:t>Allows</a:t>
+            </a:r>
+            <a:r>
+              <a:rPr lang="hr-HR" sz="2000" dirty="0">
+                <a:latin typeface="Bahnschrift SemiLight" panose="020B0502040204020203" pitchFamily="34" charset="0"/>
+              </a:rPr>
+              <a:t> </a:t>
+            </a:r>
+            <a:r>
+              <a:rPr lang="hr-HR" sz="2000" dirty="0" err="1">
+                <a:latin typeface="Bahnschrift SemiLight" panose="020B0502040204020203" pitchFamily="34" charset="0"/>
+              </a:rPr>
+              <a:t>access</a:t>
+            </a:r>
+            <a:r>
+              <a:rPr lang="hr-HR" sz="2000" dirty="0">
+                <a:latin typeface="Bahnschrift SemiLight" panose="020B0502040204020203" pitchFamily="34" charset="0"/>
+              </a:rPr>
+              <a:t> to </a:t>
+            </a:r>
+            <a:r>
+              <a:rPr lang="hr-HR" sz="2000" dirty="0" err="1">
+                <a:latin typeface="Bahnschrift SemiLight" panose="020B0502040204020203" pitchFamily="34" charset="0"/>
+              </a:rPr>
+              <a:t>native</a:t>
+            </a:r>
+            <a:r>
+              <a:rPr lang="hr-HR" sz="2000" dirty="0">
+                <a:latin typeface="Bahnschrift SemiLight" panose="020B0502040204020203" pitchFamily="34" charset="0"/>
+              </a:rPr>
+              <a:t> </a:t>
+            </a:r>
+            <a:r>
+              <a:rPr lang="hr-HR" sz="2000" dirty="0" err="1">
+                <a:latin typeface="Bahnschrift SemiLight" panose="020B0502040204020203" pitchFamily="34" charset="0"/>
+              </a:rPr>
+              <a:t>device</a:t>
+            </a:r>
+            <a:r>
+              <a:rPr lang="hr-HR" sz="2000" dirty="0">
+                <a:latin typeface="Bahnschrift SemiLight" panose="020B0502040204020203" pitchFamily="34" charset="0"/>
+              </a:rPr>
+              <a:t> </a:t>
+            </a:r>
+            <a:r>
+              <a:rPr lang="hr-HR" sz="2000" dirty="0" err="1">
+                <a:latin typeface="Bahnschrift SemiLight" panose="020B0502040204020203" pitchFamily="34" charset="0"/>
+              </a:rPr>
+              <a:t>features</a:t>
+            </a:r>
+            <a:r>
+              <a:rPr lang="hr-HR" sz="2000" dirty="0">
+                <a:latin typeface="Bahnschrift SemiLight" panose="020B0502040204020203" pitchFamily="34" charset="0"/>
+              </a:rPr>
+              <a:t> (</a:t>
+            </a:r>
+            <a:r>
+              <a:rPr lang="hr-HR" sz="2000" dirty="0" err="1">
+                <a:latin typeface="Bahnschrift SemiLight" panose="020B0502040204020203" pitchFamily="34" charset="0"/>
+              </a:rPr>
+              <a:t>camera</a:t>
+            </a:r>
+            <a:r>
+              <a:rPr lang="hr-HR" sz="2000" dirty="0">
+                <a:latin typeface="Bahnschrift SemiLight" panose="020B0502040204020203" pitchFamily="34" charset="0"/>
+              </a:rPr>
+              <a:t>, GPS)</a:t>
+            </a:r>
+          </a:p>
+          <a:p>
+            <a:pPr>
+              <a:buNone/>
+            </a:pPr>
+            <a:r>
+              <a:rPr lang="hr-HR" sz="2000" dirty="0">
+                <a:latin typeface="Bahnschrift SemiLight" panose="020B0502040204020203" pitchFamily="34" charset="0"/>
+              </a:rPr>
+              <a:t>✅ </a:t>
+            </a:r>
+            <a:r>
+              <a:rPr lang="hr-HR" sz="2000" b="1" dirty="0" err="1">
+                <a:latin typeface="Bahnschrift SemiLight" panose="020B0502040204020203" pitchFamily="34" charset="0"/>
+              </a:rPr>
+              <a:t>Advantages</a:t>
+            </a:r>
+            <a:r>
+              <a:rPr lang="hr-HR" sz="2000" b="1" dirty="0">
+                <a:latin typeface="Bahnschrift SemiLight" panose="020B0502040204020203" pitchFamily="34" charset="0"/>
+              </a:rPr>
+              <a:t>:</a:t>
+            </a:r>
+            <a:endParaRPr lang="hr-HR" sz="2000" dirty="0">
+              <a:latin typeface="Bahnschrift SemiLight" panose="020B0502040204020203" pitchFamily="34" charset="0"/>
+            </a:endParaRPr>
+          </a:p>
+          <a:p>
+            <a:pPr>
+              <a:buFont typeface="Arial" panose="020B0604020202020204" pitchFamily="34" charset="0"/>
+              <a:buChar char="•"/>
+            </a:pPr>
+            <a:r>
+              <a:rPr lang="hr-HR" sz="2000" dirty="0" err="1">
+                <a:latin typeface="Bahnschrift SemiLight" panose="020B0502040204020203" pitchFamily="34" charset="0"/>
+              </a:rPr>
+              <a:t>Familiar</a:t>
+            </a:r>
+            <a:r>
+              <a:rPr lang="hr-HR" sz="2000" dirty="0">
+                <a:latin typeface="Bahnschrift SemiLight" panose="020B0502040204020203" pitchFamily="34" charset="0"/>
+              </a:rPr>
+              <a:t> web </a:t>
+            </a:r>
+            <a:r>
+              <a:rPr lang="hr-HR" sz="2000" dirty="0" err="1">
+                <a:latin typeface="Bahnschrift SemiLight" panose="020B0502040204020203" pitchFamily="34" charset="0"/>
+              </a:rPr>
+              <a:t>technologies</a:t>
+            </a:r>
+            <a:endParaRPr lang="hr-HR" sz="2000" dirty="0">
+              <a:latin typeface="Bahnschrift SemiLight" panose="020B0502040204020203" pitchFamily="34" charset="0"/>
+            </a:endParaRPr>
+          </a:p>
+          <a:p>
+            <a:pPr>
+              <a:buFont typeface="Arial" panose="020B0604020202020204" pitchFamily="34" charset="0"/>
+              <a:buChar char="•"/>
+            </a:pPr>
+            <a:r>
+              <a:rPr lang="hr-HR" sz="2000" dirty="0" err="1">
+                <a:latin typeface="Bahnschrift SemiLight" panose="020B0502040204020203" pitchFamily="34" charset="0"/>
+              </a:rPr>
+              <a:t>Large</a:t>
+            </a:r>
+            <a:r>
+              <a:rPr lang="hr-HR" sz="2000" dirty="0">
+                <a:latin typeface="Bahnschrift SemiLight" panose="020B0502040204020203" pitchFamily="34" charset="0"/>
+              </a:rPr>
+              <a:t> </a:t>
+            </a:r>
+            <a:r>
+              <a:rPr lang="hr-HR" sz="2000" dirty="0" err="1">
+                <a:latin typeface="Bahnschrift SemiLight" panose="020B0502040204020203" pitchFamily="34" charset="0"/>
+              </a:rPr>
+              <a:t>ecosystem</a:t>
+            </a:r>
+            <a:r>
+              <a:rPr lang="hr-HR" sz="2000" dirty="0">
+                <a:latin typeface="Bahnschrift SemiLight" panose="020B0502040204020203" pitchFamily="34" charset="0"/>
+              </a:rPr>
+              <a:t> </a:t>
+            </a:r>
+            <a:r>
+              <a:rPr lang="hr-HR" sz="2000" dirty="0" err="1">
+                <a:latin typeface="Bahnschrift SemiLight" panose="020B0502040204020203" pitchFamily="34" charset="0"/>
+              </a:rPr>
+              <a:t>of</a:t>
+            </a:r>
+            <a:r>
+              <a:rPr lang="hr-HR" sz="2000" dirty="0">
+                <a:latin typeface="Bahnschrift SemiLight" panose="020B0502040204020203" pitchFamily="34" charset="0"/>
+              </a:rPr>
+              <a:t> </a:t>
+            </a:r>
+            <a:r>
+              <a:rPr lang="hr-HR" sz="2000" dirty="0" err="1">
+                <a:latin typeface="Bahnschrift SemiLight" panose="020B0502040204020203" pitchFamily="34" charset="0"/>
+              </a:rPr>
+              <a:t>plugins</a:t>
+            </a:r>
+            <a:endParaRPr lang="hr-HR" sz="2000" dirty="0">
+              <a:latin typeface="Bahnschrift SemiLight" panose="020B0502040204020203" pitchFamily="34" charset="0"/>
+            </a:endParaRPr>
+          </a:p>
+          <a:p>
+            <a:pPr>
+              <a:buNone/>
+            </a:pPr>
+            <a:r>
+              <a:rPr lang="hr-HR" sz="2000" dirty="0">
+                <a:latin typeface="Bahnschrift SemiLight" panose="020B0502040204020203" pitchFamily="34" charset="0"/>
+              </a:rPr>
+              <a:t>⚠️ </a:t>
+            </a:r>
+            <a:r>
+              <a:rPr lang="hr-HR" sz="2000" b="1" dirty="0" err="1">
+                <a:latin typeface="Bahnschrift SemiLight" panose="020B0502040204020203" pitchFamily="34" charset="0"/>
+              </a:rPr>
+              <a:t>Considerations</a:t>
+            </a:r>
+            <a:r>
+              <a:rPr lang="hr-HR" sz="2000" b="1" dirty="0">
+                <a:latin typeface="Bahnschrift SemiLight" panose="020B0502040204020203" pitchFamily="34" charset="0"/>
+              </a:rPr>
+              <a:t>:</a:t>
+            </a:r>
+            <a:endParaRPr lang="hr-HR" sz="2000" dirty="0">
+              <a:latin typeface="Bahnschrift SemiLight" panose="020B0502040204020203" pitchFamily="34" charset="0"/>
+            </a:endParaRPr>
+          </a:p>
+          <a:p>
+            <a:pPr>
+              <a:buFont typeface="Arial" panose="020B0604020202020204" pitchFamily="34" charset="0"/>
+              <a:buChar char="•"/>
+            </a:pPr>
+            <a:r>
+              <a:rPr lang="hr-HR" sz="2000" dirty="0">
+                <a:latin typeface="Bahnschrift SemiLight" panose="020B0502040204020203" pitchFamily="34" charset="0"/>
+              </a:rPr>
+              <a:t>Web-</a:t>
+            </a:r>
+            <a:r>
+              <a:rPr lang="hr-HR" sz="2000" dirty="0" err="1">
+                <a:latin typeface="Bahnschrift SemiLight" panose="020B0502040204020203" pitchFamily="34" charset="0"/>
+              </a:rPr>
+              <a:t>based</a:t>
+            </a:r>
+            <a:r>
+              <a:rPr lang="hr-HR" sz="2000" dirty="0">
+                <a:latin typeface="Bahnschrift SemiLight" panose="020B0502040204020203" pitchFamily="34" charset="0"/>
+              </a:rPr>
+              <a:t> </a:t>
+            </a:r>
+            <a:r>
+              <a:rPr lang="hr-HR" sz="2000" dirty="0" err="1">
+                <a:latin typeface="Bahnschrift SemiLight" panose="020B0502040204020203" pitchFamily="34" charset="0"/>
+              </a:rPr>
+              <a:t>approach</a:t>
+            </a:r>
+            <a:r>
+              <a:rPr lang="hr-HR" sz="2000" dirty="0">
+                <a:latin typeface="Bahnschrift SemiLight" panose="020B0502040204020203" pitchFamily="34" charset="0"/>
+              </a:rPr>
+              <a:t> → </a:t>
+            </a:r>
+            <a:r>
+              <a:rPr lang="hr-HR" sz="2000" dirty="0" err="1">
+                <a:latin typeface="Bahnschrift SemiLight" panose="020B0502040204020203" pitchFamily="34" charset="0"/>
+              </a:rPr>
+              <a:t>Lower</a:t>
+            </a:r>
+            <a:r>
+              <a:rPr lang="hr-HR" sz="2000" dirty="0">
+                <a:latin typeface="Bahnschrift SemiLight" panose="020B0502040204020203" pitchFamily="34" charset="0"/>
+              </a:rPr>
+              <a:t> </a:t>
+            </a:r>
+            <a:r>
+              <a:rPr lang="hr-HR" sz="2000" dirty="0" err="1">
+                <a:latin typeface="Bahnschrift SemiLight" panose="020B0502040204020203" pitchFamily="34" charset="0"/>
+              </a:rPr>
+              <a:t>performance</a:t>
+            </a:r>
+            <a:r>
+              <a:rPr lang="hr-HR" sz="2000" dirty="0">
+                <a:latin typeface="Bahnschrift SemiLight" panose="020B0502040204020203" pitchFamily="34" charset="0"/>
+              </a:rPr>
+              <a:t> </a:t>
+            </a:r>
+            <a:r>
+              <a:rPr lang="hr-HR" sz="2000" dirty="0" err="1">
+                <a:latin typeface="Bahnschrift SemiLight" panose="020B0502040204020203" pitchFamily="34" charset="0"/>
+              </a:rPr>
+              <a:t>than</a:t>
+            </a:r>
+            <a:r>
+              <a:rPr lang="hr-HR" sz="2000" dirty="0">
+                <a:latin typeface="Bahnschrift SemiLight" panose="020B0502040204020203" pitchFamily="34" charset="0"/>
+              </a:rPr>
+              <a:t> </a:t>
+            </a:r>
+            <a:r>
+              <a:rPr lang="hr-HR" sz="2000" dirty="0" err="1">
+                <a:latin typeface="Bahnschrift SemiLight" panose="020B0502040204020203" pitchFamily="34" charset="0"/>
+              </a:rPr>
+              <a:t>native</a:t>
+            </a:r>
+            <a:endParaRPr lang="hr-HR" sz="2000" dirty="0">
+              <a:latin typeface="Bahnschrift SemiLight" panose="020B0502040204020203" pitchFamily="34" charset="0"/>
+            </a:endParaRPr>
+          </a:p>
+          <a:p>
+            <a:pPr>
+              <a:buFont typeface="Arial" panose="020B0604020202020204" pitchFamily="34" charset="0"/>
+              <a:buChar char="•"/>
+            </a:pPr>
+            <a:r>
+              <a:rPr lang="hr-HR" sz="2000" dirty="0">
+                <a:latin typeface="Bahnschrift SemiLight" panose="020B0502040204020203" pitchFamily="34" charset="0"/>
+              </a:rPr>
+              <a:t>UI elements may not feel "native"</a:t>
+            </a:r>
+            <a:endParaRPr lang="en-US" sz="2000" dirty="0">
+              <a:latin typeface="Bahnschrift SemiLight" panose="020B0502040204020203" pitchFamily="34" charset="0"/>
+            </a:endParaRPr>
+          </a:p>
+          <a:p>
+            <a:pPr>
+              <a:buFont typeface="Arial" panose="020B0604020202020204" pitchFamily="34" charset="0"/>
+              <a:buChar char="•"/>
+            </a:pPr>
+            <a:r>
+              <a:rPr lang="en-US" sz="2000" dirty="0">
+                <a:latin typeface="Bahnschrift SemiLight" panose="020B0502040204020203" pitchFamily="34" charset="0"/>
+              </a:rPr>
+              <a:t>Shared business logic, network requests, and data handling</a:t>
+            </a:r>
+          </a:p>
+          <a:p>
+            <a:pPr>
+              <a:buFont typeface="Arial" panose="020B0604020202020204" pitchFamily="34" charset="0"/>
+              <a:buChar char="•"/>
+            </a:pPr>
+            <a:r>
+              <a:rPr lang="en-US" sz="2000" dirty="0">
+                <a:latin typeface="Bahnschrift SemiLight" panose="020B0502040204020203" pitchFamily="34" charset="0"/>
+              </a:rPr>
+              <a:t>Consistent behavior across platforms</a:t>
+            </a:r>
+          </a:p>
+        </p:txBody>
+      </p:sp>
+    </p:spTree>
+    <p:extLst>
+      <p:ext uri="{BB962C8B-B14F-4D97-AF65-F5344CB8AC3E}">
+        <p14:creationId xmlns:p14="http://schemas.microsoft.com/office/powerpoint/2010/main" val="130402940"/>
+      </p:ext>
+    </p:extLst>
+  </p:cSld>
+  <p:clrMapOvr>
+    <a:masterClrMapping/>
+  </p:clrMapOvr>
+</p:sld>
+</file>
+
+<file path=ppt/slides/slide7.xml><?xml version="1.0" encoding="utf-8"?>
 <p:sld xmlns:a="http://schemas.openxmlformats.org/drawingml/2006/main" xmlns:r="http://schemas.openxmlformats.org/officeDocument/2006/relationships" xmlns:p="http://schemas.openxmlformats.org/presentationml/2006/main">
   <p:cSld>
     <p:spTree>
@@ -7307,8 +9776,8 @@
         </p:nvSpPr>
         <p:spPr>
           <a:xfrm>
-            <a:off x="7112000" y="2150510"/>
-            <a:ext cx="4398298" cy="4542391"/>
+            <a:off x="530098" y="1871377"/>
+            <a:ext cx="10932074" cy="3971157"/>
           </a:xfrm>
           <a:prstGeom prst="rect">
             <a:avLst/>
@@ -7316,7 +9785,7 @@
         </p:spPr>
         <p:txBody>
           <a:bodyPr vert="horz" lIns="91440" tIns="45720" rIns="91440" bIns="45720" rtlCol="0">
-            <a:normAutofit fontScale="70000" lnSpcReduction="20000"/>
+            <a:noAutofit/>
           </a:bodyPr>
           <a:lstStyle>
             <a:lvl1pPr marL="368300" indent="-352425" algn="l" defTabSz="914400" rtl="0" eaLnBrk="1" latinLnBrk="0" hangingPunct="1">
@@ -7520,56 +9989,120 @@
               <a:buNone/>
             </a:pPr>
             <a:r>
-              <a:rPr lang="en-US" b="1" dirty="0"/>
+              <a:rPr lang="en-US" sz="2000" b="1" dirty="0">
+                <a:latin typeface="Bahnschrift SemiLight" panose="020B0502040204020203" pitchFamily="34" charset="0"/>
+              </a:rPr>
               <a:t>React Native</a:t>
             </a:r>
           </a:p>
           <a:p>
             <a:pPr>
+              <a:buFont typeface="Arial" panose="020B0604020202020204" pitchFamily="34" charset="0"/>
+              <a:buChar char="•"/>
+            </a:pPr>
+            <a:r>
+              <a:rPr lang="en-US" sz="2000" b="1" dirty="0">
+                <a:latin typeface="Bahnschrift SemiLight" panose="020B0502040204020203" pitchFamily="34" charset="0"/>
+              </a:rPr>
+              <a:t>Language:</a:t>
+            </a:r>
+            <a:r>
+              <a:rPr lang="en-US" sz="2000" dirty="0">
+                <a:latin typeface="Bahnschrift SemiLight" panose="020B0502040204020203" pitchFamily="34" charset="0"/>
+              </a:rPr>
+              <a:t> JavaScript + React</a:t>
+            </a:r>
+          </a:p>
+          <a:p>
+            <a:pPr>
+              <a:buFont typeface="Arial" panose="020B0604020202020204" pitchFamily="34" charset="0"/>
+              <a:buChar char="•"/>
+            </a:pPr>
+            <a:r>
+              <a:rPr lang="en-US" sz="2000" b="1" dirty="0">
+                <a:latin typeface="Bahnschrift SemiLight" panose="020B0502040204020203" pitchFamily="34" charset="0"/>
+              </a:rPr>
+              <a:t>Approach:</a:t>
+            </a:r>
+            <a:r>
+              <a:rPr lang="en-US" sz="2000" dirty="0">
+                <a:latin typeface="Bahnschrift SemiLight" panose="020B0502040204020203" pitchFamily="34" charset="0"/>
+              </a:rPr>
+              <a:t> Uses native components and a JavaScript bridge</a:t>
+            </a:r>
+          </a:p>
+          <a:p>
+            <a:pPr>
+              <a:buFont typeface="Arial" panose="020B0604020202020204" pitchFamily="34" charset="0"/>
+              <a:buChar char="•"/>
+            </a:pPr>
+            <a:r>
+              <a:rPr lang="en-US" sz="2000" b="1" dirty="0">
+                <a:latin typeface="Bahnschrift SemiLight" panose="020B0502040204020203" pitchFamily="34" charset="0"/>
+              </a:rPr>
+              <a:t>Hot Reload:</a:t>
+            </a:r>
+            <a:r>
+              <a:rPr lang="en-US" sz="2000" dirty="0">
+                <a:latin typeface="Bahnschrift SemiLight" panose="020B0502040204020203" pitchFamily="34" charset="0"/>
+              </a:rPr>
+              <a:t> Fast updates without rebuilding the app</a:t>
+            </a:r>
+          </a:p>
+          <a:p>
+            <a:pPr>
               <a:buNone/>
             </a:pPr>
-            <a:endParaRPr lang="en-US" b="1" dirty="0"/>
-          </a:p>
-          <a:p>
-            <a:pPr>
-              <a:buFont typeface="Arial" panose="020B0604020202020204" pitchFamily="34" charset="0"/>
-              <a:buChar char="•"/>
-            </a:pPr>
-            <a:r>
-              <a:rPr lang="en-US" b="1" dirty="0"/>
-              <a:t>Language:</a:t>
-            </a:r>
-            <a:r>
-              <a:rPr lang="en-US" dirty="0"/>
-              <a:t> JavaScript + React</a:t>
-            </a:r>
-          </a:p>
-          <a:p>
-            <a:pPr>
-              <a:buFont typeface="Arial" panose="020B0604020202020204" pitchFamily="34" charset="0"/>
-              <a:buChar char="•"/>
-            </a:pPr>
-            <a:r>
-              <a:rPr lang="en-US" b="1" dirty="0"/>
-              <a:t>Approach:</a:t>
-            </a:r>
-            <a:r>
-              <a:rPr lang="en-US" dirty="0"/>
-              <a:t> Uses native components and a JavaScript bridge</a:t>
-            </a:r>
-          </a:p>
-          <a:p>
-            <a:pPr>
-              <a:buFont typeface="Arial" panose="020B0604020202020204" pitchFamily="34" charset="0"/>
-              <a:buChar char="•"/>
-            </a:pPr>
-            <a:r>
-              <a:rPr lang="en-US" b="1" dirty="0"/>
-              <a:t>Hot Reload:</a:t>
-            </a:r>
-            <a:r>
-              <a:rPr lang="en-US" dirty="0"/>
-              <a:t> Fast updates without rebuilding the app</a:t>
+            <a:r>
+              <a:rPr lang="en-US" sz="2000" dirty="0">
+                <a:latin typeface="Bahnschrift SemiLight" panose="020B0502040204020203" pitchFamily="34" charset="0"/>
+              </a:rPr>
+              <a:t>✅ </a:t>
+            </a:r>
+            <a:r>
+              <a:rPr lang="en-US" sz="2000" b="1" dirty="0">
+                <a:latin typeface="Bahnschrift SemiLight" panose="020B0502040204020203" pitchFamily="34" charset="0"/>
+              </a:rPr>
+              <a:t>Advantages:</a:t>
+            </a:r>
+            <a:endParaRPr lang="en-US" sz="2000" dirty="0">
+              <a:latin typeface="Bahnschrift SemiLight" panose="020B0502040204020203" pitchFamily="34" charset="0"/>
+            </a:endParaRPr>
+          </a:p>
+          <a:p>
+            <a:pPr>
+              <a:buFont typeface="Arial" panose="020B0604020202020204" pitchFamily="34" charset="0"/>
+              <a:buChar char="•"/>
+            </a:pPr>
+            <a:r>
+              <a:rPr lang="en-US" sz="2000" dirty="0">
+                <a:latin typeface="Bahnschrift SemiLight" panose="020B0502040204020203" pitchFamily="34" charset="0"/>
+              </a:rPr>
+              <a:t>High performance → Close to native</a:t>
+            </a:r>
+          </a:p>
+          <a:p>
+            <a:pPr>
+              <a:buFont typeface="Arial" panose="020B0604020202020204" pitchFamily="34" charset="0"/>
+              <a:buChar char="•"/>
+            </a:pPr>
+            <a:r>
+              <a:rPr lang="en-US" sz="2000" dirty="0">
+                <a:latin typeface="Bahnschrift SemiLight" panose="020B0502040204020203" pitchFamily="34" charset="0"/>
+              </a:rPr>
+              <a:t>Strong community and third-party libraries</a:t>
+            </a:r>
+          </a:p>
+          <a:p>
+            <a:pPr>
+              <a:buFont typeface="Arial" panose="020B0604020202020204" pitchFamily="34" charset="0"/>
+              <a:buChar char="•"/>
+            </a:pPr>
+            <a:r>
+              <a:rPr lang="en-US" sz="2000" dirty="0">
+                <a:latin typeface="Bahnschrift SemiLight" panose="020B0502040204020203" pitchFamily="34" charset="0"/>
+              </a:rPr>
+              <a:t>Reusable UI components</a:t>
             </a:r>
           </a:p>
           <a:p>
@@ -7577,66 +10110,30 @@
               <a:buNone/>
             </a:pPr>
             <a:r>
-              <a:rPr lang="en-US" dirty="0"/>
-              <a:t>✅ </a:t>
-            </a:r>
-            <a:r>
-              <a:rPr lang="en-US" b="1" dirty="0"/>
-              <a:t>Advantages:</a:t>
-            </a:r>
-            <a:endParaRPr lang="en-US" dirty="0"/>
-          </a:p>
-          <a:p>
-            <a:pPr>
-              <a:buFont typeface="Arial" panose="020B0604020202020204" pitchFamily="34" charset="0"/>
-              <a:buChar char="•"/>
-            </a:pPr>
-            <a:r>
-              <a:rPr lang="en-US" dirty="0"/>
-              <a:t>High performance → Close to native</a:t>
-            </a:r>
-          </a:p>
-          <a:p>
-            <a:pPr>
-              <a:buFont typeface="Arial" panose="020B0604020202020204" pitchFamily="34" charset="0"/>
-              <a:buChar char="•"/>
-            </a:pPr>
-            <a:r>
-              <a:rPr lang="en-US" dirty="0"/>
-              <a:t>Strong community and third-party libraries</a:t>
-            </a:r>
-          </a:p>
-          <a:p>
-            <a:pPr>
-              <a:buFont typeface="Arial" panose="020B0604020202020204" pitchFamily="34" charset="0"/>
-              <a:buChar char="•"/>
-            </a:pPr>
-            <a:r>
-              <a:rPr lang="en-US" dirty="0"/>
-              <a:t>Reusable UI components</a:t>
-            </a:r>
-          </a:p>
-          <a:p>
-            <a:pPr>
-              <a:buNone/>
-            </a:pPr>
-            <a:r>
-              <a:rPr lang="en-US" dirty="0"/>
+              <a:rPr lang="en-US" sz="2000" dirty="0">
+                <a:latin typeface="Bahnschrift SemiLight" panose="020B0502040204020203" pitchFamily="34" charset="0"/>
+              </a:rPr>
               <a:t>⚠️ </a:t>
             </a:r>
             <a:r>
-              <a:rPr lang="en-US" b="1" dirty="0"/>
+              <a:rPr lang="en-US" sz="2000" b="1" dirty="0">
+                <a:latin typeface="Bahnschrift SemiLight" panose="020B0502040204020203" pitchFamily="34" charset="0"/>
+              </a:rPr>
               <a:t>Considerations:</a:t>
             </a:r>
-            <a:endParaRPr lang="en-US" dirty="0"/>
-          </a:p>
-          <a:p>
-            <a:pPr>
-              <a:buFont typeface="Arial" panose="020B0604020202020204" pitchFamily="34" charset="0"/>
-              <a:buChar char="•"/>
-            </a:pPr>
-            <a:r>
-              <a:rPr lang="en-US" dirty="0"/>
+            <a:endParaRPr lang="en-US" sz="2000" dirty="0">
+              <a:latin typeface="Bahnschrift SemiLight" panose="020B0502040204020203" pitchFamily="34" charset="0"/>
+            </a:endParaRPr>
+          </a:p>
+          <a:p>
+            <a:pPr>
+              <a:buFont typeface="Arial" panose="020B0604020202020204" pitchFamily="34" charset="0"/>
+              <a:buChar char="•"/>
+            </a:pPr>
+            <a:r>
+              <a:rPr lang="en-US" sz="2000" dirty="0">
+                <a:latin typeface="Bahnschrift SemiLight" panose="020B0502040204020203" pitchFamily="34" charset="0"/>
+              </a:rPr>
               <a:t>Complex animations and UI may require native modules</a:t>
             </a:r>
           </a:p>
@@ -7646,631 +10143,10 @@
               <a:buChar char="•"/>
             </a:pPr>
             <a:r>
-              <a:rPr lang="en-US" dirty="0"/>
+              <a:rPr lang="en-US" sz="2000" dirty="0">
+                <a:latin typeface="Bahnschrift SemiLight" panose="020B0502040204020203" pitchFamily="34" charset="0"/>
+              </a:rPr>
               <a:t>Learning curve for handling state and props</a:t>
-            </a:r>
-          </a:p>
-        </p:txBody>
-      </p:sp>
-      <p:sp>
-        <p:nvSpPr>
-          <p:cNvPr id="7" name="Content Placeholder 2">
-            <a:extLst>
-              <a:ext uri="{FF2B5EF4-FFF2-40B4-BE49-F238E27FC236}">
-                <a16:creationId xmlns:a16="http://schemas.microsoft.com/office/drawing/2014/main" id="{4A7A64C5-4B3B-EF9C-CCAE-F905B3514D9E}"/>
-              </a:ext>
-            </a:extLst>
-          </p:cNvPr>
-          <p:cNvSpPr txBox="1">
-            <a:spLocks/>
-          </p:cNvSpPr>
-          <p:nvPr/>
-        </p:nvSpPr>
-        <p:spPr>
-          <a:xfrm>
-            <a:off x="527050" y="2036208"/>
-            <a:ext cx="5715000" cy="4542391"/>
-          </a:xfrm>
-          <a:prstGeom prst="rect">
-            <a:avLst/>
-          </a:prstGeom>
-        </p:spPr>
-        <p:txBody>
-          <a:bodyPr vert="horz" lIns="91440" tIns="45720" rIns="91440" bIns="45720" rtlCol="0">
-            <a:normAutofit fontScale="62500" lnSpcReduction="20000"/>
-          </a:bodyPr>
-          <a:lstStyle>
-            <a:lvl1pPr marL="368300" indent="-352425" algn="l" defTabSz="914400" rtl="0" eaLnBrk="1" latinLnBrk="0" hangingPunct="1">
-              <a:lnSpc>
-                <a:spcPct val="90000"/>
-              </a:lnSpc>
-              <a:spcBef>
-                <a:spcPts val="600"/>
-              </a:spcBef>
-              <a:spcAft>
-                <a:spcPts val="600"/>
-              </a:spcAft>
-              <a:buClr>
-                <a:schemeClr val="accent2"/>
-              </a:buClr>
-              <a:buFont typeface="Wingdings" pitchFamily="2" charset="2"/>
-              <a:buChar char="§"/>
-              <a:tabLst/>
-              <a:defRPr sz="2400" kern="1200">
-                <a:solidFill>
-                  <a:schemeClr val="tx1"/>
-                </a:solidFill>
-                <a:latin typeface="+mn-lt"/>
-                <a:ea typeface="Open Sans" panose="020B0606030504020204" pitchFamily="34" charset="0"/>
-                <a:cs typeface="Open Sans" panose="020B0606030504020204" pitchFamily="34" charset="0"/>
-              </a:defRPr>
-            </a:lvl1pPr>
-            <a:lvl2pPr marL="771525" indent="-274638" algn="l" defTabSz="914400" rtl="0" eaLnBrk="1" latinLnBrk="0" hangingPunct="1">
-              <a:lnSpc>
-                <a:spcPct val="90000"/>
-              </a:lnSpc>
-              <a:spcBef>
-                <a:spcPts val="600"/>
-              </a:spcBef>
-              <a:spcAft>
-                <a:spcPts val="600"/>
-              </a:spcAft>
-              <a:buClr>
-                <a:schemeClr val="accent2"/>
-              </a:buClr>
-              <a:buFont typeface="Wingdings" pitchFamily="2" charset="2"/>
-              <a:buChar char="§"/>
-              <a:tabLst/>
-              <a:defRPr sz="2200" kern="1200">
-                <a:solidFill>
-                  <a:schemeClr val="tx1"/>
-                </a:solidFill>
-                <a:latin typeface="+mn-lt"/>
-                <a:ea typeface="Open Sans" panose="020B0606030504020204" pitchFamily="34" charset="0"/>
-                <a:cs typeface="Open Sans" panose="020B0606030504020204" pitchFamily="34" charset="0"/>
-              </a:defRPr>
-            </a:lvl2pPr>
-            <a:lvl3pPr marL="1143000" indent="-228600" algn="l" defTabSz="914400" rtl="0" eaLnBrk="1" latinLnBrk="0" hangingPunct="1">
-              <a:lnSpc>
-                <a:spcPct val="90000"/>
-              </a:lnSpc>
-              <a:spcBef>
-                <a:spcPts val="600"/>
-              </a:spcBef>
-              <a:spcAft>
-                <a:spcPts val="600"/>
-              </a:spcAft>
-              <a:buClr>
-                <a:schemeClr val="accent2"/>
-              </a:buClr>
-              <a:buFont typeface="Wingdings" pitchFamily="2" charset="2"/>
-              <a:buChar char="§"/>
-              <a:defRPr sz="2000" kern="1200">
-                <a:solidFill>
-                  <a:schemeClr val="tx1"/>
-                </a:solidFill>
-                <a:latin typeface="+mn-lt"/>
-                <a:ea typeface="Open Sans" panose="020B0606030504020204" pitchFamily="34" charset="0"/>
-                <a:cs typeface="Open Sans" panose="020B0606030504020204" pitchFamily="34" charset="0"/>
-              </a:defRPr>
-            </a:lvl3pPr>
-            <a:lvl4pPr marL="1600200" indent="-228600" algn="l" defTabSz="914400" rtl="0" eaLnBrk="1" latinLnBrk="0" hangingPunct="1">
-              <a:lnSpc>
-                <a:spcPct val="90000"/>
-              </a:lnSpc>
-              <a:spcBef>
-                <a:spcPts val="600"/>
-              </a:spcBef>
-              <a:spcAft>
-                <a:spcPts val="600"/>
-              </a:spcAft>
-              <a:buClr>
-                <a:schemeClr val="accent2"/>
-              </a:buClr>
-              <a:buFont typeface="Wingdings" pitchFamily="2" charset="2"/>
-              <a:buChar char="§"/>
-              <a:defRPr sz="1800" kern="1200">
-                <a:solidFill>
-                  <a:schemeClr val="tx1"/>
-                </a:solidFill>
-                <a:latin typeface="+mn-lt"/>
-                <a:ea typeface="Open Sans" panose="020B0606030504020204" pitchFamily="34" charset="0"/>
-                <a:cs typeface="Open Sans" panose="020B0606030504020204" pitchFamily="34" charset="0"/>
-              </a:defRPr>
-            </a:lvl4pPr>
-            <a:lvl5pPr marL="1960563" indent="-225425" algn="l" defTabSz="914400" rtl="0" eaLnBrk="1" latinLnBrk="0" hangingPunct="1">
-              <a:lnSpc>
-                <a:spcPct val="90000"/>
-              </a:lnSpc>
-              <a:spcBef>
-                <a:spcPts val="600"/>
-              </a:spcBef>
-              <a:spcAft>
-                <a:spcPts val="600"/>
-              </a:spcAft>
-              <a:buClr>
-                <a:schemeClr val="accent2"/>
-              </a:buClr>
-              <a:buFont typeface="Wingdings" pitchFamily="2" charset="2"/>
-              <a:buChar char="§"/>
-              <a:tabLst/>
-              <a:defRPr sz="1600" kern="1200">
-                <a:solidFill>
-                  <a:schemeClr val="tx1"/>
-                </a:solidFill>
-                <a:latin typeface="+mn-lt"/>
-                <a:ea typeface="Open Sans" panose="020B0606030504020204" pitchFamily="34" charset="0"/>
-                <a:cs typeface="Open Sans" panose="020B0606030504020204" pitchFamily="34" charset="0"/>
-              </a:defRPr>
-            </a:lvl5pPr>
-            <a:lvl6pPr marL="2514600" indent="-228600" algn="l" defTabSz="914400" rtl="0" eaLnBrk="1" latinLnBrk="0" hangingPunct="1">
-              <a:lnSpc>
-                <a:spcPct val="90000"/>
-              </a:lnSpc>
-              <a:spcBef>
-                <a:spcPts val="500"/>
-              </a:spcBef>
-              <a:buFont typeface="Arial" panose="020B0604020202020204" pitchFamily="34" charset="0"/>
-              <a:buChar char="•"/>
-              <a:defRPr sz="1800" kern="1200">
-                <a:solidFill>
-                  <a:schemeClr val="tx1"/>
-                </a:solidFill>
-                <a:latin typeface="+mn-lt"/>
-                <a:ea typeface="+mn-ea"/>
-                <a:cs typeface="+mn-cs"/>
-              </a:defRPr>
-            </a:lvl6pPr>
-            <a:lvl7pPr marL="2971800" indent="-228600" algn="l" defTabSz="914400" rtl="0" eaLnBrk="1" latinLnBrk="0" hangingPunct="1">
-              <a:lnSpc>
-                <a:spcPct val="90000"/>
-              </a:lnSpc>
-              <a:spcBef>
-                <a:spcPts val="500"/>
-              </a:spcBef>
-              <a:buFont typeface="Arial" panose="020B0604020202020204" pitchFamily="34" charset="0"/>
-              <a:buChar char="•"/>
-              <a:defRPr sz="1800" kern="1200">
-                <a:solidFill>
-                  <a:schemeClr val="tx1"/>
-                </a:solidFill>
-                <a:latin typeface="+mn-lt"/>
-                <a:ea typeface="+mn-ea"/>
-                <a:cs typeface="+mn-cs"/>
-              </a:defRPr>
-            </a:lvl7pPr>
-            <a:lvl8pPr marL="3429000" indent="-228600" algn="l" defTabSz="914400" rtl="0" eaLnBrk="1" latinLnBrk="0" hangingPunct="1">
-              <a:lnSpc>
-                <a:spcPct val="90000"/>
-              </a:lnSpc>
-              <a:spcBef>
-                <a:spcPts val="500"/>
-              </a:spcBef>
-              <a:buFont typeface="Arial" panose="020B0604020202020204" pitchFamily="34" charset="0"/>
-              <a:buChar char="•"/>
-              <a:defRPr sz="1800" kern="1200">
-                <a:solidFill>
-                  <a:schemeClr val="tx1"/>
-                </a:solidFill>
-                <a:latin typeface="+mn-lt"/>
-                <a:ea typeface="+mn-ea"/>
-                <a:cs typeface="+mn-cs"/>
-              </a:defRPr>
-            </a:lvl8pPr>
-            <a:lvl9pPr marL="3886200" indent="-228600" algn="l" defTabSz="914400" rtl="0" eaLnBrk="1" latinLnBrk="0" hangingPunct="1">
-              <a:lnSpc>
-                <a:spcPct val="90000"/>
-              </a:lnSpc>
-              <a:spcBef>
-                <a:spcPts val="500"/>
-              </a:spcBef>
-              <a:buFont typeface="Arial" panose="020B0604020202020204" pitchFamily="34" charset="0"/>
-              <a:buChar char="•"/>
-              <a:defRPr sz="1800" kern="1200">
-                <a:solidFill>
-                  <a:schemeClr val="tx1"/>
-                </a:solidFill>
-                <a:latin typeface="+mn-lt"/>
-                <a:ea typeface="+mn-ea"/>
-                <a:cs typeface="+mn-cs"/>
-              </a:defRPr>
-            </a:lvl9pPr>
-          </a:lstStyle>
-          <a:p>
-            <a:pPr>
-              <a:buNone/>
-            </a:pPr>
-            <a:r>
-              <a:rPr lang="hr-HR" b="1" dirty="0"/>
-              <a:t>Apache </a:t>
-            </a:r>
-            <a:r>
-              <a:rPr lang="hr-HR" b="1" dirty="0" err="1"/>
-              <a:t>Cordova</a:t>
-            </a:r>
-            <a:endParaRPr lang="en-US" b="1" dirty="0"/>
-          </a:p>
-          <a:p>
-            <a:pPr>
-              <a:buNone/>
-            </a:pPr>
-            <a:endParaRPr lang="hr-HR" b="1" dirty="0"/>
-          </a:p>
-          <a:p>
-            <a:pPr>
-              <a:buFont typeface="Arial" panose="020B0604020202020204" pitchFamily="34" charset="0"/>
-              <a:buChar char="•"/>
-            </a:pPr>
-            <a:r>
-              <a:rPr lang="hr-HR" b="1" dirty="0" err="1"/>
-              <a:t>Language</a:t>
-            </a:r>
-            <a:r>
-              <a:rPr lang="hr-HR" b="1" dirty="0"/>
-              <a:t>:</a:t>
-            </a:r>
-            <a:r>
-              <a:rPr lang="hr-HR" dirty="0"/>
-              <a:t> HTML, CSS, JavaScript</a:t>
-            </a:r>
-          </a:p>
-          <a:p>
-            <a:pPr>
-              <a:buFont typeface="Arial" panose="020B0604020202020204" pitchFamily="34" charset="0"/>
-              <a:buChar char="•"/>
-            </a:pPr>
-            <a:r>
-              <a:rPr lang="hr-HR" b="1" dirty="0" err="1"/>
-              <a:t>Approach</a:t>
-            </a:r>
-            <a:r>
-              <a:rPr lang="hr-HR" b="1" dirty="0"/>
-              <a:t>:</a:t>
-            </a:r>
-            <a:r>
-              <a:rPr lang="hr-HR" dirty="0"/>
-              <a:t> </a:t>
-            </a:r>
-            <a:r>
-              <a:rPr lang="hr-HR" dirty="0" err="1"/>
-              <a:t>Wraps</a:t>
-            </a:r>
-            <a:r>
-              <a:rPr lang="hr-HR" dirty="0"/>
-              <a:t> a web </a:t>
-            </a:r>
-            <a:r>
-              <a:rPr lang="hr-HR" dirty="0" err="1"/>
-              <a:t>app</a:t>
-            </a:r>
-            <a:r>
-              <a:rPr lang="hr-HR" dirty="0"/>
-              <a:t> </a:t>
-            </a:r>
-            <a:r>
-              <a:rPr lang="hr-HR" dirty="0" err="1"/>
-              <a:t>in</a:t>
-            </a:r>
-            <a:r>
-              <a:rPr lang="hr-HR" dirty="0"/>
-              <a:t> a </a:t>
-            </a:r>
-            <a:r>
-              <a:rPr lang="hr-HR" dirty="0" err="1"/>
-              <a:t>native</a:t>
-            </a:r>
-            <a:r>
-              <a:rPr lang="hr-HR" dirty="0"/>
-              <a:t> </a:t>
-            </a:r>
-            <a:r>
-              <a:rPr lang="hr-HR" dirty="0" err="1"/>
-              <a:t>container</a:t>
-            </a:r>
-            <a:r>
-              <a:rPr lang="hr-HR" dirty="0"/>
-              <a:t> </a:t>
-            </a:r>
-            <a:r>
-              <a:rPr lang="hr-HR" dirty="0" err="1"/>
-              <a:t>using</a:t>
-            </a:r>
-            <a:r>
-              <a:rPr lang="hr-HR" dirty="0"/>
-              <a:t> </a:t>
-            </a:r>
-            <a:r>
-              <a:rPr lang="hr-HR" dirty="0" err="1"/>
-              <a:t>WebView</a:t>
-            </a:r>
-            <a:endParaRPr lang="hr-HR" dirty="0"/>
-          </a:p>
-          <a:p>
-            <a:pPr>
-              <a:buFont typeface="Arial" panose="020B0604020202020204" pitchFamily="34" charset="0"/>
-              <a:buChar char="•"/>
-            </a:pPr>
-            <a:r>
-              <a:rPr lang="hr-HR" b="1" dirty="0" err="1"/>
-              <a:t>Plugins</a:t>
-            </a:r>
-            <a:r>
-              <a:rPr lang="hr-HR" b="1" dirty="0"/>
-              <a:t>:</a:t>
-            </a:r>
-            <a:r>
-              <a:rPr lang="hr-HR" dirty="0"/>
-              <a:t> </a:t>
-            </a:r>
-            <a:r>
-              <a:rPr lang="hr-HR" dirty="0" err="1"/>
-              <a:t>Allows</a:t>
-            </a:r>
-            <a:r>
-              <a:rPr lang="hr-HR" dirty="0"/>
-              <a:t> </a:t>
-            </a:r>
-            <a:r>
-              <a:rPr lang="hr-HR" dirty="0" err="1"/>
-              <a:t>access</a:t>
-            </a:r>
-            <a:r>
-              <a:rPr lang="hr-HR" dirty="0"/>
-              <a:t> to </a:t>
-            </a:r>
-            <a:r>
-              <a:rPr lang="hr-HR" dirty="0" err="1"/>
-              <a:t>native</a:t>
-            </a:r>
-            <a:r>
-              <a:rPr lang="hr-HR" dirty="0"/>
-              <a:t> </a:t>
-            </a:r>
-            <a:r>
-              <a:rPr lang="hr-HR" dirty="0" err="1"/>
-              <a:t>device</a:t>
-            </a:r>
-            <a:r>
-              <a:rPr lang="hr-HR" dirty="0"/>
-              <a:t> </a:t>
-            </a:r>
-            <a:r>
-              <a:rPr lang="hr-HR" dirty="0" err="1"/>
-              <a:t>features</a:t>
-            </a:r>
-            <a:r>
-              <a:rPr lang="hr-HR" dirty="0"/>
-              <a:t> (</a:t>
-            </a:r>
-            <a:r>
-              <a:rPr lang="hr-HR" dirty="0" err="1"/>
-              <a:t>camera</a:t>
-            </a:r>
-            <a:r>
-              <a:rPr lang="hr-HR" dirty="0"/>
-              <a:t>, GPS)</a:t>
-            </a:r>
-          </a:p>
-          <a:p>
-            <a:pPr>
-              <a:buNone/>
-            </a:pPr>
-            <a:r>
-              <a:rPr lang="hr-HR" dirty="0"/>
-              <a:t>✅ </a:t>
-            </a:r>
-            <a:r>
-              <a:rPr lang="hr-HR" b="1" dirty="0" err="1"/>
-              <a:t>Advantages</a:t>
-            </a:r>
-            <a:r>
-              <a:rPr lang="hr-HR" b="1" dirty="0"/>
-              <a:t>:</a:t>
-            </a:r>
-            <a:endParaRPr lang="hr-HR" dirty="0"/>
-          </a:p>
-          <a:p>
-            <a:pPr>
-              <a:buFont typeface="Arial" panose="020B0604020202020204" pitchFamily="34" charset="0"/>
-              <a:buChar char="•"/>
-            </a:pPr>
-            <a:r>
-              <a:rPr lang="hr-HR" dirty="0" err="1"/>
-              <a:t>Familiar</a:t>
-            </a:r>
-            <a:r>
-              <a:rPr lang="hr-HR" dirty="0"/>
-              <a:t> web </a:t>
-            </a:r>
-            <a:r>
-              <a:rPr lang="hr-HR" dirty="0" err="1"/>
-              <a:t>technologies</a:t>
-            </a:r>
-            <a:endParaRPr lang="hr-HR" dirty="0"/>
-          </a:p>
-          <a:p>
-            <a:pPr>
-              <a:buFont typeface="Arial" panose="020B0604020202020204" pitchFamily="34" charset="0"/>
-              <a:buChar char="•"/>
-            </a:pPr>
-            <a:r>
-              <a:rPr lang="hr-HR" dirty="0" err="1"/>
-              <a:t>Large</a:t>
-            </a:r>
-            <a:r>
-              <a:rPr lang="hr-HR" dirty="0"/>
-              <a:t> </a:t>
-            </a:r>
-            <a:r>
-              <a:rPr lang="hr-HR" dirty="0" err="1"/>
-              <a:t>ecosystem</a:t>
-            </a:r>
-            <a:r>
-              <a:rPr lang="hr-HR" dirty="0"/>
-              <a:t> </a:t>
-            </a:r>
-            <a:r>
-              <a:rPr lang="hr-HR" dirty="0" err="1"/>
-              <a:t>of</a:t>
-            </a:r>
-            <a:r>
-              <a:rPr lang="hr-HR" dirty="0"/>
-              <a:t> </a:t>
-            </a:r>
-            <a:r>
-              <a:rPr lang="hr-HR" dirty="0" err="1"/>
-              <a:t>plugins</a:t>
-            </a:r>
-            <a:endParaRPr lang="hr-HR" dirty="0"/>
-          </a:p>
-          <a:p>
-            <a:pPr>
-              <a:buNone/>
-            </a:pPr>
-            <a:r>
-              <a:rPr lang="hr-HR" dirty="0"/>
-              <a:t>⚠️ </a:t>
-            </a:r>
-            <a:r>
-              <a:rPr lang="hr-HR" b="1" dirty="0" err="1"/>
-              <a:t>Considerations</a:t>
-            </a:r>
-            <a:r>
-              <a:rPr lang="hr-HR" b="1" dirty="0"/>
-              <a:t>:</a:t>
-            </a:r>
-            <a:endParaRPr lang="hr-HR" dirty="0"/>
-          </a:p>
-          <a:p>
-            <a:pPr>
-              <a:buFont typeface="Arial" panose="020B0604020202020204" pitchFamily="34" charset="0"/>
-              <a:buChar char="•"/>
-            </a:pPr>
-            <a:r>
-              <a:rPr lang="hr-HR" dirty="0"/>
-              <a:t>Web-</a:t>
-            </a:r>
-            <a:r>
-              <a:rPr lang="hr-HR" dirty="0" err="1"/>
-              <a:t>based</a:t>
-            </a:r>
-            <a:r>
-              <a:rPr lang="hr-HR" dirty="0"/>
-              <a:t> </a:t>
-            </a:r>
-            <a:r>
-              <a:rPr lang="hr-HR" dirty="0" err="1"/>
-              <a:t>approach</a:t>
-            </a:r>
-            <a:r>
-              <a:rPr lang="hr-HR" dirty="0"/>
-              <a:t> → </a:t>
-            </a:r>
-            <a:r>
-              <a:rPr lang="hr-HR" dirty="0" err="1"/>
-              <a:t>Lower</a:t>
-            </a:r>
-            <a:r>
-              <a:rPr lang="hr-HR" dirty="0"/>
-              <a:t> </a:t>
-            </a:r>
-            <a:r>
-              <a:rPr lang="hr-HR" dirty="0" err="1"/>
-              <a:t>performance</a:t>
-            </a:r>
-            <a:r>
-              <a:rPr lang="hr-HR" dirty="0"/>
-              <a:t> </a:t>
-            </a:r>
-            <a:r>
-              <a:rPr lang="hr-HR" dirty="0" err="1"/>
-              <a:t>than</a:t>
-            </a:r>
-            <a:r>
-              <a:rPr lang="hr-HR" dirty="0"/>
-              <a:t> </a:t>
-            </a:r>
-            <a:r>
-              <a:rPr lang="hr-HR" dirty="0" err="1"/>
-              <a:t>native</a:t>
-            </a:r>
-            <a:endParaRPr lang="hr-HR" dirty="0"/>
-          </a:p>
-          <a:p>
-            <a:pPr>
-              <a:buFont typeface="Arial" panose="020B0604020202020204" pitchFamily="34" charset="0"/>
-              <a:buChar char="•"/>
-            </a:pPr>
-            <a:r>
-              <a:rPr lang="hr-HR" dirty="0"/>
-              <a:t>UI </a:t>
-            </a:r>
-            <a:r>
-              <a:rPr lang="hr-HR" dirty="0" err="1"/>
-              <a:t>elements</a:t>
-            </a:r>
-            <a:r>
-              <a:rPr lang="hr-HR" dirty="0"/>
-              <a:t> </a:t>
-            </a:r>
-            <a:r>
-              <a:rPr lang="hr-HR" dirty="0" err="1"/>
-              <a:t>may</a:t>
-            </a:r>
-            <a:r>
-              <a:rPr lang="hr-HR" dirty="0"/>
-              <a:t> </a:t>
-            </a:r>
-            <a:r>
-              <a:rPr lang="hr-HR" dirty="0" err="1"/>
-              <a:t>not</a:t>
-            </a:r>
-            <a:r>
-              <a:rPr lang="hr-HR" dirty="0"/>
-              <a:t> </a:t>
-            </a:r>
-            <a:r>
-              <a:rPr lang="hr-HR" dirty="0" err="1"/>
-              <a:t>feel</a:t>
-            </a:r>
-            <a:r>
-              <a:rPr lang="hr-HR" dirty="0"/>
-              <a:t> "</a:t>
-            </a:r>
-            <a:r>
-              <a:rPr lang="hr-HR" dirty="0" err="1"/>
-              <a:t>native</a:t>
-            </a:r>
-            <a:r>
-              <a:rPr lang="hr-HR" dirty="0"/>
-              <a:t>"</a:t>
-            </a:r>
-          </a:p>
-          <a:p>
-            <a:pPr>
-              <a:buFont typeface="Arial" panose="020B0604020202020204" pitchFamily="34" charset="0"/>
-              <a:buChar char="•"/>
-            </a:pPr>
-            <a:endParaRPr lang="en-US" dirty="0"/>
-          </a:p>
-          <a:p>
-            <a:pPr>
-              <a:buFont typeface="Arial" panose="020B0604020202020204" pitchFamily="34" charset="0"/>
-              <a:buChar char="•"/>
-            </a:pPr>
-            <a:r>
-              <a:rPr lang="en-US" dirty="0"/>
-              <a:t>Shared business logic, network requests, and data handling</a:t>
-            </a:r>
-          </a:p>
-          <a:p>
-            <a:pPr>
-              <a:buFont typeface="Arial" panose="020B0604020202020204" pitchFamily="34" charset="0"/>
-              <a:buChar char="•"/>
-            </a:pPr>
-            <a:r>
-              <a:rPr lang="en-US" dirty="0"/>
-              <a:t>Consistent behavior across platforms</a:t>
             </a:r>
           </a:p>
         </p:txBody>
@@ -8288,7 +10164,7 @@
 </p:sld>
 </file>
 
-<file path=ppt/slides/slide6.xml><?xml version="1.0" encoding="utf-8"?>
+<file path=ppt/slides/slide8.xml><?xml version="1.0" encoding="utf-8"?>
 <p:sld xmlns:a="http://schemas.openxmlformats.org/drawingml/2006/main" xmlns:r="http://schemas.openxmlformats.org/officeDocument/2006/relationships" xmlns:p="http://schemas.openxmlformats.org/presentationml/2006/main">
   <p:cSld>
     <p:spTree>
@@ -8744,7 +10620,7 @@
 </p:sld>
 </file>
 
-<file path=ppt/slides/slide7.xml><?xml version="1.0" encoding="utf-8"?>
+<file path=ppt/slides/slide9.xml><?xml version="1.0" encoding="utf-8"?>
 <p:sld xmlns:a="http://schemas.openxmlformats.org/drawingml/2006/main" xmlns:r="http://schemas.openxmlformats.org/officeDocument/2006/relationships" xmlns:p="http://schemas.openxmlformats.org/presentationml/2006/main">
   <p:cSld>
     <p:spTree>
@@ -8752,7 +10628,7 @@
         <p:cNvPr id="1" name="">
           <a:extLst>
             <a:ext uri="{FF2B5EF4-FFF2-40B4-BE49-F238E27FC236}">
-              <a16:creationId xmlns:a16="http://schemas.microsoft.com/office/drawing/2014/main" id="{143D190C-BEB5-37F1-A6FD-13688D556FF2}"/>
+              <a16:creationId xmlns:a16="http://schemas.microsoft.com/office/drawing/2014/main" id="{8FDC06C0-5C02-24CF-D4E0-6E8A030FED2E}"/>
             </a:ext>
           </a:extLst>
         </p:cNvPr>
@@ -8769,10 +10645,10 @@
       </p:grpSpPr>
       <p:sp>
         <p:nvSpPr>
-          <p:cNvPr id="3" name="Title 2">
+          <p:cNvPr id="4" name="Title 3">
             <a:extLst>
               <a:ext uri="{FF2B5EF4-FFF2-40B4-BE49-F238E27FC236}">
-                <a16:creationId xmlns:a16="http://schemas.microsoft.com/office/drawing/2014/main" id="{BE6B4FA9-42B4-49F1-4330-C43CA58CE333}"/>
+                <a16:creationId xmlns:a16="http://schemas.microsoft.com/office/drawing/2014/main" id="{520245A0-946E-CDD5-C60A-8C8D5AE59A89}"/>
               </a:ext>
             </a:extLst>
           </p:cNvPr>
@@ -8788,179 +10664,155 @@
           <a:bodyPr/>
           <a:lstStyle/>
           <a:p>
-            <a:r>
-              <a:rPr lang="en-US" dirty="0"/>
-              <a:t>MOBILE DEVELOPMENT – FINAL EXERCISE</a:t>
-            </a:r>
-            <a:endParaRPr lang="hr-HR" dirty="0"/>
+            <a:endParaRPr lang="hr-HR"/>
           </a:p>
         </p:txBody>
       </p:sp>
-      <p:pic>
-        <p:nvPicPr>
-          <p:cNvPr id="6" name="Picture 5">
+      <p:sp>
+        <p:nvSpPr>
+          <p:cNvPr id="5" name="Content Placeholder 4">
             <a:extLst>
               <a:ext uri="{FF2B5EF4-FFF2-40B4-BE49-F238E27FC236}">
-                <a16:creationId xmlns:a16="http://schemas.microsoft.com/office/drawing/2014/main" id="{F3FA6376-34D9-3DE3-59D2-B24F37BBA60F}"/>
+                <a16:creationId xmlns:a16="http://schemas.microsoft.com/office/drawing/2014/main" id="{A0C669BD-EB57-921B-967C-C09D2F9F4949}"/>
               </a:ext>
             </a:extLst>
           </p:cNvPr>
-          <p:cNvPicPr>
-            <a:picLocks noChangeAspect="1"/>
-          </p:cNvPicPr>
-          <p:nvPr/>
-        </p:nvPicPr>
-        <p:blipFill>
-          <a:blip r:embed="rId3"/>
-          <a:stretch>
-            <a:fillRect/>
-          </a:stretch>
-        </p:blipFill>
-        <p:spPr>
-          <a:xfrm>
-            <a:off x="9211961" y="3083333"/>
-            <a:ext cx="1165088" cy="1416050"/>
-          </a:xfrm>
-          <a:prstGeom prst="rect">
-            <a:avLst/>
-          </a:prstGeom>
-        </p:spPr>
-      </p:pic>
-      <p:sp>
-        <p:nvSpPr>
-          <p:cNvPr id="8" name="TextBox 7">
-            <a:extLst>
-              <a:ext uri="{FF2B5EF4-FFF2-40B4-BE49-F238E27FC236}">
-                <a16:creationId xmlns:a16="http://schemas.microsoft.com/office/drawing/2014/main" id="{4575A11A-8CC5-B88D-A68F-A098C57902B1}"/>
-              </a:ext>
-            </a:extLst>
-          </p:cNvPr>
-          <p:cNvSpPr txBox="1"/>
-          <p:nvPr/>
+          <p:cNvSpPr>
+            <a:spLocks noGrp="1"/>
+          </p:cNvSpPr>
+          <p:nvPr>
+            <p:ph idx="1"/>
+          </p:nvPr>
         </p:nvSpPr>
-        <p:spPr>
-          <a:xfrm>
-            <a:off x="939560" y="2197893"/>
-            <a:ext cx="7315440" cy="3539430"/>
-          </a:xfrm>
-          <a:prstGeom prst="rect">
-            <a:avLst/>
-          </a:prstGeom>
-          <a:noFill/>
-        </p:spPr>
+        <p:spPr/>
         <p:txBody>
-          <a:bodyPr wrap="square" rtlCol="0">
-            <a:spAutoFit/>
+          <a:bodyPr>
+            <a:normAutofit lnSpcReduction="10000"/>
           </a:bodyPr>
           <a:lstStyle/>
           <a:p>
             <a:pPr>
-              <a:buNone/>
-            </a:pPr>
-            <a:r>
-              <a:rPr lang="en-US" sz="1400" dirty="0"/>
-              <a:t>Pack and Deploy Your Classroom Management App with Apache Cordova</a:t>
-            </a:r>
-            <a:br>
-              <a:rPr lang="en-US" sz="1400" dirty="0"/>
-            </a:br>
-            <a:r>
-              <a:rPr lang="en-US" sz="1400" dirty="0"/>
-              <a:t>✅ </a:t>
-            </a:r>
-            <a:r>
-              <a:rPr lang="en-US" sz="1400" b="1" dirty="0"/>
-              <a:t>Install Apache Cordova</a:t>
-            </a:r>
-            <a:br>
-              <a:rPr lang="en-US" sz="1400" dirty="0"/>
-            </a:br>
-            <a:r>
-              <a:rPr lang="en-US" sz="1400" dirty="0"/>
-              <a:t>Set up Cordova on your machine to package your HTML, CSS, and JavaScript files into a mobile-ready application.</a:t>
-            </a:r>
-            <a:br>
-              <a:rPr lang="en-US" sz="1400" dirty="0"/>
-            </a:br>
-            <a:r>
-              <a:rPr lang="en-US" sz="1400" dirty="0"/>
-              <a:t>✅ </a:t>
-            </a:r>
-            <a:r>
-              <a:rPr lang="en-US" sz="1400" b="1" dirty="0"/>
-              <a:t>Prepare Your Web Project</a:t>
-            </a:r>
-            <a:br>
-              <a:rPr lang="en-US" sz="1400" dirty="0"/>
-            </a:br>
-            <a:r>
-              <a:rPr lang="en-US" sz="1400" dirty="0"/>
-              <a:t>Make sure your project folder is well-structured and includes all necessary files (HTML, CSS, JS).</a:t>
-            </a:r>
-            <a:br>
-              <a:rPr lang="en-US" sz="1400" dirty="0"/>
-            </a:br>
-            <a:r>
-              <a:rPr lang="en-US" sz="1400" dirty="0"/>
-              <a:t>✅ </a:t>
-            </a:r>
-            <a:r>
-              <a:rPr lang="en-US" sz="1400" b="1" dirty="0"/>
-              <a:t>Build the Mobile App</a:t>
-            </a:r>
-            <a:br>
-              <a:rPr lang="en-US" sz="1400" dirty="0"/>
-            </a:br>
-            <a:r>
-              <a:rPr lang="en-US" sz="1400" dirty="0"/>
-              <a:t>Use Cordova commands to build your project for Android or iOS, creating native app packages.</a:t>
-            </a:r>
-            <a:br>
-              <a:rPr lang="en-US" sz="1400" dirty="0"/>
-            </a:br>
-            <a:r>
-              <a:rPr lang="en-US" sz="1400" dirty="0"/>
-              <a:t>✅ </a:t>
-            </a:r>
-            <a:r>
-              <a:rPr lang="en-US" sz="1400" b="1" dirty="0"/>
-              <a:t>Test on Real Devices</a:t>
-            </a:r>
-            <a:br>
-              <a:rPr lang="en-US" sz="1400" dirty="0"/>
-            </a:br>
-            <a:r>
-              <a:rPr lang="en-US" sz="1400" dirty="0"/>
-              <a:t>Install the generated app files on your phone or emulator to see your classroom management tool in action.</a:t>
-            </a:r>
-          </a:p>
-          <a:p>
-            <a:pPr>
-              <a:buNone/>
-            </a:pPr>
-            <a:endParaRPr lang="en-US" sz="1400" dirty="0"/>
-          </a:p>
-          <a:p>
-            <a:r>
-              <a:rPr lang="en-US" sz="1400" dirty="0"/>
-              <a:t>👉 This will let you experience your project on real devices and share it with others—taking your classroom management app to the next level! 😎</a:t>
-            </a:r>
-          </a:p>
-          <a:p>
-            <a:endParaRPr lang="en-US" sz="1400" dirty="0"/>
-          </a:p>
-          <a:p>
-            <a:r>
-              <a:rPr lang="en-US" sz="1400" dirty="0"/>
-              <a:t>https://cordova.apache.org/</a:t>
-            </a:r>
+              <a:buFont typeface="Arial" panose="020B0604020202020204" pitchFamily="34" charset="0"/>
+              <a:buChar char="•"/>
+            </a:pPr>
+            <a:r>
+              <a:rPr lang="en-US" dirty="0"/>
+              <a:t>Flutter – Get Started</a:t>
+            </a:r>
+          </a:p>
+          <a:p>
+            <a:pPr>
+              <a:buFont typeface="Arial" panose="020B0604020202020204" pitchFamily="34" charset="0"/>
+              <a:buChar char="•"/>
+            </a:pPr>
+            <a:r>
+              <a:rPr lang="en-US" dirty="0"/>
+              <a:t>Dart – Language Tour</a:t>
+            </a:r>
+          </a:p>
+          <a:p>
+            <a:pPr>
+              <a:buFont typeface="Arial" panose="020B0604020202020204" pitchFamily="34" charset="0"/>
+              <a:buChar char="•"/>
+            </a:pPr>
+            <a:r>
+              <a:rPr lang="en-US" i="1" dirty="0"/>
+              <a:t>Flutter in Action</a:t>
+            </a:r>
+            <a:r>
+              <a:rPr lang="en-US" dirty="0"/>
+              <a:t> by Eric Windmill</a:t>
+            </a:r>
+          </a:p>
+          <a:p>
+            <a:pPr>
+              <a:buFont typeface="Arial" panose="020B0604020202020204" pitchFamily="34" charset="0"/>
+              <a:buChar char="•"/>
+            </a:pPr>
+            <a:r>
+              <a:rPr lang="en-US" i="1" dirty="0"/>
+              <a:t>Beginning Flutter: A Hands On Guide to App Development</a:t>
+            </a:r>
+            <a:r>
+              <a:rPr lang="en-US" dirty="0"/>
+              <a:t> by Marco L. Napoli</a:t>
+            </a:r>
+          </a:p>
+          <a:p>
+            <a:pPr>
+              <a:buFont typeface="Arial" panose="020B0604020202020204" pitchFamily="34" charset="0"/>
+              <a:buChar char="•"/>
+            </a:pPr>
+            <a:r>
+              <a:rPr lang="hr-HR" dirty="0"/>
+              <a:t>Apache Cordova – </a:t>
+            </a:r>
+            <a:r>
+              <a:rPr lang="hr-HR" dirty="0">
+                <a:hlinkClick r:id="rId2"/>
+              </a:rPr>
+              <a:t>Getting Started Guide</a:t>
+            </a:r>
+            <a:endParaRPr lang="hr-HR" dirty="0"/>
+          </a:p>
+          <a:p>
+            <a:pPr>
+              <a:buFont typeface="Arial" panose="020B0604020202020204" pitchFamily="34" charset="0"/>
+              <a:buChar char="•"/>
+            </a:pPr>
+            <a:r>
+              <a:rPr lang="hr-HR" dirty="0"/>
+              <a:t>GitHub – </a:t>
+            </a:r>
+            <a:r>
+              <a:rPr lang="hr-HR" dirty="0">
+                <a:hlinkClick r:id="rId3"/>
+              </a:rPr>
+              <a:t>Apache Cordova Plugins</a:t>
+            </a:r>
+            <a:endParaRPr lang="hr-HR" dirty="0"/>
+          </a:p>
+          <a:p>
+            <a:pPr>
+              <a:buFont typeface="Arial" panose="020B0604020202020204" pitchFamily="34" charset="0"/>
+              <a:buChar char="•"/>
+            </a:pPr>
+            <a:r>
+              <a:rPr lang="hr-HR" i="1" dirty="0"/>
+              <a:t>Apache Cordova in Action</a:t>
+            </a:r>
+            <a:r>
+              <a:rPr lang="hr-HR" dirty="0"/>
+              <a:t> by Raymond Camden &amp; John Wargo</a:t>
+            </a:r>
+          </a:p>
+          <a:p>
+            <a:pPr>
+              <a:buFont typeface="Arial" panose="020B0604020202020204" pitchFamily="34" charset="0"/>
+              <a:buChar char="•"/>
+            </a:pPr>
+            <a:r>
+              <a:rPr lang="hr-HR" i="1" dirty="0"/>
+              <a:t>PhoneGap Essentials</a:t>
+            </a:r>
+            <a:r>
+              <a:rPr lang="hr-HR" dirty="0"/>
+              <a:t> by John M. Wargo</a:t>
+            </a:r>
+          </a:p>
+          <a:p>
+            <a:pPr>
+              <a:buFont typeface="Arial" panose="020B0604020202020204" pitchFamily="34" charset="0"/>
+              <a:buChar char="•"/>
+            </a:pPr>
+            <a:endParaRPr lang="en-US" dirty="0"/>
           </a:p>
         </p:txBody>
       </p:sp>
     </p:spTree>
     <p:extLst>
       <p:ext uri="{BB962C8B-B14F-4D97-AF65-F5344CB8AC3E}">
-        <p14:creationId xmlns:p14="http://schemas.microsoft.com/office/powerpoint/2010/main" val="1814369650"/>
+        <p14:creationId xmlns:p14="http://schemas.microsoft.com/office/powerpoint/2010/main" val="3164509565"/>
       </p:ext>
     </p:extLst>
   </p:cSld>

</xml_diff>